<commit_message>
Adicionada apresentação até a parte do Android, AS e Java
</commit_message>
<xml_diff>
--- a/Docs/Apresentacao.pptx
+++ b/Docs/Apresentacao.pptx
@@ -11,6 +11,7 @@
     <p:sldId id="259" r:id="rId5"/>
     <p:sldId id="260" r:id="rId6"/>
     <p:sldId id="261" r:id="rId7"/>
+    <p:sldId id="262" r:id="rId8"/>
   </p:sldIdLst>
   <p:sldSz cx="12192000" cy="6858000"/>
   <p:notesSz cx="6858000" cy="9144000"/>
@@ -109,6 +110,11 @@
       </a:defRPr>
     </a:lvl9pPr>
   </p:defaultTextStyle>
+  <p:extLst>
+    <p:ext uri="{EFAFB233-063F-42B5-8137-9DF3F51BA10A}">
+      <p15:sldGuideLst xmlns:p15="http://schemas.microsoft.com/office/powerpoint/2012/main"/>
+    </p:ext>
+  </p:extLst>
 </p:presentation>
 </file>
 
@@ -5877,6 +5883,18 @@
   <p:clrMapOvr>
     <a:masterClrMapping/>
   </p:clrMapOvr>
+  <mc:AlternateContent xmlns:mc="http://schemas.openxmlformats.org/markup-compatibility/2006">
+    <mc:Choice xmlns:p14="http://schemas.microsoft.com/office/powerpoint/2010/main" Requires="p14">
+      <p:transition spd="med" p14:dur="700">
+        <p:fade/>
+      </p:transition>
+    </mc:Choice>
+    <mc:Fallback>
+      <p:transition spd="med">
+        <p:fade/>
+      </p:transition>
+    </mc:Fallback>
+  </mc:AlternateContent>
 </p:sld>
 </file>
 
@@ -6008,6 +6026,520 @@
   <p:clrMapOvr>
     <a:masterClrMapping/>
   </p:clrMapOvr>
+  <mc:AlternateContent xmlns:mc="http://schemas.openxmlformats.org/markup-compatibility/2006">
+    <mc:Choice xmlns:p14="http://schemas.microsoft.com/office/powerpoint/2010/main" Requires="p14">
+      <p:transition spd="slow" p14:dur="1500">
+        <p:split orient="vert"/>
+      </p:transition>
+    </mc:Choice>
+    <mc:Fallback>
+      <p:transition spd="slow">
+        <p:split orient="vert"/>
+      </p:transition>
+    </mc:Fallback>
+  </mc:AlternateContent>
+  <p:timing>
+    <p:tnLst>
+      <p:par>
+        <p:cTn id="1" dur="indefinite" restart="never" nodeType="tmRoot">
+          <p:childTnLst>
+            <p:seq concurrent="1" nextAc="seek">
+              <p:cTn id="2" dur="indefinite" nodeType="mainSeq">
+                <p:childTnLst>
+                  <p:par>
+                    <p:cTn id="3" fill="hold">
+                      <p:stCondLst>
+                        <p:cond delay="indefinite"/>
+                        <p:cond evt="onBegin" delay="0">
+                          <p:tn val="2"/>
+                        </p:cond>
+                      </p:stCondLst>
+                      <p:childTnLst>
+                        <p:par>
+                          <p:cTn id="4" fill="hold">
+                            <p:stCondLst>
+                              <p:cond delay="0"/>
+                            </p:stCondLst>
+                            <p:childTnLst>
+                              <p:par>
+                                <p:cTn id="5" presetID="22" presetClass="entr" presetSubtype="4" fill="hold" grpId="0" nodeType="withEffect">
+                                  <p:stCondLst>
+                                    <p:cond delay="0"/>
+                                  </p:stCondLst>
+                                  <p:childTnLst>
+                                    <p:set>
+                                      <p:cBhvr>
+                                        <p:cTn id="6" dur="1" fill="hold">
+                                          <p:stCondLst>
+                                            <p:cond delay="0"/>
+                                          </p:stCondLst>
+                                        </p:cTn>
+                                        <p:tgtEl>
+                                          <p:spTgt spid="2"/>
+                                        </p:tgtEl>
+                                        <p:attrNameLst>
+                                          <p:attrName>style.visibility</p:attrName>
+                                        </p:attrNameLst>
+                                      </p:cBhvr>
+                                      <p:to>
+                                        <p:strVal val="visible"/>
+                                      </p:to>
+                                    </p:set>
+                                    <p:animEffect transition="in" filter="wipe(down)">
+                                      <p:cBhvr>
+                                        <p:cTn id="7" dur="500"/>
+                                        <p:tgtEl>
+                                          <p:spTgt spid="2"/>
+                                        </p:tgtEl>
+                                      </p:cBhvr>
+                                    </p:animEffect>
+                                  </p:childTnLst>
+                                </p:cTn>
+                              </p:par>
+                              <p:par>
+                                <p:cTn id="8" presetID="14" presetClass="entr" presetSubtype="10" fill="hold" nodeType="withEffect">
+                                  <p:stCondLst>
+                                    <p:cond delay="0"/>
+                                  </p:stCondLst>
+                                  <p:childTnLst>
+                                    <p:set>
+                                      <p:cBhvr>
+                                        <p:cTn id="9" dur="1" fill="hold">
+                                          <p:stCondLst>
+                                            <p:cond delay="0"/>
+                                          </p:stCondLst>
+                                        </p:cTn>
+                                        <p:tgtEl>
+                                          <p:spTgt spid="3">
+                                            <p:txEl>
+                                              <p:pRg st="0" end="0"/>
+                                            </p:txEl>
+                                          </p:spTgt>
+                                        </p:tgtEl>
+                                        <p:attrNameLst>
+                                          <p:attrName>style.visibility</p:attrName>
+                                        </p:attrNameLst>
+                                      </p:cBhvr>
+                                      <p:to>
+                                        <p:strVal val="visible"/>
+                                      </p:to>
+                                    </p:set>
+                                    <p:animEffect transition="in" filter="randombar(horizontal)">
+                                      <p:cBhvr>
+                                        <p:cTn id="10" dur="500"/>
+                                        <p:tgtEl>
+                                          <p:spTgt spid="3">
+                                            <p:txEl>
+                                              <p:pRg st="0" end="0"/>
+                                            </p:txEl>
+                                          </p:spTgt>
+                                        </p:tgtEl>
+                                      </p:cBhvr>
+                                    </p:animEffect>
+                                  </p:childTnLst>
+                                </p:cTn>
+                              </p:par>
+                            </p:childTnLst>
+                          </p:cTn>
+                        </p:par>
+                      </p:childTnLst>
+                    </p:cTn>
+                  </p:par>
+                  <p:par>
+                    <p:cTn id="11" fill="hold">
+                      <p:stCondLst>
+                        <p:cond delay="indefinite"/>
+                      </p:stCondLst>
+                      <p:childTnLst>
+                        <p:par>
+                          <p:cTn id="12" fill="hold">
+                            <p:stCondLst>
+                              <p:cond delay="0"/>
+                            </p:stCondLst>
+                            <p:childTnLst>
+                              <p:par>
+                                <p:cTn id="13" presetID="10" presetClass="entr" presetSubtype="0" fill="hold" nodeType="clickEffect">
+                                  <p:stCondLst>
+                                    <p:cond delay="0"/>
+                                  </p:stCondLst>
+                                  <p:childTnLst>
+                                    <p:set>
+                                      <p:cBhvr>
+                                        <p:cTn id="14" dur="1" fill="hold">
+                                          <p:stCondLst>
+                                            <p:cond delay="0"/>
+                                          </p:stCondLst>
+                                        </p:cTn>
+                                        <p:tgtEl>
+                                          <p:spTgt spid="3">
+                                            <p:txEl>
+                                              <p:pRg st="2" end="2"/>
+                                            </p:txEl>
+                                          </p:spTgt>
+                                        </p:tgtEl>
+                                        <p:attrNameLst>
+                                          <p:attrName>style.visibility</p:attrName>
+                                        </p:attrNameLst>
+                                      </p:cBhvr>
+                                      <p:to>
+                                        <p:strVal val="visible"/>
+                                      </p:to>
+                                    </p:set>
+                                    <p:animEffect transition="in" filter="fade">
+                                      <p:cBhvr>
+                                        <p:cTn id="15" dur="500"/>
+                                        <p:tgtEl>
+                                          <p:spTgt spid="3">
+                                            <p:txEl>
+                                              <p:pRg st="2" end="2"/>
+                                            </p:txEl>
+                                          </p:spTgt>
+                                        </p:tgtEl>
+                                      </p:cBhvr>
+                                    </p:animEffect>
+                                  </p:childTnLst>
+                                </p:cTn>
+                              </p:par>
+                            </p:childTnLst>
+                          </p:cTn>
+                        </p:par>
+                      </p:childTnLst>
+                    </p:cTn>
+                  </p:par>
+                  <p:par>
+                    <p:cTn id="16" fill="hold">
+                      <p:stCondLst>
+                        <p:cond delay="indefinite"/>
+                      </p:stCondLst>
+                      <p:childTnLst>
+                        <p:par>
+                          <p:cTn id="17" fill="hold">
+                            <p:stCondLst>
+                              <p:cond delay="0"/>
+                            </p:stCondLst>
+                            <p:childTnLst>
+                              <p:par>
+                                <p:cTn id="18" presetID="2" presetClass="entr" presetSubtype="4" fill="hold" nodeType="clickEffect">
+                                  <p:stCondLst>
+                                    <p:cond delay="0"/>
+                                  </p:stCondLst>
+                                  <p:childTnLst>
+                                    <p:set>
+                                      <p:cBhvr>
+                                        <p:cTn id="19" dur="1" fill="hold">
+                                          <p:stCondLst>
+                                            <p:cond delay="0"/>
+                                          </p:stCondLst>
+                                        </p:cTn>
+                                        <p:tgtEl>
+                                          <p:spTgt spid="3">
+                                            <p:txEl>
+                                              <p:pRg st="3" end="3"/>
+                                            </p:txEl>
+                                          </p:spTgt>
+                                        </p:tgtEl>
+                                        <p:attrNameLst>
+                                          <p:attrName>style.visibility</p:attrName>
+                                        </p:attrNameLst>
+                                      </p:cBhvr>
+                                      <p:to>
+                                        <p:strVal val="visible"/>
+                                      </p:to>
+                                    </p:set>
+                                    <p:anim calcmode="lin" valueType="num">
+                                      <p:cBhvr additive="base">
+                                        <p:cTn id="20" dur="500" fill="hold"/>
+                                        <p:tgtEl>
+                                          <p:spTgt spid="3">
+                                            <p:txEl>
+                                              <p:pRg st="3" end="3"/>
+                                            </p:txEl>
+                                          </p:spTgt>
+                                        </p:tgtEl>
+                                        <p:attrNameLst>
+                                          <p:attrName>ppt_x</p:attrName>
+                                        </p:attrNameLst>
+                                      </p:cBhvr>
+                                      <p:tavLst>
+                                        <p:tav tm="0">
+                                          <p:val>
+                                            <p:strVal val="#ppt_x"/>
+                                          </p:val>
+                                        </p:tav>
+                                        <p:tav tm="100000">
+                                          <p:val>
+                                            <p:strVal val="#ppt_x"/>
+                                          </p:val>
+                                        </p:tav>
+                                      </p:tavLst>
+                                    </p:anim>
+                                    <p:anim calcmode="lin" valueType="num">
+                                      <p:cBhvr additive="base">
+                                        <p:cTn id="21" dur="500" fill="hold"/>
+                                        <p:tgtEl>
+                                          <p:spTgt spid="3">
+                                            <p:txEl>
+                                              <p:pRg st="3" end="3"/>
+                                            </p:txEl>
+                                          </p:spTgt>
+                                        </p:tgtEl>
+                                        <p:attrNameLst>
+                                          <p:attrName>ppt_y</p:attrName>
+                                        </p:attrNameLst>
+                                      </p:cBhvr>
+                                      <p:tavLst>
+                                        <p:tav tm="0">
+                                          <p:val>
+                                            <p:strVal val="1+#ppt_h/2"/>
+                                          </p:val>
+                                        </p:tav>
+                                        <p:tav tm="100000">
+                                          <p:val>
+                                            <p:strVal val="#ppt_y"/>
+                                          </p:val>
+                                        </p:tav>
+                                      </p:tavLst>
+                                    </p:anim>
+                                  </p:childTnLst>
+                                </p:cTn>
+                              </p:par>
+                            </p:childTnLst>
+                          </p:cTn>
+                        </p:par>
+                      </p:childTnLst>
+                    </p:cTn>
+                  </p:par>
+                  <p:par>
+                    <p:cTn id="22" fill="hold">
+                      <p:stCondLst>
+                        <p:cond delay="indefinite"/>
+                      </p:stCondLst>
+                      <p:childTnLst>
+                        <p:par>
+                          <p:cTn id="23" fill="hold">
+                            <p:stCondLst>
+                              <p:cond delay="0"/>
+                            </p:stCondLst>
+                            <p:childTnLst>
+                              <p:par>
+                                <p:cTn id="24" presetID="2" presetClass="entr" presetSubtype="4" fill="hold" nodeType="clickEffect">
+                                  <p:stCondLst>
+                                    <p:cond delay="0"/>
+                                  </p:stCondLst>
+                                  <p:childTnLst>
+                                    <p:set>
+                                      <p:cBhvr>
+                                        <p:cTn id="25" dur="1" fill="hold">
+                                          <p:stCondLst>
+                                            <p:cond delay="0"/>
+                                          </p:stCondLst>
+                                        </p:cTn>
+                                        <p:tgtEl>
+                                          <p:spTgt spid="3">
+                                            <p:txEl>
+                                              <p:pRg st="4" end="4"/>
+                                            </p:txEl>
+                                          </p:spTgt>
+                                        </p:tgtEl>
+                                        <p:attrNameLst>
+                                          <p:attrName>style.visibility</p:attrName>
+                                        </p:attrNameLst>
+                                      </p:cBhvr>
+                                      <p:to>
+                                        <p:strVal val="visible"/>
+                                      </p:to>
+                                    </p:set>
+                                    <p:anim calcmode="lin" valueType="num">
+                                      <p:cBhvr additive="base">
+                                        <p:cTn id="26" dur="500" fill="hold"/>
+                                        <p:tgtEl>
+                                          <p:spTgt spid="3">
+                                            <p:txEl>
+                                              <p:pRg st="4" end="4"/>
+                                            </p:txEl>
+                                          </p:spTgt>
+                                        </p:tgtEl>
+                                        <p:attrNameLst>
+                                          <p:attrName>ppt_x</p:attrName>
+                                        </p:attrNameLst>
+                                      </p:cBhvr>
+                                      <p:tavLst>
+                                        <p:tav tm="0">
+                                          <p:val>
+                                            <p:strVal val="#ppt_x"/>
+                                          </p:val>
+                                        </p:tav>
+                                        <p:tav tm="100000">
+                                          <p:val>
+                                            <p:strVal val="#ppt_x"/>
+                                          </p:val>
+                                        </p:tav>
+                                      </p:tavLst>
+                                    </p:anim>
+                                    <p:anim calcmode="lin" valueType="num">
+                                      <p:cBhvr additive="base">
+                                        <p:cTn id="27" dur="500" fill="hold"/>
+                                        <p:tgtEl>
+                                          <p:spTgt spid="3">
+                                            <p:txEl>
+                                              <p:pRg st="4" end="4"/>
+                                            </p:txEl>
+                                          </p:spTgt>
+                                        </p:tgtEl>
+                                        <p:attrNameLst>
+                                          <p:attrName>ppt_y</p:attrName>
+                                        </p:attrNameLst>
+                                      </p:cBhvr>
+                                      <p:tavLst>
+                                        <p:tav tm="0">
+                                          <p:val>
+                                            <p:strVal val="1+#ppt_h/2"/>
+                                          </p:val>
+                                        </p:tav>
+                                        <p:tav tm="100000">
+                                          <p:val>
+                                            <p:strVal val="#ppt_y"/>
+                                          </p:val>
+                                        </p:tav>
+                                      </p:tavLst>
+                                    </p:anim>
+                                  </p:childTnLst>
+                                </p:cTn>
+                              </p:par>
+                            </p:childTnLst>
+                          </p:cTn>
+                        </p:par>
+                      </p:childTnLst>
+                    </p:cTn>
+                  </p:par>
+                  <p:par>
+                    <p:cTn id="28" fill="hold">
+                      <p:stCondLst>
+                        <p:cond delay="indefinite"/>
+                      </p:stCondLst>
+                      <p:childTnLst>
+                        <p:par>
+                          <p:cTn id="29" fill="hold">
+                            <p:stCondLst>
+                              <p:cond delay="0"/>
+                            </p:stCondLst>
+                            <p:childTnLst>
+                              <p:par>
+                                <p:cTn id="30" presetID="2" presetClass="entr" presetSubtype="4" fill="hold" nodeType="clickEffect">
+                                  <p:stCondLst>
+                                    <p:cond delay="0"/>
+                                  </p:stCondLst>
+                                  <p:childTnLst>
+                                    <p:set>
+                                      <p:cBhvr>
+                                        <p:cTn id="31" dur="1" fill="hold">
+                                          <p:stCondLst>
+                                            <p:cond delay="0"/>
+                                          </p:stCondLst>
+                                        </p:cTn>
+                                        <p:tgtEl>
+                                          <p:spTgt spid="3">
+                                            <p:txEl>
+                                              <p:pRg st="5" end="5"/>
+                                            </p:txEl>
+                                          </p:spTgt>
+                                        </p:tgtEl>
+                                        <p:attrNameLst>
+                                          <p:attrName>style.visibility</p:attrName>
+                                        </p:attrNameLst>
+                                      </p:cBhvr>
+                                      <p:to>
+                                        <p:strVal val="visible"/>
+                                      </p:to>
+                                    </p:set>
+                                    <p:anim calcmode="lin" valueType="num">
+                                      <p:cBhvr additive="base">
+                                        <p:cTn id="32" dur="500" fill="hold"/>
+                                        <p:tgtEl>
+                                          <p:spTgt spid="3">
+                                            <p:txEl>
+                                              <p:pRg st="5" end="5"/>
+                                            </p:txEl>
+                                          </p:spTgt>
+                                        </p:tgtEl>
+                                        <p:attrNameLst>
+                                          <p:attrName>ppt_x</p:attrName>
+                                        </p:attrNameLst>
+                                      </p:cBhvr>
+                                      <p:tavLst>
+                                        <p:tav tm="0">
+                                          <p:val>
+                                            <p:strVal val="#ppt_x"/>
+                                          </p:val>
+                                        </p:tav>
+                                        <p:tav tm="100000">
+                                          <p:val>
+                                            <p:strVal val="#ppt_x"/>
+                                          </p:val>
+                                        </p:tav>
+                                      </p:tavLst>
+                                    </p:anim>
+                                    <p:anim calcmode="lin" valueType="num">
+                                      <p:cBhvr additive="base">
+                                        <p:cTn id="33" dur="500" fill="hold"/>
+                                        <p:tgtEl>
+                                          <p:spTgt spid="3">
+                                            <p:txEl>
+                                              <p:pRg st="5" end="5"/>
+                                            </p:txEl>
+                                          </p:spTgt>
+                                        </p:tgtEl>
+                                        <p:attrNameLst>
+                                          <p:attrName>ppt_y</p:attrName>
+                                        </p:attrNameLst>
+                                      </p:cBhvr>
+                                      <p:tavLst>
+                                        <p:tav tm="0">
+                                          <p:val>
+                                            <p:strVal val="1+#ppt_h/2"/>
+                                          </p:val>
+                                        </p:tav>
+                                        <p:tav tm="100000">
+                                          <p:val>
+                                            <p:strVal val="#ppt_y"/>
+                                          </p:val>
+                                        </p:tav>
+                                      </p:tavLst>
+                                    </p:anim>
+                                  </p:childTnLst>
+                                </p:cTn>
+                              </p:par>
+                            </p:childTnLst>
+                          </p:cTn>
+                        </p:par>
+                      </p:childTnLst>
+                    </p:cTn>
+                  </p:par>
+                </p:childTnLst>
+              </p:cTn>
+              <p:prevCondLst>
+                <p:cond evt="onPrev" delay="0">
+                  <p:tgtEl>
+                    <p:sldTgt/>
+                  </p:tgtEl>
+                </p:cond>
+              </p:prevCondLst>
+              <p:nextCondLst>
+                <p:cond evt="onNext" delay="0">
+                  <p:tgtEl>
+                    <p:sldTgt/>
+                  </p:tgtEl>
+                </p:cond>
+              </p:nextCondLst>
+            </p:seq>
+          </p:childTnLst>
+        </p:cTn>
+      </p:par>
+    </p:tnLst>
+    <p:bldLst>
+      <p:bldP spid="2" grpId="0"/>
+    </p:bldLst>
+  </p:timing>
 </p:sld>
 </file>
 
@@ -6108,6 +6640,281 @@
   <p:clrMapOvr>
     <a:masterClrMapping/>
   </p:clrMapOvr>
+  <p:transition spd="slow">
+    <p:randomBar dir="vert"/>
+  </p:transition>
+  <p:timing>
+    <p:tnLst>
+      <p:par>
+        <p:cTn id="1" dur="indefinite" restart="never" nodeType="tmRoot">
+          <p:childTnLst>
+            <p:seq concurrent="1" nextAc="seek">
+              <p:cTn id="2" dur="indefinite" nodeType="mainSeq">
+                <p:childTnLst>
+                  <p:par>
+                    <p:cTn id="3" fill="hold">
+                      <p:stCondLst>
+                        <p:cond delay="indefinite"/>
+                        <p:cond evt="onBegin" delay="0">
+                          <p:tn val="2"/>
+                        </p:cond>
+                      </p:stCondLst>
+                      <p:childTnLst>
+                        <p:par>
+                          <p:cTn id="4" fill="hold">
+                            <p:stCondLst>
+                              <p:cond delay="0"/>
+                            </p:stCondLst>
+                            <p:childTnLst>
+                              <p:par>
+                                <p:cTn id="5" presetID="16" presetClass="entr" presetSubtype="21" fill="hold" grpId="0" nodeType="withEffect">
+                                  <p:stCondLst>
+                                    <p:cond delay="0"/>
+                                  </p:stCondLst>
+                                  <p:childTnLst>
+                                    <p:set>
+                                      <p:cBhvr>
+                                        <p:cTn id="6" dur="1" fill="hold">
+                                          <p:stCondLst>
+                                            <p:cond delay="0"/>
+                                          </p:stCondLst>
+                                        </p:cTn>
+                                        <p:tgtEl>
+                                          <p:spTgt spid="2"/>
+                                        </p:tgtEl>
+                                        <p:attrNameLst>
+                                          <p:attrName>style.visibility</p:attrName>
+                                        </p:attrNameLst>
+                                      </p:cBhvr>
+                                      <p:to>
+                                        <p:strVal val="visible"/>
+                                      </p:to>
+                                    </p:set>
+                                    <p:animEffect transition="in" filter="barn(inVertical)">
+                                      <p:cBhvr>
+                                        <p:cTn id="7" dur="500"/>
+                                        <p:tgtEl>
+                                          <p:spTgt spid="2"/>
+                                        </p:tgtEl>
+                                      </p:cBhvr>
+                                    </p:animEffect>
+                                  </p:childTnLst>
+                                </p:cTn>
+                              </p:par>
+                            </p:childTnLst>
+                          </p:cTn>
+                        </p:par>
+                      </p:childTnLst>
+                    </p:cTn>
+                  </p:par>
+                  <p:par>
+                    <p:cTn id="8" fill="hold">
+                      <p:stCondLst>
+                        <p:cond delay="indefinite"/>
+                      </p:stCondLst>
+                      <p:childTnLst>
+                        <p:par>
+                          <p:cTn id="9" fill="hold">
+                            <p:stCondLst>
+                              <p:cond delay="0"/>
+                            </p:stCondLst>
+                            <p:childTnLst>
+                              <p:par>
+                                <p:cTn id="10" presetID="10" presetClass="entr" presetSubtype="0" fill="hold" nodeType="clickEffect">
+                                  <p:stCondLst>
+                                    <p:cond delay="0"/>
+                                  </p:stCondLst>
+                                  <p:childTnLst>
+                                    <p:set>
+                                      <p:cBhvr>
+                                        <p:cTn id="11" dur="1" fill="hold">
+                                          <p:stCondLst>
+                                            <p:cond delay="0"/>
+                                          </p:stCondLst>
+                                        </p:cTn>
+                                        <p:tgtEl>
+                                          <p:spTgt spid="3">
+                                            <p:txEl>
+                                              <p:pRg st="0" end="0"/>
+                                            </p:txEl>
+                                          </p:spTgt>
+                                        </p:tgtEl>
+                                        <p:attrNameLst>
+                                          <p:attrName>style.visibility</p:attrName>
+                                        </p:attrNameLst>
+                                      </p:cBhvr>
+                                      <p:to>
+                                        <p:strVal val="visible"/>
+                                      </p:to>
+                                    </p:set>
+                                    <p:animEffect transition="in" filter="fade">
+                                      <p:cBhvr>
+                                        <p:cTn id="12" dur="500"/>
+                                        <p:tgtEl>
+                                          <p:spTgt spid="3">
+                                            <p:txEl>
+                                              <p:pRg st="0" end="0"/>
+                                            </p:txEl>
+                                          </p:spTgt>
+                                        </p:tgtEl>
+                                      </p:cBhvr>
+                                    </p:animEffect>
+                                  </p:childTnLst>
+                                </p:cTn>
+                              </p:par>
+                            </p:childTnLst>
+                          </p:cTn>
+                        </p:par>
+                      </p:childTnLst>
+                    </p:cTn>
+                  </p:par>
+                  <p:par>
+                    <p:cTn id="13" fill="hold">
+                      <p:stCondLst>
+                        <p:cond delay="indefinite"/>
+                      </p:stCondLst>
+                      <p:childTnLst>
+                        <p:par>
+                          <p:cTn id="14" fill="hold">
+                            <p:stCondLst>
+                              <p:cond delay="0"/>
+                            </p:stCondLst>
+                            <p:childTnLst>
+                              <p:par>
+                                <p:cTn id="15" presetID="10" presetClass="entr" presetSubtype="0" fill="hold" nodeType="clickEffect">
+                                  <p:stCondLst>
+                                    <p:cond delay="0"/>
+                                  </p:stCondLst>
+                                  <p:childTnLst>
+                                    <p:set>
+                                      <p:cBhvr>
+                                        <p:cTn id="16" dur="1" fill="hold">
+                                          <p:stCondLst>
+                                            <p:cond delay="0"/>
+                                          </p:stCondLst>
+                                        </p:cTn>
+                                        <p:tgtEl>
+                                          <p:spTgt spid="3">
+                                            <p:txEl>
+                                              <p:pRg st="1" end="1"/>
+                                            </p:txEl>
+                                          </p:spTgt>
+                                        </p:tgtEl>
+                                        <p:attrNameLst>
+                                          <p:attrName>style.visibility</p:attrName>
+                                        </p:attrNameLst>
+                                      </p:cBhvr>
+                                      <p:to>
+                                        <p:strVal val="visible"/>
+                                      </p:to>
+                                    </p:set>
+                                    <p:animEffect transition="in" filter="fade">
+                                      <p:cBhvr>
+                                        <p:cTn id="17" dur="500"/>
+                                        <p:tgtEl>
+                                          <p:spTgt spid="3">
+                                            <p:txEl>
+                                              <p:pRg st="1" end="1"/>
+                                            </p:txEl>
+                                          </p:spTgt>
+                                        </p:tgtEl>
+                                      </p:cBhvr>
+                                    </p:animEffect>
+                                  </p:childTnLst>
+                                </p:cTn>
+                              </p:par>
+                            </p:childTnLst>
+                          </p:cTn>
+                        </p:par>
+                      </p:childTnLst>
+                    </p:cTn>
+                  </p:par>
+                  <p:par>
+                    <p:cTn id="18" fill="hold">
+                      <p:stCondLst>
+                        <p:cond delay="indefinite"/>
+                      </p:stCondLst>
+                      <p:childTnLst>
+                        <p:par>
+                          <p:cTn id="19" fill="hold">
+                            <p:stCondLst>
+                              <p:cond delay="0"/>
+                            </p:stCondLst>
+                            <p:childTnLst>
+                              <p:par>
+                                <p:cTn id="20" presetID="10" presetClass="entr" presetSubtype="0" fill="hold" nodeType="clickEffect">
+                                  <p:stCondLst>
+                                    <p:cond delay="0"/>
+                                  </p:stCondLst>
+                                  <p:childTnLst>
+                                    <p:set>
+                                      <p:cBhvr>
+                                        <p:cTn id="21" dur="1" fill="hold">
+                                          <p:stCondLst>
+                                            <p:cond delay="0"/>
+                                          </p:stCondLst>
+                                        </p:cTn>
+                                        <p:tgtEl>
+                                          <p:spTgt spid="3">
+                                            <p:txEl>
+                                              <p:pRg st="2" end="2"/>
+                                            </p:txEl>
+                                          </p:spTgt>
+                                        </p:tgtEl>
+                                        <p:attrNameLst>
+                                          <p:attrName>style.visibility</p:attrName>
+                                        </p:attrNameLst>
+                                      </p:cBhvr>
+                                      <p:to>
+                                        <p:strVal val="visible"/>
+                                      </p:to>
+                                    </p:set>
+                                    <p:animEffect transition="in" filter="fade">
+                                      <p:cBhvr>
+                                        <p:cTn id="22" dur="500"/>
+                                        <p:tgtEl>
+                                          <p:spTgt spid="3">
+                                            <p:txEl>
+                                              <p:pRg st="2" end="2"/>
+                                            </p:txEl>
+                                          </p:spTgt>
+                                        </p:tgtEl>
+                                      </p:cBhvr>
+                                    </p:animEffect>
+                                  </p:childTnLst>
+                                </p:cTn>
+                              </p:par>
+                            </p:childTnLst>
+                          </p:cTn>
+                        </p:par>
+                      </p:childTnLst>
+                    </p:cTn>
+                  </p:par>
+                </p:childTnLst>
+              </p:cTn>
+              <p:prevCondLst>
+                <p:cond evt="onPrev" delay="0">
+                  <p:tgtEl>
+                    <p:sldTgt/>
+                  </p:tgtEl>
+                </p:cond>
+              </p:prevCondLst>
+              <p:nextCondLst>
+                <p:cond evt="onNext" delay="0">
+                  <p:tgtEl>
+                    <p:sldTgt/>
+                  </p:tgtEl>
+                </p:cond>
+              </p:nextCondLst>
+            </p:seq>
+          </p:childTnLst>
+        </p:cTn>
+      </p:par>
+    </p:tnLst>
+    <p:bldLst>
+      <p:bldP spid="2" grpId="0"/>
+    </p:bldLst>
+  </p:timing>
 </p:sld>
 </file>
 
@@ -6207,6 +7014,96 @@
           </a:p>
         </p:txBody>
       </p:sp>
+      <p:pic>
+        <p:nvPicPr>
+          <p:cNvPr id="4" name="Imagem 3"/>
+          <p:cNvPicPr>
+            <a:picLocks noChangeAspect="1"/>
+          </p:cNvPicPr>
+          <p:nvPr/>
+        </p:nvPicPr>
+        <p:blipFill>
+          <a:blip r:embed="rId2"/>
+          <a:stretch>
+            <a:fillRect/>
+          </a:stretch>
+        </p:blipFill>
+        <p:spPr>
+          <a:xfrm>
+            <a:off x="4737924" y="3762947"/>
+            <a:ext cx="3212002" cy="2738438"/>
+          </a:xfrm>
+          <a:prstGeom prst="rect">
+            <a:avLst/>
+          </a:prstGeom>
+          <a:ln>
+            <a:noFill/>
+          </a:ln>
+          <a:effectLst>
+            <a:softEdge rad="112500"/>
+          </a:effectLst>
+        </p:spPr>
+      </p:pic>
+      <p:pic>
+        <p:nvPicPr>
+          <p:cNvPr id="5" name="Imagem 4"/>
+          <p:cNvPicPr>
+            <a:picLocks noChangeAspect="1"/>
+          </p:cNvPicPr>
+          <p:nvPr/>
+        </p:nvPicPr>
+        <p:blipFill>
+          <a:blip r:embed="rId3"/>
+          <a:stretch>
+            <a:fillRect/>
+          </a:stretch>
+        </p:blipFill>
+        <p:spPr>
+          <a:xfrm>
+            <a:off x="4737924" y="3894600"/>
+            <a:ext cx="3300175" cy="2475131"/>
+          </a:xfrm>
+          <a:prstGeom prst="rect">
+            <a:avLst/>
+          </a:prstGeom>
+          <a:ln>
+            <a:noFill/>
+          </a:ln>
+          <a:effectLst>
+            <a:softEdge rad="112500"/>
+          </a:effectLst>
+        </p:spPr>
+      </p:pic>
+      <p:pic>
+        <p:nvPicPr>
+          <p:cNvPr id="6" name="Imagem 5"/>
+          <p:cNvPicPr>
+            <a:picLocks noChangeAspect="1"/>
+          </p:cNvPicPr>
+          <p:nvPr/>
+        </p:nvPicPr>
+        <p:blipFill>
+          <a:blip r:embed="rId4"/>
+          <a:stretch>
+            <a:fillRect/>
+          </a:stretch>
+        </p:blipFill>
+        <p:spPr>
+          <a:xfrm>
+            <a:off x="5410475" y="3952412"/>
+            <a:ext cx="1866900" cy="2447925"/>
+          </a:xfrm>
+          <a:prstGeom prst="rect">
+            <a:avLst/>
+          </a:prstGeom>
+          <a:ln>
+            <a:noFill/>
+          </a:ln>
+          <a:effectLst>
+            <a:softEdge rad="112500"/>
+          </a:effectLst>
+        </p:spPr>
+      </p:pic>
     </p:spTree>
     <p:extLst>
       <p:ext uri="{BB962C8B-B14F-4D97-AF65-F5344CB8AC3E}">
@@ -6217,6 +7114,535 @@
   <p:clrMapOvr>
     <a:masterClrMapping/>
   </p:clrMapOvr>
+  <p:transition spd="slow">
+    <p:cover/>
+  </p:transition>
+  <p:timing>
+    <p:tnLst>
+      <p:par>
+        <p:cTn id="1" dur="indefinite" restart="never" nodeType="tmRoot">
+          <p:childTnLst>
+            <p:seq concurrent="1" nextAc="seek">
+              <p:cTn id="2" dur="indefinite" nodeType="mainSeq">
+                <p:childTnLst>
+                  <p:par>
+                    <p:cTn id="3" fill="hold">
+                      <p:stCondLst>
+                        <p:cond delay="indefinite"/>
+                        <p:cond evt="onBegin" delay="0">
+                          <p:tn val="2"/>
+                        </p:cond>
+                      </p:stCondLst>
+                      <p:childTnLst>
+                        <p:par>
+                          <p:cTn id="4" fill="hold">
+                            <p:stCondLst>
+                              <p:cond delay="0"/>
+                            </p:stCondLst>
+                            <p:childTnLst>
+                              <p:par>
+                                <p:cTn id="5" presetID="10" presetClass="entr" presetSubtype="0" fill="hold" grpId="0" nodeType="afterEffect">
+                                  <p:stCondLst>
+                                    <p:cond delay="0"/>
+                                  </p:stCondLst>
+                                  <p:childTnLst>
+                                    <p:set>
+                                      <p:cBhvr>
+                                        <p:cTn id="6" dur="1" fill="hold">
+                                          <p:stCondLst>
+                                            <p:cond delay="0"/>
+                                          </p:stCondLst>
+                                        </p:cTn>
+                                        <p:tgtEl>
+                                          <p:spTgt spid="2"/>
+                                        </p:tgtEl>
+                                        <p:attrNameLst>
+                                          <p:attrName>style.visibility</p:attrName>
+                                        </p:attrNameLst>
+                                      </p:cBhvr>
+                                      <p:to>
+                                        <p:strVal val="visible"/>
+                                      </p:to>
+                                    </p:set>
+                                    <p:animEffect transition="in" filter="fade">
+                                      <p:cBhvr>
+                                        <p:cTn id="7" dur="500"/>
+                                        <p:tgtEl>
+                                          <p:spTgt spid="2"/>
+                                        </p:tgtEl>
+                                      </p:cBhvr>
+                                    </p:animEffect>
+                                  </p:childTnLst>
+                                </p:cTn>
+                              </p:par>
+                            </p:childTnLst>
+                          </p:cTn>
+                        </p:par>
+                      </p:childTnLst>
+                    </p:cTn>
+                  </p:par>
+                  <p:par>
+                    <p:cTn id="8" fill="hold">
+                      <p:stCondLst>
+                        <p:cond delay="indefinite"/>
+                      </p:stCondLst>
+                      <p:childTnLst>
+                        <p:par>
+                          <p:cTn id="9" fill="hold">
+                            <p:stCondLst>
+                              <p:cond delay="0"/>
+                            </p:stCondLst>
+                            <p:childTnLst>
+                              <p:par>
+                                <p:cTn id="10" presetID="10" presetClass="entr" presetSubtype="0" fill="hold" nodeType="clickEffect">
+                                  <p:stCondLst>
+                                    <p:cond delay="0"/>
+                                  </p:stCondLst>
+                                  <p:childTnLst>
+                                    <p:set>
+                                      <p:cBhvr>
+                                        <p:cTn id="11" dur="1" fill="hold">
+                                          <p:stCondLst>
+                                            <p:cond delay="0"/>
+                                          </p:stCondLst>
+                                        </p:cTn>
+                                        <p:tgtEl>
+                                          <p:spTgt spid="3">
+                                            <p:txEl>
+                                              <p:pRg st="0" end="0"/>
+                                            </p:txEl>
+                                          </p:spTgt>
+                                        </p:tgtEl>
+                                        <p:attrNameLst>
+                                          <p:attrName>style.visibility</p:attrName>
+                                        </p:attrNameLst>
+                                      </p:cBhvr>
+                                      <p:to>
+                                        <p:strVal val="visible"/>
+                                      </p:to>
+                                    </p:set>
+                                    <p:animEffect transition="in" filter="fade">
+                                      <p:cBhvr>
+                                        <p:cTn id="12" dur="500"/>
+                                        <p:tgtEl>
+                                          <p:spTgt spid="3">
+                                            <p:txEl>
+                                              <p:pRg st="0" end="0"/>
+                                            </p:txEl>
+                                          </p:spTgt>
+                                        </p:tgtEl>
+                                      </p:cBhvr>
+                                    </p:animEffect>
+                                  </p:childTnLst>
+                                </p:cTn>
+                              </p:par>
+                            </p:childTnLst>
+                          </p:cTn>
+                        </p:par>
+                      </p:childTnLst>
+                    </p:cTn>
+                  </p:par>
+                  <p:par>
+                    <p:cTn id="13" fill="hold">
+                      <p:stCondLst>
+                        <p:cond delay="indefinite"/>
+                      </p:stCondLst>
+                      <p:childTnLst>
+                        <p:par>
+                          <p:cTn id="14" fill="hold">
+                            <p:stCondLst>
+                              <p:cond delay="0"/>
+                            </p:stCondLst>
+                            <p:childTnLst>
+                              <p:par>
+                                <p:cTn id="15" presetID="10" presetClass="entr" presetSubtype="0" fill="hold" nodeType="clickEffect">
+                                  <p:stCondLst>
+                                    <p:cond delay="0"/>
+                                  </p:stCondLst>
+                                  <p:childTnLst>
+                                    <p:set>
+                                      <p:cBhvr>
+                                        <p:cTn id="16" dur="1" fill="hold">
+                                          <p:stCondLst>
+                                            <p:cond delay="0"/>
+                                          </p:stCondLst>
+                                        </p:cTn>
+                                        <p:tgtEl>
+                                          <p:spTgt spid="3">
+                                            <p:txEl>
+                                              <p:pRg st="1" end="1"/>
+                                            </p:txEl>
+                                          </p:spTgt>
+                                        </p:tgtEl>
+                                        <p:attrNameLst>
+                                          <p:attrName>style.visibility</p:attrName>
+                                        </p:attrNameLst>
+                                      </p:cBhvr>
+                                      <p:to>
+                                        <p:strVal val="visible"/>
+                                      </p:to>
+                                    </p:set>
+                                    <p:animEffect transition="in" filter="fade">
+                                      <p:cBhvr>
+                                        <p:cTn id="17" dur="500"/>
+                                        <p:tgtEl>
+                                          <p:spTgt spid="3">
+                                            <p:txEl>
+                                              <p:pRg st="1" end="1"/>
+                                            </p:txEl>
+                                          </p:spTgt>
+                                        </p:tgtEl>
+                                      </p:cBhvr>
+                                    </p:animEffect>
+                                  </p:childTnLst>
+                                </p:cTn>
+                              </p:par>
+                              <p:par>
+                                <p:cTn id="18" presetID="10" presetClass="entr" presetSubtype="0" fill="hold" nodeType="withEffect">
+                                  <p:stCondLst>
+                                    <p:cond delay="0"/>
+                                  </p:stCondLst>
+                                  <p:childTnLst>
+                                    <p:set>
+                                      <p:cBhvr>
+                                        <p:cTn id="19" dur="1" fill="hold">
+                                          <p:stCondLst>
+                                            <p:cond delay="0"/>
+                                          </p:stCondLst>
+                                        </p:cTn>
+                                        <p:tgtEl>
+                                          <p:spTgt spid="4"/>
+                                        </p:tgtEl>
+                                        <p:attrNameLst>
+                                          <p:attrName>style.visibility</p:attrName>
+                                        </p:attrNameLst>
+                                      </p:cBhvr>
+                                      <p:to>
+                                        <p:strVal val="visible"/>
+                                      </p:to>
+                                    </p:set>
+                                    <p:animEffect transition="in" filter="fade">
+                                      <p:cBhvr>
+                                        <p:cTn id="20" dur="500"/>
+                                        <p:tgtEl>
+                                          <p:spTgt spid="4"/>
+                                        </p:tgtEl>
+                                      </p:cBhvr>
+                                    </p:animEffect>
+                                  </p:childTnLst>
+                                </p:cTn>
+                              </p:par>
+                            </p:childTnLst>
+                          </p:cTn>
+                        </p:par>
+                      </p:childTnLst>
+                    </p:cTn>
+                  </p:par>
+                  <p:par>
+                    <p:cTn id="21" fill="hold">
+                      <p:stCondLst>
+                        <p:cond delay="indefinite"/>
+                      </p:stCondLst>
+                      <p:childTnLst>
+                        <p:par>
+                          <p:cTn id="22" fill="hold">
+                            <p:stCondLst>
+                              <p:cond delay="0"/>
+                            </p:stCondLst>
+                            <p:childTnLst>
+                              <p:par>
+                                <p:cTn id="23" presetID="10" presetClass="exit" presetSubtype="0" fill="hold" nodeType="clickEffect">
+                                  <p:stCondLst>
+                                    <p:cond delay="0"/>
+                                  </p:stCondLst>
+                                  <p:childTnLst>
+                                    <p:animEffect transition="out" filter="fade">
+                                      <p:cBhvr>
+                                        <p:cTn id="24" dur="500"/>
+                                        <p:tgtEl>
+                                          <p:spTgt spid="4"/>
+                                        </p:tgtEl>
+                                      </p:cBhvr>
+                                    </p:animEffect>
+                                    <p:set>
+                                      <p:cBhvr>
+                                        <p:cTn id="25" dur="1" fill="hold">
+                                          <p:stCondLst>
+                                            <p:cond delay="499"/>
+                                          </p:stCondLst>
+                                        </p:cTn>
+                                        <p:tgtEl>
+                                          <p:spTgt spid="4"/>
+                                        </p:tgtEl>
+                                        <p:attrNameLst>
+                                          <p:attrName>style.visibility</p:attrName>
+                                        </p:attrNameLst>
+                                      </p:cBhvr>
+                                      <p:to>
+                                        <p:strVal val="hidden"/>
+                                      </p:to>
+                                    </p:set>
+                                  </p:childTnLst>
+                                </p:cTn>
+                              </p:par>
+                            </p:childTnLst>
+                          </p:cTn>
+                        </p:par>
+                        <p:par>
+                          <p:cTn id="26" fill="hold">
+                            <p:stCondLst>
+                              <p:cond delay="500"/>
+                            </p:stCondLst>
+                            <p:childTnLst>
+                              <p:par>
+                                <p:cTn id="27" presetID="10" presetClass="entr" presetSubtype="0" fill="hold" nodeType="afterEffect">
+                                  <p:stCondLst>
+                                    <p:cond delay="0"/>
+                                  </p:stCondLst>
+                                  <p:childTnLst>
+                                    <p:set>
+                                      <p:cBhvr>
+                                        <p:cTn id="28" dur="1" fill="hold">
+                                          <p:stCondLst>
+                                            <p:cond delay="0"/>
+                                          </p:stCondLst>
+                                        </p:cTn>
+                                        <p:tgtEl>
+                                          <p:spTgt spid="3">
+                                            <p:txEl>
+                                              <p:pRg st="2" end="2"/>
+                                            </p:txEl>
+                                          </p:spTgt>
+                                        </p:tgtEl>
+                                        <p:attrNameLst>
+                                          <p:attrName>style.visibility</p:attrName>
+                                        </p:attrNameLst>
+                                      </p:cBhvr>
+                                      <p:to>
+                                        <p:strVal val="visible"/>
+                                      </p:to>
+                                    </p:set>
+                                    <p:animEffect transition="in" filter="fade">
+                                      <p:cBhvr>
+                                        <p:cTn id="29" dur="500"/>
+                                        <p:tgtEl>
+                                          <p:spTgt spid="3">
+                                            <p:txEl>
+                                              <p:pRg st="2" end="2"/>
+                                            </p:txEl>
+                                          </p:spTgt>
+                                        </p:tgtEl>
+                                      </p:cBhvr>
+                                    </p:animEffect>
+                                  </p:childTnLst>
+                                </p:cTn>
+                              </p:par>
+                              <p:par>
+                                <p:cTn id="30" presetID="10" presetClass="entr" presetSubtype="0" fill="hold" nodeType="withEffect">
+                                  <p:stCondLst>
+                                    <p:cond delay="0"/>
+                                  </p:stCondLst>
+                                  <p:childTnLst>
+                                    <p:set>
+                                      <p:cBhvr>
+                                        <p:cTn id="31" dur="1" fill="hold">
+                                          <p:stCondLst>
+                                            <p:cond delay="0"/>
+                                          </p:stCondLst>
+                                        </p:cTn>
+                                        <p:tgtEl>
+                                          <p:spTgt spid="5"/>
+                                        </p:tgtEl>
+                                        <p:attrNameLst>
+                                          <p:attrName>style.visibility</p:attrName>
+                                        </p:attrNameLst>
+                                      </p:cBhvr>
+                                      <p:to>
+                                        <p:strVal val="visible"/>
+                                      </p:to>
+                                    </p:set>
+                                    <p:animEffect transition="in" filter="fade">
+                                      <p:cBhvr>
+                                        <p:cTn id="32" dur="500"/>
+                                        <p:tgtEl>
+                                          <p:spTgt spid="5"/>
+                                        </p:tgtEl>
+                                      </p:cBhvr>
+                                    </p:animEffect>
+                                  </p:childTnLst>
+                                </p:cTn>
+                              </p:par>
+                            </p:childTnLst>
+                          </p:cTn>
+                        </p:par>
+                      </p:childTnLst>
+                    </p:cTn>
+                  </p:par>
+                  <p:par>
+                    <p:cTn id="33" fill="hold">
+                      <p:stCondLst>
+                        <p:cond delay="indefinite"/>
+                      </p:stCondLst>
+                      <p:childTnLst>
+                        <p:par>
+                          <p:cTn id="34" fill="hold">
+                            <p:stCondLst>
+                              <p:cond delay="0"/>
+                            </p:stCondLst>
+                            <p:childTnLst>
+                              <p:par>
+                                <p:cTn id="35" presetID="10" presetClass="exit" presetSubtype="0" fill="hold" nodeType="clickEffect">
+                                  <p:stCondLst>
+                                    <p:cond delay="0"/>
+                                  </p:stCondLst>
+                                  <p:childTnLst>
+                                    <p:animEffect transition="out" filter="fade">
+                                      <p:cBhvr>
+                                        <p:cTn id="36" dur="500"/>
+                                        <p:tgtEl>
+                                          <p:spTgt spid="5"/>
+                                        </p:tgtEl>
+                                      </p:cBhvr>
+                                    </p:animEffect>
+                                    <p:set>
+                                      <p:cBhvr>
+                                        <p:cTn id="37" dur="1" fill="hold">
+                                          <p:stCondLst>
+                                            <p:cond delay="499"/>
+                                          </p:stCondLst>
+                                        </p:cTn>
+                                        <p:tgtEl>
+                                          <p:spTgt spid="5"/>
+                                        </p:tgtEl>
+                                        <p:attrNameLst>
+                                          <p:attrName>style.visibility</p:attrName>
+                                        </p:attrNameLst>
+                                      </p:cBhvr>
+                                      <p:to>
+                                        <p:strVal val="hidden"/>
+                                      </p:to>
+                                    </p:set>
+                                  </p:childTnLst>
+                                </p:cTn>
+                              </p:par>
+                            </p:childTnLst>
+                          </p:cTn>
+                        </p:par>
+                        <p:par>
+                          <p:cTn id="38" fill="hold">
+                            <p:stCondLst>
+                              <p:cond delay="500"/>
+                            </p:stCondLst>
+                            <p:childTnLst>
+                              <p:par>
+                                <p:cTn id="39" presetID="10" presetClass="entr" presetSubtype="0" fill="hold" nodeType="afterEffect">
+                                  <p:stCondLst>
+                                    <p:cond delay="0"/>
+                                  </p:stCondLst>
+                                  <p:childTnLst>
+                                    <p:set>
+                                      <p:cBhvr>
+                                        <p:cTn id="40" dur="1" fill="hold">
+                                          <p:stCondLst>
+                                            <p:cond delay="0"/>
+                                          </p:stCondLst>
+                                        </p:cTn>
+                                        <p:tgtEl>
+                                          <p:spTgt spid="3">
+                                            <p:txEl>
+                                              <p:pRg st="3" end="3"/>
+                                            </p:txEl>
+                                          </p:spTgt>
+                                        </p:tgtEl>
+                                        <p:attrNameLst>
+                                          <p:attrName>style.visibility</p:attrName>
+                                        </p:attrNameLst>
+                                      </p:cBhvr>
+                                      <p:to>
+                                        <p:strVal val="visible"/>
+                                      </p:to>
+                                    </p:set>
+                                    <p:animEffect transition="in" filter="fade">
+                                      <p:cBhvr>
+                                        <p:cTn id="41" dur="500"/>
+                                        <p:tgtEl>
+                                          <p:spTgt spid="3">
+                                            <p:txEl>
+                                              <p:pRg st="3" end="3"/>
+                                            </p:txEl>
+                                          </p:spTgt>
+                                        </p:tgtEl>
+                                      </p:cBhvr>
+                                    </p:animEffect>
+                                  </p:childTnLst>
+                                </p:cTn>
+                              </p:par>
+                              <p:par>
+                                <p:cTn id="42" presetID="10" presetClass="entr" presetSubtype="0" fill="hold" nodeType="withEffect">
+                                  <p:stCondLst>
+                                    <p:cond delay="0"/>
+                                  </p:stCondLst>
+                                  <p:childTnLst>
+                                    <p:set>
+                                      <p:cBhvr>
+                                        <p:cTn id="43" dur="1" fill="hold">
+                                          <p:stCondLst>
+                                            <p:cond delay="0"/>
+                                          </p:stCondLst>
+                                        </p:cTn>
+                                        <p:tgtEl>
+                                          <p:spTgt spid="6"/>
+                                        </p:tgtEl>
+                                        <p:attrNameLst>
+                                          <p:attrName>style.visibility</p:attrName>
+                                        </p:attrNameLst>
+                                      </p:cBhvr>
+                                      <p:to>
+                                        <p:strVal val="visible"/>
+                                      </p:to>
+                                    </p:set>
+                                    <p:animEffect transition="in" filter="fade">
+                                      <p:cBhvr>
+                                        <p:cTn id="44" dur="500"/>
+                                        <p:tgtEl>
+                                          <p:spTgt spid="6"/>
+                                        </p:tgtEl>
+                                      </p:cBhvr>
+                                    </p:animEffect>
+                                  </p:childTnLst>
+                                </p:cTn>
+                              </p:par>
+                            </p:childTnLst>
+                          </p:cTn>
+                        </p:par>
+                      </p:childTnLst>
+                    </p:cTn>
+                  </p:par>
+                </p:childTnLst>
+              </p:cTn>
+              <p:prevCondLst>
+                <p:cond evt="onPrev" delay="0">
+                  <p:tgtEl>
+                    <p:sldTgt/>
+                  </p:tgtEl>
+                </p:cond>
+              </p:prevCondLst>
+              <p:nextCondLst>
+                <p:cond evt="onNext" delay="0">
+                  <p:tgtEl>
+                    <p:sldTgt/>
+                  </p:tgtEl>
+                </p:cond>
+              </p:nextCondLst>
+            </p:seq>
+          </p:childTnLst>
+        </p:cTn>
+      </p:par>
+    </p:tnLst>
+    <p:bldLst>
+      <p:bldP spid="2" grpId="0"/>
+    </p:bldLst>
+  </p:timing>
 </p:sld>
 </file>
 
@@ -6326,6 +7752,477 @@
   <p:clrMapOvr>
     <a:masterClrMapping/>
   </p:clrMapOvr>
+  <mc:AlternateContent xmlns:mc="http://schemas.openxmlformats.org/markup-compatibility/2006">
+    <mc:Choice xmlns:p14="http://schemas.microsoft.com/office/powerpoint/2010/main" Requires="p14">
+      <p:transition spd="slow">
+        <p14:flash/>
+      </p:transition>
+    </mc:Choice>
+    <mc:Fallback>
+      <p:transition spd="slow">
+        <p:fade/>
+      </p:transition>
+    </mc:Fallback>
+  </mc:AlternateContent>
+  <p:timing>
+    <p:tnLst>
+      <p:par>
+        <p:cTn id="1" dur="indefinite" restart="never" nodeType="tmRoot">
+          <p:childTnLst>
+            <p:seq concurrent="1" nextAc="seek">
+              <p:cTn id="2" dur="indefinite" nodeType="mainSeq">
+                <p:childTnLst>
+                  <p:par>
+                    <p:cTn id="3" fill="hold">
+                      <p:stCondLst>
+                        <p:cond delay="indefinite"/>
+                        <p:cond evt="onBegin" delay="0">
+                          <p:tn val="2"/>
+                        </p:cond>
+                      </p:stCondLst>
+                      <p:childTnLst>
+                        <p:par>
+                          <p:cTn id="4" fill="hold">
+                            <p:stCondLst>
+                              <p:cond delay="0"/>
+                            </p:stCondLst>
+                            <p:childTnLst>
+                              <p:par>
+                                <p:cTn id="5" presetID="10" presetClass="entr" presetSubtype="0" fill="hold" grpId="0" nodeType="withEffect">
+                                  <p:stCondLst>
+                                    <p:cond delay="0"/>
+                                  </p:stCondLst>
+                                  <p:childTnLst>
+                                    <p:set>
+                                      <p:cBhvr>
+                                        <p:cTn id="6" dur="1" fill="hold">
+                                          <p:stCondLst>
+                                            <p:cond delay="0"/>
+                                          </p:stCondLst>
+                                        </p:cTn>
+                                        <p:tgtEl>
+                                          <p:spTgt spid="2"/>
+                                        </p:tgtEl>
+                                        <p:attrNameLst>
+                                          <p:attrName>style.visibility</p:attrName>
+                                        </p:attrNameLst>
+                                      </p:cBhvr>
+                                      <p:to>
+                                        <p:strVal val="visible"/>
+                                      </p:to>
+                                    </p:set>
+                                    <p:animEffect transition="in" filter="fade">
+                                      <p:cBhvr>
+                                        <p:cTn id="7" dur="500"/>
+                                        <p:tgtEl>
+                                          <p:spTgt spid="2"/>
+                                        </p:tgtEl>
+                                      </p:cBhvr>
+                                    </p:animEffect>
+                                  </p:childTnLst>
+                                </p:cTn>
+                              </p:par>
+                            </p:childTnLst>
+                          </p:cTn>
+                        </p:par>
+                      </p:childTnLst>
+                    </p:cTn>
+                  </p:par>
+                  <p:par>
+                    <p:cTn id="8" fill="hold">
+                      <p:stCondLst>
+                        <p:cond delay="indefinite"/>
+                      </p:stCondLst>
+                      <p:childTnLst>
+                        <p:par>
+                          <p:cTn id="9" fill="hold">
+                            <p:stCondLst>
+                              <p:cond delay="0"/>
+                            </p:stCondLst>
+                            <p:childTnLst>
+                              <p:par>
+                                <p:cTn id="10" presetID="10" presetClass="entr" presetSubtype="0" fill="hold" nodeType="clickEffect">
+                                  <p:stCondLst>
+                                    <p:cond delay="0"/>
+                                  </p:stCondLst>
+                                  <p:childTnLst>
+                                    <p:set>
+                                      <p:cBhvr>
+                                        <p:cTn id="11" dur="1" fill="hold">
+                                          <p:stCondLst>
+                                            <p:cond delay="0"/>
+                                          </p:stCondLst>
+                                        </p:cTn>
+                                        <p:tgtEl>
+                                          <p:spTgt spid="3">
+                                            <p:txEl>
+                                              <p:pRg st="0" end="0"/>
+                                            </p:txEl>
+                                          </p:spTgt>
+                                        </p:tgtEl>
+                                        <p:attrNameLst>
+                                          <p:attrName>style.visibility</p:attrName>
+                                        </p:attrNameLst>
+                                      </p:cBhvr>
+                                      <p:to>
+                                        <p:strVal val="visible"/>
+                                      </p:to>
+                                    </p:set>
+                                    <p:animEffect transition="in" filter="fade">
+                                      <p:cBhvr>
+                                        <p:cTn id="12" dur="500"/>
+                                        <p:tgtEl>
+                                          <p:spTgt spid="3">
+                                            <p:txEl>
+                                              <p:pRg st="0" end="0"/>
+                                            </p:txEl>
+                                          </p:spTgt>
+                                        </p:tgtEl>
+                                      </p:cBhvr>
+                                    </p:animEffect>
+                                  </p:childTnLst>
+                                </p:cTn>
+                              </p:par>
+                            </p:childTnLst>
+                          </p:cTn>
+                        </p:par>
+                      </p:childTnLst>
+                    </p:cTn>
+                  </p:par>
+                  <p:par>
+                    <p:cTn id="13" fill="hold">
+                      <p:stCondLst>
+                        <p:cond delay="indefinite"/>
+                      </p:stCondLst>
+                      <p:childTnLst>
+                        <p:par>
+                          <p:cTn id="14" fill="hold">
+                            <p:stCondLst>
+                              <p:cond delay="0"/>
+                            </p:stCondLst>
+                            <p:childTnLst>
+                              <p:par>
+                                <p:cTn id="15" presetID="2" presetClass="entr" presetSubtype="4" fill="hold" nodeType="clickEffect">
+                                  <p:stCondLst>
+                                    <p:cond delay="0"/>
+                                  </p:stCondLst>
+                                  <p:childTnLst>
+                                    <p:set>
+                                      <p:cBhvr>
+                                        <p:cTn id="16" dur="1" fill="hold">
+                                          <p:stCondLst>
+                                            <p:cond delay="0"/>
+                                          </p:stCondLst>
+                                        </p:cTn>
+                                        <p:tgtEl>
+                                          <p:spTgt spid="3">
+                                            <p:txEl>
+                                              <p:pRg st="1" end="1"/>
+                                            </p:txEl>
+                                          </p:spTgt>
+                                        </p:tgtEl>
+                                        <p:attrNameLst>
+                                          <p:attrName>style.visibility</p:attrName>
+                                        </p:attrNameLst>
+                                      </p:cBhvr>
+                                      <p:to>
+                                        <p:strVal val="visible"/>
+                                      </p:to>
+                                    </p:set>
+                                    <p:anim calcmode="lin" valueType="num">
+                                      <p:cBhvr additive="base">
+                                        <p:cTn id="17" dur="500" fill="hold"/>
+                                        <p:tgtEl>
+                                          <p:spTgt spid="3">
+                                            <p:txEl>
+                                              <p:pRg st="1" end="1"/>
+                                            </p:txEl>
+                                          </p:spTgt>
+                                        </p:tgtEl>
+                                        <p:attrNameLst>
+                                          <p:attrName>ppt_x</p:attrName>
+                                        </p:attrNameLst>
+                                      </p:cBhvr>
+                                      <p:tavLst>
+                                        <p:tav tm="0">
+                                          <p:val>
+                                            <p:strVal val="#ppt_x"/>
+                                          </p:val>
+                                        </p:tav>
+                                        <p:tav tm="100000">
+                                          <p:val>
+                                            <p:strVal val="#ppt_x"/>
+                                          </p:val>
+                                        </p:tav>
+                                      </p:tavLst>
+                                    </p:anim>
+                                    <p:anim calcmode="lin" valueType="num">
+                                      <p:cBhvr additive="base">
+                                        <p:cTn id="18" dur="500" fill="hold"/>
+                                        <p:tgtEl>
+                                          <p:spTgt spid="3">
+                                            <p:txEl>
+                                              <p:pRg st="1" end="1"/>
+                                            </p:txEl>
+                                          </p:spTgt>
+                                        </p:tgtEl>
+                                        <p:attrNameLst>
+                                          <p:attrName>ppt_y</p:attrName>
+                                        </p:attrNameLst>
+                                      </p:cBhvr>
+                                      <p:tavLst>
+                                        <p:tav tm="0">
+                                          <p:val>
+                                            <p:strVal val="1+#ppt_h/2"/>
+                                          </p:val>
+                                        </p:tav>
+                                        <p:tav tm="100000">
+                                          <p:val>
+                                            <p:strVal val="#ppt_y"/>
+                                          </p:val>
+                                        </p:tav>
+                                      </p:tavLst>
+                                    </p:anim>
+                                  </p:childTnLst>
+                                </p:cTn>
+                              </p:par>
+                            </p:childTnLst>
+                          </p:cTn>
+                        </p:par>
+                      </p:childTnLst>
+                    </p:cTn>
+                  </p:par>
+                  <p:par>
+                    <p:cTn id="19" fill="hold">
+                      <p:stCondLst>
+                        <p:cond delay="indefinite"/>
+                      </p:stCondLst>
+                      <p:childTnLst>
+                        <p:par>
+                          <p:cTn id="20" fill="hold">
+                            <p:stCondLst>
+                              <p:cond delay="0"/>
+                            </p:stCondLst>
+                            <p:childTnLst>
+                              <p:par>
+                                <p:cTn id="21" presetID="2" presetClass="entr" presetSubtype="4" fill="hold" nodeType="clickEffect">
+                                  <p:stCondLst>
+                                    <p:cond delay="0"/>
+                                  </p:stCondLst>
+                                  <p:childTnLst>
+                                    <p:set>
+                                      <p:cBhvr>
+                                        <p:cTn id="22" dur="1" fill="hold">
+                                          <p:stCondLst>
+                                            <p:cond delay="0"/>
+                                          </p:stCondLst>
+                                        </p:cTn>
+                                        <p:tgtEl>
+                                          <p:spTgt spid="3">
+                                            <p:txEl>
+                                              <p:pRg st="2" end="2"/>
+                                            </p:txEl>
+                                          </p:spTgt>
+                                        </p:tgtEl>
+                                        <p:attrNameLst>
+                                          <p:attrName>style.visibility</p:attrName>
+                                        </p:attrNameLst>
+                                      </p:cBhvr>
+                                      <p:to>
+                                        <p:strVal val="visible"/>
+                                      </p:to>
+                                    </p:set>
+                                    <p:anim calcmode="lin" valueType="num">
+                                      <p:cBhvr additive="base">
+                                        <p:cTn id="23" dur="500" fill="hold"/>
+                                        <p:tgtEl>
+                                          <p:spTgt spid="3">
+                                            <p:txEl>
+                                              <p:pRg st="2" end="2"/>
+                                            </p:txEl>
+                                          </p:spTgt>
+                                        </p:tgtEl>
+                                        <p:attrNameLst>
+                                          <p:attrName>ppt_x</p:attrName>
+                                        </p:attrNameLst>
+                                      </p:cBhvr>
+                                      <p:tavLst>
+                                        <p:tav tm="0">
+                                          <p:val>
+                                            <p:strVal val="#ppt_x"/>
+                                          </p:val>
+                                        </p:tav>
+                                        <p:tav tm="100000">
+                                          <p:val>
+                                            <p:strVal val="#ppt_x"/>
+                                          </p:val>
+                                        </p:tav>
+                                      </p:tavLst>
+                                    </p:anim>
+                                    <p:anim calcmode="lin" valueType="num">
+                                      <p:cBhvr additive="base">
+                                        <p:cTn id="24" dur="500" fill="hold"/>
+                                        <p:tgtEl>
+                                          <p:spTgt spid="3">
+                                            <p:txEl>
+                                              <p:pRg st="2" end="2"/>
+                                            </p:txEl>
+                                          </p:spTgt>
+                                        </p:tgtEl>
+                                        <p:attrNameLst>
+                                          <p:attrName>ppt_y</p:attrName>
+                                        </p:attrNameLst>
+                                      </p:cBhvr>
+                                      <p:tavLst>
+                                        <p:tav tm="0">
+                                          <p:val>
+                                            <p:strVal val="1+#ppt_h/2"/>
+                                          </p:val>
+                                        </p:tav>
+                                        <p:tav tm="100000">
+                                          <p:val>
+                                            <p:strVal val="#ppt_y"/>
+                                          </p:val>
+                                        </p:tav>
+                                      </p:tavLst>
+                                    </p:anim>
+                                  </p:childTnLst>
+                                </p:cTn>
+                              </p:par>
+                            </p:childTnLst>
+                          </p:cTn>
+                        </p:par>
+                      </p:childTnLst>
+                    </p:cTn>
+                  </p:par>
+                  <p:par>
+                    <p:cTn id="25" fill="hold">
+                      <p:stCondLst>
+                        <p:cond delay="indefinite"/>
+                      </p:stCondLst>
+                      <p:childTnLst>
+                        <p:par>
+                          <p:cTn id="26" fill="hold">
+                            <p:stCondLst>
+                              <p:cond delay="0"/>
+                            </p:stCondLst>
+                            <p:childTnLst>
+                              <p:par>
+                                <p:cTn id="27" presetID="2" presetClass="entr" presetSubtype="4" fill="hold" nodeType="clickEffect">
+                                  <p:stCondLst>
+                                    <p:cond delay="0"/>
+                                  </p:stCondLst>
+                                  <p:childTnLst>
+                                    <p:set>
+                                      <p:cBhvr>
+                                        <p:cTn id="28" dur="1" fill="hold">
+                                          <p:stCondLst>
+                                            <p:cond delay="0"/>
+                                          </p:stCondLst>
+                                        </p:cTn>
+                                        <p:tgtEl>
+                                          <p:spTgt spid="3">
+                                            <p:txEl>
+                                              <p:pRg st="3" end="3"/>
+                                            </p:txEl>
+                                          </p:spTgt>
+                                        </p:tgtEl>
+                                        <p:attrNameLst>
+                                          <p:attrName>style.visibility</p:attrName>
+                                        </p:attrNameLst>
+                                      </p:cBhvr>
+                                      <p:to>
+                                        <p:strVal val="visible"/>
+                                      </p:to>
+                                    </p:set>
+                                    <p:anim calcmode="lin" valueType="num">
+                                      <p:cBhvr additive="base">
+                                        <p:cTn id="29" dur="500" fill="hold"/>
+                                        <p:tgtEl>
+                                          <p:spTgt spid="3">
+                                            <p:txEl>
+                                              <p:pRg st="3" end="3"/>
+                                            </p:txEl>
+                                          </p:spTgt>
+                                        </p:tgtEl>
+                                        <p:attrNameLst>
+                                          <p:attrName>ppt_x</p:attrName>
+                                        </p:attrNameLst>
+                                      </p:cBhvr>
+                                      <p:tavLst>
+                                        <p:tav tm="0">
+                                          <p:val>
+                                            <p:strVal val="#ppt_x"/>
+                                          </p:val>
+                                        </p:tav>
+                                        <p:tav tm="100000">
+                                          <p:val>
+                                            <p:strVal val="#ppt_x"/>
+                                          </p:val>
+                                        </p:tav>
+                                      </p:tavLst>
+                                    </p:anim>
+                                    <p:anim calcmode="lin" valueType="num">
+                                      <p:cBhvr additive="base">
+                                        <p:cTn id="30" dur="500" fill="hold"/>
+                                        <p:tgtEl>
+                                          <p:spTgt spid="3">
+                                            <p:txEl>
+                                              <p:pRg st="3" end="3"/>
+                                            </p:txEl>
+                                          </p:spTgt>
+                                        </p:tgtEl>
+                                        <p:attrNameLst>
+                                          <p:attrName>ppt_y</p:attrName>
+                                        </p:attrNameLst>
+                                      </p:cBhvr>
+                                      <p:tavLst>
+                                        <p:tav tm="0">
+                                          <p:val>
+                                            <p:strVal val="1+#ppt_h/2"/>
+                                          </p:val>
+                                        </p:tav>
+                                        <p:tav tm="100000">
+                                          <p:val>
+                                            <p:strVal val="#ppt_y"/>
+                                          </p:val>
+                                        </p:tav>
+                                      </p:tavLst>
+                                    </p:anim>
+                                  </p:childTnLst>
+                                </p:cTn>
+                              </p:par>
+                            </p:childTnLst>
+                          </p:cTn>
+                        </p:par>
+                      </p:childTnLst>
+                    </p:cTn>
+                  </p:par>
+                </p:childTnLst>
+              </p:cTn>
+              <p:prevCondLst>
+                <p:cond evt="onPrev" delay="0">
+                  <p:tgtEl>
+                    <p:sldTgt/>
+                  </p:tgtEl>
+                </p:cond>
+              </p:prevCondLst>
+              <p:nextCondLst>
+                <p:cond evt="onNext" delay="0">
+                  <p:tgtEl>
+                    <p:sldTgt/>
+                  </p:tgtEl>
+                </p:cond>
+              </p:nextCondLst>
+            </p:seq>
+          </p:childTnLst>
+        </p:cTn>
+      </p:par>
+    </p:tnLst>
+    <p:bldLst>
+      <p:bldP spid="2" grpId="0"/>
+    </p:bldLst>
+  </p:timing>
 </p:sld>
 </file>
 
@@ -6446,6 +8343,30 @@
           </a:p>
         </p:txBody>
       </p:sp>
+      <p:pic>
+        <p:nvPicPr>
+          <p:cNvPr id="4" name="Imagem 3"/>
+          <p:cNvPicPr>
+            <a:picLocks noChangeAspect="1"/>
+          </p:cNvPicPr>
+          <p:nvPr/>
+        </p:nvPicPr>
+        <p:blipFill>
+          <a:blip r:embed="rId2"/>
+          <a:stretch>
+            <a:fillRect/>
+          </a:stretch>
+        </p:blipFill>
+        <p:spPr>
+          <a:xfrm>
+            <a:off x="5597037" y="3475892"/>
+            <a:ext cx="2381250" cy="2133600"/>
+          </a:xfrm>
+          <a:prstGeom prst="rect">
+            <a:avLst/>
+          </a:prstGeom>
+        </p:spPr>
+      </p:pic>
     </p:spTree>
     <p:extLst>
       <p:ext uri="{BB962C8B-B14F-4D97-AF65-F5344CB8AC3E}">
@@ -6456,6 +8377,1794 @@
   <p:clrMapOvr>
     <a:masterClrMapping/>
   </p:clrMapOvr>
+  <mc:AlternateContent xmlns:mc="http://schemas.openxmlformats.org/markup-compatibility/2006">
+    <mc:Choice xmlns:p159="http://schemas.microsoft.com/office/powerpoint/2015/09/main" Requires="p159">
+      <p:transition xmlns:p14="http://schemas.microsoft.com/office/powerpoint/2010/main" spd="slow" p14:dur="2000">
+        <p159:morph option="byObject"/>
+      </p:transition>
+    </mc:Choice>
+    <mc:Fallback>
+      <p:transition spd="slow">
+        <p:fade/>
+      </p:transition>
+    </mc:Fallback>
+  </mc:AlternateContent>
+  <p:timing>
+    <p:tnLst>
+      <p:par>
+        <p:cTn id="1" dur="indefinite" restart="never" nodeType="tmRoot">
+          <p:childTnLst>
+            <p:seq concurrent="1" nextAc="seek">
+              <p:cTn id="2" dur="indefinite" nodeType="mainSeq">
+                <p:childTnLst>
+                  <p:par>
+                    <p:cTn id="3" fill="hold">
+                      <p:stCondLst>
+                        <p:cond delay="indefinite"/>
+                        <p:cond evt="onBegin" delay="0">
+                          <p:tn val="2"/>
+                        </p:cond>
+                      </p:stCondLst>
+                      <p:childTnLst>
+                        <p:par>
+                          <p:cTn id="4" fill="hold">
+                            <p:stCondLst>
+                              <p:cond delay="0"/>
+                            </p:stCondLst>
+                            <p:childTnLst>
+                              <p:par>
+                                <p:cTn id="5" presetID="10" presetClass="entr" presetSubtype="0" fill="hold" grpId="0" nodeType="withEffect">
+                                  <p:stCondLst>
+                                    <p:cond delay="0"/>
+                                  </p:stCondLst>
+                                  <p:childTnLst>
+                                    <p:set>
+                                      <p:cBhvr>
+                                        <p:cTn id="6" dur="1" fill="hold">
+                                          <p:stCondLst>
+                                            <p:cond delay="0"/>
+                                          </p:stCondLst>
+                                        </p:cTn>
+                                        <p:tgtEl>
+                                          <p:spTgt spid="2"/>
+                                        </p:tgtEl>
+                                        <p:attrNameLst>
+                                          <p:attrName>style.visibility</p:attrName>
+                                        </p:attrNameLst>
+                                      </p:cBhvr>
+                                      <p:to>
+                                        <p:strVal val="visible"/>
+                                      </p:to>
+                                    </p:set>
+                                    <p:animEffect transition="in" filter="fade">
+                                      <p:cBhvr>
+                                        <p:cTn id="7" dur="500"/>
+                                        <p:tgtEl>
+                                          <p:spTgt spid="2"/>
+                                        </p:tgtEl>
+                                      </p:cBhvr>
+                                    </p:animEffect>
+                                  </p:childTnLst>
+                                </p:cTn>
+                              </p:par>
+                            </p:childTnLst>
+                          </p:cTn>
+                        </p:par>
+                      </p:childTnLst>
+                    </p:cTn>
+                  </p:par>
+                  <p:par>
+                    <p:cTn id="8" fill="hold">
+                      <p:stCondLst>
+                        <p:cond delay="indefinite"/>
+                      </p:stCondLst>
+                      <p:childTnLst>
+                        <p:par>
+                          <p:cTn id="9" fill="hold">
+                            <p:stCondLst>
+                              <p:cond delay="0"/>
+                            </p:stCondLst>
+                            <p:childTnLst>
+                              <p:par>
+                                <p:cTn id="10" presetID="10" presetClass="entr" presetSubtype="0" fill="hold" nodeType="clickEffect">
+                                  <p:stCondLst>
+                                    <p:cond delay="0"/>
+                                  </p:stCondLst>
+                                  <p:childTnLst>
+                                    <p:set>
+                                      <p:cBhvr>
+                                        <p:cTn id="11" dur="1" fill="hold">
+                                          <p:stCondLst>
+                                            <p:cond delay="0"/>
+                                          </p:stCondLst>
+                                        </p:cTn>
+                                        <p:tgtEl>
+                                          <p:spTgt spid="3">
+                                            <p:txEl>
+                                              <p:pRg st="0" end="0"/>
+                                            </p:txEl>
+                                          </p:spTgt>
+                                        </p:tgtEl>
+                                        <p:attrNameLst>
+                                          <p:attrName>style.visibility</p:attrName>
+                                        </p:attrNameLst>
+                                      </p:cBhvr>
+                                      <p:to>
+                                        <p:strVal val="visible"/>
+                                      </p:to>
+                                    </p:set>
+                                    <p:animEffect transition="in" filter="fade">
+                                      <p:cBhvr>
+                                        <p:cTn id="12" dur="500"/>
+                                        <p:tgtEl>
+                                          <p:spTgt spid="3">
+                                            <p:txEl>
+                                              <p:pRg st="0" end="0"/>
+                                            </p:txEl>
+                                          </p:spTgt>
+                                        </p:tgtEl>
+                                      </p:cBhvr>
+                                    </p:animEffect>
+                                  </p:childTnLst>
+                                </p:cTn>
+                              </p:par>
+                              <p:par>
+                                <p:cTn id="13" presetID="31" presetClass="entr" presetSubtype="0" fill="hold" nodeType="withEffect">
+                                  <p:stCondLst>
+                                    <p:cond delay="0"/>
+                                  </p:stCondLst>
+                                  <p:childTnLst>
+                                    <p:set>
+                                      <p:cBhvr>
+                                        <p:cTn id="14" dur="1" fill="hold">
+                                          <p:stCondLst>
+                                            <p:cond delay="0"/>
+                                          </p:stCondLst>
+                                        </p:cTn>
+                                        <p:tgtEl>
+                                          <p:spTgt spid="4"/>
+                                        </p:tgtEl>
+                                        <p:attrNameLst>
+                                          <p:attrName>style.visibility</p:attrName>
+                                        </p:attrNameLst>
+                                      </p:cBhvr>
+                                      <p:to>
+                                        <p:strVal val="visible"/>
+                                      </p:to>
+                                    </p:set>
+                                    <p:anim calcmode="lin" valueType="num">
+                                      <p:cBhvr>
+                                        <p:cTn id="15" dur="1000" fill="hold"/>
+                                        <p:tgtEl>
+                                          <p:spTgt spid="4"/>
+                                        </p:tgtEl>
+                                        <p:attrNameLst>
+                                          <p:attrName>ppt_w</p:attrName>
+                                        </p:attrNameLst>
+                                      </p:cBhvr>
+                                      <p:tavLst>
+                                        <p:tav tm="0">
+                                          <p:val>
+                                            <p:fltVal val="0"/>
+                                          </p:val>
+                                        </p:tav>
+                                        <p:tav tm="100000">
+                                          <p:val>
+                                            <p:strVal val="#ppt_w"/>
+                                          </p:val>
+                                        </p:tav>
+                                      </p:tavLst>
+                                    </p:anim>
+                                    <p:anim calcmode="lin" valueType="num">
+                                      <p:cBhvr>
+                                        <p:cTn id="16" dur="1000" fill="hold"/>
+                                        <p:tgtEl>
+                                          <p:spTgt spid="4"/>
+                                        </p:tgtEl>
+                                        <p:attrNameLst>
+                                          <p:attrName>ppt_h</p:attrName>
+                                        </p:attrNameLst>
+                                      </p:cBhvr>
+                                      <p:tavLst>
+                                        <p:tav tm="0">
+                                          <p:val>
+                                            <p:fltVal val="0"/>
+                                          </p:val>
+                                        </p:tav>
+                                        <p:tav tm="100000">
+                                          <p:val>
+                                            <p:strVal val="#ppt_h"/>
+                                          </p:val>
+                                        </p:tav>
+                                      </p:tavLst>
+                                    </p:anim>
+                                    <p:anim calcmode="lin" valueType="num">
+                                      <p:cBhvr>
+                                        <p:cTn id="17" dur="1000" fill="hold"/>
+                                        <p:tgtEl>
+                                          <p:spTgt spid="4"/>
+                                        </p:tgtEl>
+                                        <p:attrNameLst>
+                                          <p:attrName>style.rotation</p:attrName>
+                                        </p:attrNameLst>
+                                      </p:cBhvr>
+                                      <p:tavLst>
+                                        <p:tav tm="0">
+                                          <p:val>
+                                            <p:fltVal val="90"/>
+                                          </p:val>
+                                        </p:tav>
+                                        <p:tav tm="100000">
+                                          <p:val>
+                                            <p:fltVal val="0"/>
+                                          </p:val>
+                                        </p:tav>
+                                      </p:tavLst>
+                                    </p:anim>
+                                    <p:animEffect transition="in" filter="fade">
+                                      <p:cBhvr>
+                                        <p:cTn id="18" dur="1000"/>
+                                        <p:tgtEl>
+                                          <p:spTgt spid="4"/>
+                                        </p:tgtEl>
+                                      </p:cBhvr>
+                                    </p:animEffect>
+                                  </p:childTnLst>
+                                </p:cTn>
+                              </p:par>
+                            </p:childTnLst>
+                          </p:cTn>
+                        </p:par>
+                      </p:childTnLst>
+                    </p:cTn>
+                  </p:par>
+                  <p:par>
+                    <p:cTn id="19" fill="hold">
+                      <p:stCondLst>
+                        <p:cond delay="indefinite"/>
+                      </p:stCondLst>
+                      <p:childTnLst>
+                        <p:par>
+                          <p:cTn id="20" fill="hold">
+                            <p:stCondLst>
+                              <p:cond delay="0"/>
+                            </p:stCondLst>
+                            <p:childTnLst>
+                              <p:par>
+                                <p:cTn id="21" presetID="10" presetClass="entr" presetSubtype="0" fill="hold" nodeType="clickEffect">
+                                  <p:stCondLst>
+                                    <p:cond delay="0"/>
+                                  </p:stCondLst>
+                                  <p:childTnLst>
+                                    <p:set>
+                                      <p:cBhvr>
+                                        <p:cTn id="22" dur="1" fill="hold">
+                                          <p:stCondLst>
+                                            <p:cond delay="0"/>
+                                          </p:stCondLst>
+                                        </p:cTn>
+                                        <p:tgtEl>
+                                          <p:spTgt spid="3">
+                                            <p:txEl>
+                                              <p:pRg st="2" end="2"/>
+                                            </p:txEl>
+                                          </p:spTgt>
+                                        </p:tgtEl>
+                                        <p:attrNameLst>
+                                          <p:attrName>style.visibility</p:attrName>
+                                        </p:attrNameLst>
+                                      </p:cBhvr>
+                                      <p:to>
+                                        <p:strVal val="visible"/>
+                                      </p:to>
+                                    </p:set>
+                                    <p:animEffect transition="in" filter="fade">
+                                      <p:cBhvr>
+                                        <p:cTn id="23" dur="500"/>
+                                        <p:tgtEl>
+                                          <p:spTgt spid="3">
+                                            <p:txEl>
+                                              <p:pRg st="2" end="2"/>
+                                            </p:txEl>
+                                          </p:spTgt>
+                                        </p:tgtEl>
+                                      </p:cBhvr>
+                                    </p:animEffect>
+                                  </p:childTnLst>
+                                </p:cTn>
+                              </p:par>
+                            </p:childTnLst>
+                          </p:cTn>
+                        </p:par>
+                      </p:childTnLst>
+                    </p:cTn>
+                  </p:par>
+                  <p:par>
+                    <p:cTn id="24" fill="hold">
+                      <p:stCondLst>
+                        <p:cond delay="indefinite"/>
+                      </p:stCondLst>
+                      <p:childTnLst>
+                        <p:par>
+                          <p:cTn id="25" fill="hold">
+                            <p:stCondLst>
+                              <p:cond delay="0"/>
+                            </p:stCondLst>
+                            <p:childTnLst>
+                              <p:par>
+                                <p:cTn id="26" presetID="14" presetClass="entr" presetSubtype="10" fill="hold" nodeType="clickEffect">
+                                  <p:stCondLst>
+                                    <p:cond delay="0"/>
+                                  </p:stCondLst>
+                                  <p:childTnLst>
+                                    <p:set>
+                                      <p:cBhvr>
+                                        <p:cTn id="27" dur="1" fill="hold">
+                                          <p:stCondLst>
+                                            <p:cond delay="0"/>
+                                          </p:stCondLst>
+                                        </p:cTn>
+                                        <p:tgtEl>
+                                          <p:spTgt spid="3">
+                                            <p:txEl>
+                                              <p:pRg st="3" end="3"/>
+                                            </p:txEl>
+                                          </p:spTgt>
+                                        </p:tgtEl>
+                                        <p:attrNameLst>
+                                          <p:attrName>style.visibility</p:attrName>
+                                        </p:attrNameLst>
+                                      </p:cBhvr>
+                                      <p:to>
+                                        <p:strVal val="visible"/>
+                                      </p:to>
+                                    </p:set>
+                                    <p:animEffect transition="in" filter="randombar(horizontal)">
+                                      <p:cBhvr>
+                                        <p:cTn id="28" dur="500"/>
+                                        <p:tgtEl>
+                                          <p:spTgt spid="3">
+                                            <p:txEl>
+                                              <p:pRg st="3" end="3"/>
+                                            </p:txEl>
+                                          </p:spTgt>
+                                        </p:tgtEl>
+                                      </p:cBhvr>
+                                    </p:animEffect>
+                                  </p:childTnLst>
+                                </p:cTn>
+                              </p:par>
+                            </p:childTnLst>
+                          </p:cTn>
+                        </p:par>
+                      </p:childTnLst>
+                    </p:cTn>
+                  </p:par>
+                  <p:par>
+                    <p:cTn id="29" fill="hold">
+                      <p:stCondLst>
+                        <p:cond delay="indefinite"/>
+                      </p:stCondLst>
+                      <p:childTnLst>
+                        <p:par>
+                          <p:cTn id="30" fill="hold">
+                            <p:stCondLst>
+                              <p:cond delay="0"/>
+                            </p:stCondLst>
+                            <p:childTnLst>
+                              <p:par>
+                                <p:cTn id="31" presetID="14" presetClass="entr" presetSubtype="10" fill="hold" nodeType="clickEffect">
+                                  <p:stCondLst>
+                                    <p:cond delay="0"/>
+                                  </p:stCondLst>
+                                  <p:childTnLst>
+                                    <p:set>
+                                      <p:cBhvr>
+                                        <p:cTn id="32" dur="1" fill="hold">
+                                          <p:stCondLst>
+                                            <p:cond delay="0"/>
+                                          </p:stCondLst>
+                                        </p:cTn>
+                                        <p:tgtEl>
+                                          <p:spTgt spid="3">
+                                            <p:txEl>
+                                              <p:pRg st="4" end="4"/>
+                                            </p:txEl>
+                                          </p:spTgt>
+                                        </p:tgtEl>
+                                        <p:attrNameLst>
+                                          <p:attrName>style.visibility</p:attrName>
+                                        </p:attrNameLst>
+                                      </p:cBhvr>
+                                      <p:to>
+                                        <p:strVal val="visible"/>
+                                      </p:to>
+                                    </p:set>
+                                    <p:animEffect transition="in" filter="randombar(horizontal)">
+                                      <p:cBhvr>
+                                        <p:cTn id="33" dur="500"/>
+                                        <p:tgtEl>
+                                          <p:spTgt spid="3">
+                                            <p:txEl>
+                                              <p:pRg st="4" end="4"/>
+                                            </p:txEl>
+                                          </p:spTgt>
+                                        </p:tgtEl>
+                                      </p:cBhvr>
+                                    </p:animEffect>
+                                  </p:childTnLst>
+                                </p:cTn>
+                              </p:par>
+                            </p:childTnLst>
+                          </p:cTn>
+                        </p:par>
+                      </p:childTnLst>
+                    </p:cTn>
+                  </p:par>
+                  <p:par>
+                    <p:cTn id="34" fill="hold">
+                      <p:stCondLst>
+                        <p:cond delay="indefinite"/>
+                      </p:stCondLst>
+                      <p:childTnLst>
+                        <p:par>
+                          <p:cTn id="35" fill="hold">
+                            <p:stCondLst>
+                              <p:cond delay="0"/>
+                            </p:stCondLst>
+                            <p:childTnLst>
+                              <p:par>
+                                <p:cTn id="36" presetID="14" presetClass="entr" presetSubtype="10" fill="hold" nodeType="clickEffect">
+                                  <p:stCondLst>
+                                    <p:cond delay="0"/>
+                                  </p:stCondLst>
+                                  <p:childTnLst>
+                                    <p:set>
+                                      <p:cBhvr>
+                                        <p:cTn id="37" dur="1" fill="hold">
+                                          <p:stCondLst>
+                                            <p:cond delay="0"/>
+                                          </p:stCondLst>
+                                        </p:cTn>
+                                        <p:tgtEl>
+                                          <p:spTgt spid="3">
+                                            <p:txEl>
+                                              <p:pRg st="5" end="5"/>
+                                            </p:txEl>
+                                          </p:spTgt>
+                                        </p:tgtEl>
+                                        <p:attrNameLst>
+                                          <p:attrName>style.visibility</p:attrName>
+                                        </p:attrNameLst>
+                                      </p:cBhvr>
+                                      <p:to>
+                                        <p:strVal val="visible"/>
+                                      </p:to>
+                                    </p:set>
+                                    <p:animEffect transition="in" filter="randombar(horizontal)">
+                                      <p:cBhvr>
+                                        <p:cTn id="38" dur="500"/>
+                                        <p:tgtEl>
+                                          <p:spTgt spid="3">
+                                            <p:txEl>
+                                              <p:pRg st="5" end="5"/>
+                                            </p:txEl>
+                                          </p:spTgt>
+                                        </p:tgtEl>
+                                      </p:cBhvr>
+                                    </p:animEffect>
+                                  </p:childTnLst>
+                                </p:cTn>
+                              </p:par>
+                              <p:par>
+                                <p:cTn id="39" presetID="14" presetClass="entr" presetSubtype="10" fill="hold" nodeType="withEffect">
+                                  <p:stCondLst>
+                                    <p:cond delay="0"/>
+                                  </p:stCondLst>
+                                  <p:childTnLst>
+                                    <p:set>
+                                      <p:cBhvr>
+                                        <p:cTn id="40" dur="1" fill="hold">
+                                          <p:stCondLst>
+                                            <p:cond delay="0"/>
+                                          </p:stCondLst>
+                                        </p:cTn>
+                                        <p:tgtEl>
+                                          <p:spTgt spid="3">
+                                            <p:txEl>
+                                              <p:pRg st="6" end="6"/>
+                                            </p:txEl>
+                                          </p:spTgt>
+                                        </p:tgtEl>
+                                        <p:attrNameLst>
+                                          <p:attrName>style.visibility</p:attrName>
+                                        </p:attrNameLst>
+                                      </p:cBhvr>
+                                      <p:to>
+                                        <p:strVal val="visible"/>
+                                      </p:to>
+                                    </p:set>
+                                    <p:animEffect transition="in" filter="randombar(horizontal)">
+                                      <p:cBhvr>
+                                        <p:cTn id="41" dur="500"/>
+                                        <p:tgtEl>
+                                          <p:spTgt spid="3">
+                                            <p:txEl>
+                                              <p:pRg st="6" end="6"/>
+                                            </p:txEl>
+                                          </p:spTgt>
+                                        </p:tgtEl>
+                                      </p:cBhvr>
+                                    </p:animEffect>
+                                  </p:childTnLst>
+                                </p:cTn>
+                              </p:par>
+                            </p:childTnLst>
+                          </p:cTn>
+                        </p:par>
+                      </p:childTnLst>
+                    </p:cTn>
+                  </p:par>
+                </p:childTnLst>
+              </p:cTn>
+              <p:prevCondLst>
+                <p:cond evt="onPrev" delay="0">
+                  <p:tgtEl>
+                    <p:sldTgt/>
+                  </p:tgtEl>
+                </p:cond>
+              </p:prevCondLst>
+              <p:nextCondLst>
+                <p:cond evt="onNext" delay="0">
+                  <p:tgtEl>
+                    <p:sldTgt/>
+                  </p:tgtEl>
+                </p:cond>
+              </p:nextCondLst>
+            </p:seq>
+          </p:childTnLst>
+        </p:cTn>
+      </p:par>
+    </p:tnLst>
+    <p:bldLst>
+      <p:bldP spid="2" grpId="0"/>
+    </p:bldLst>
+  </p:timing>
+</p:sld>
+</file>
+
+<file path=ppt/slides/slide7.xml><?xml version="1.0" encoding="utf-8"?>
+<p:sld xmlns:a="http://schemas.openxmlformats.org/drawingml/2006/main" xmlns:r="http://schemas.openxmlformats.org/officeDocument/2006/relationships" xmlns:p="http://schemas.openxmlformats.org/presentationml/2006/main">
+  <p:cSld>
+    <p:spTree>
+      <p:nvGrpSpPr>
+        <p:cNvPr id="1" name=""/>
+        <p:cNvGrpSpPr/>
+        <p:nvPr/>
+      </p:nvGrpSpPr>
+      <p:grpSpPr>
+        <a:xfrm>
+          <a:off x="0" y="0"/>
+          <a:ext cx="0" cy="0"/>
+          <a:chOff x="0" y="0"/>
+          <a:chExt cx="0" cy="0"/>
+        </a:xfrm>
+      </p:grpSpPr>
+      <p:sp>
+        <p:nvSpPr>
+          <p:cNvPr id="2" name="Título 1"/>
+          <p:cNvSpPr>
+            <a:spLocks noGrp="1"/>
+          </p:cNvSpPr>
+          <p:nvPr>
+            <p:ph type="title"/>
+          </p:nvPr>
+        </p:nvSpPr>
+        <p:spPr/>
+        <p:txBody>
+          <a:bodyPr/>
+          <a:lstStyle/>
+          <a:p>
+            <a:r>
+              <a:rPr lang="pt-BR" dirty="0"/>
+              <a:t>Desenvolvimento</a:t>
+            </a:r>
+          </a:p>
+        </p:txBody>
+      </p:sp>
+      <p:sp>
+        <p:nvSpPr>
+          <p:cNvPr id="3" name="Espaço Reservado para Conteúdo 2"/>
+          <p:cNvSpPr>
+            <a:spLocks noGrp="1"/>
+          </p:cNvSpPr>
+          <p:nvPr>
+            <p:ph idx="1"/>
+          </p:nvPr>
+        </p:nvSpPr>
+        <p:spPr/>
+        <p:txBody>
+          <a:bodyPr/>
+          <a:lstStyle/>
+          <a:p>
+            <a:pPr>
+              <a:buFont typeface="Wingdings" panose="05000000000000000000" pitchFamily="2" charset="2"/>
+              <a:buChar char="v"/>
+            </a:pPr>
+            <a:r>
+              <a:rPr lang="pt-BR" sz="2400" dirty="0"/>
+              <a:t>Plataforma</a:t>
+            </a:r>
+          </a:p>
+        </p:txBody>
+      </p:sp>
+      <p:pic>
+        <p:nvPicPr>
+          <p:cNvPr id="5" name="Imagem 4"/>
+          <p:cNvPicPr>
+            <a:picLocks noChangeAspect="1"/>
+          </p:cNvPicPr>
+          <p:nvPr/>
+        </p:nvPicPr>
+        <p:blipFill>
+          <a:blip r:embed="rId2"/>
+          <a:stretch>
+            <a:fillRect/>
+          </a:stretch>
+        </p:blipFill>
+        <p:spPr>
+          <a:xfrm>
+            <a:off x="3035707" y="2943225"/>
+            <a:ext cx="3450818" cy="3450818"/>
+          </a:xfrm>
+          <a:prstGeom prst="rect">
+            <a:avLst/>
+          </a:prstGeom>
+        </p:spPr>
+      </p:pic>
+      <p:sp>
+        <p:nvSpPr>
+          <p:cNvPr id="7" name="Espaço Reservado para Conteúdo 2"/>
+          <p:cNvSpPr txBox="1">
+            <a:spLocks/>
+          </p:cNvSpPr>
+          <p:nvPr/>
+        </p:nvSpPr>
+        <p:spPr>
+          <a:xfrm>
+            <a:off x="677334" y="2160589"/>
+            <a:ext cx="8596668" cy="3880773"/>
+          </a:xfrm>
+          <a:prstGeom prst="rect">
+            <a:avLst/>
+          </a:prstGeom>
+        </p:spPr>
+        <p:txBody>
+          <a:bodyPr vert="horz" lIns="91440" tIns="45720" rIns="91440" bIns="45720" rtlCol="0">
+            <a:normAutofit/>
+          </a:bodyPr>
+          <a:lstStyle>
+            <a:lvl1pPr marL="342900" indent="-342900" algn="l" defTabSz="457200" rtl="0" eaLnBrk="1" latinLnBrk="0" hangingPunct="1">
+              <a:spcBef>
+                <a:spcPts val="1000"/>
+              </a:spcBef>
+              <a:spcAft>
+                <a:spcPts val="0"/>
+              </a:spcAft>
+              <a:buClr>
+                <a:schemeClr val="accent1"/>
+              </a:buClr>
+              <a:buSzPct val="80000"/>
+              <a:buFont typeface="Wingdings 3" charset="2"/>
+              <a:buChar char=""/>
+              <a:defRPr sz="1800" kern="1200">
+                <a:solidFill>
+                  <a:schemeClr val="tx1">
+                    <a:lumMod val="75000"/>
+                    <a:lumOff val="25000"/>
+                  </a:schemeClr>
+                </a:solidFill>
+                <a:latin typeface="+mn-lt"/>
+                <a:ea typeface="+mn-ea"/>
+                <a:cs typeface="+mn-cs"/>
+              </a:defRPr>
+            </a:lvl1pPr>
+            <a:lvl2pPr marL="742950" indent="-285750" algn="l" defTabSz="457200" rtl="0" eaLnBrk="1" latinLnBrk="0" hangingPunct="1">
+              <a:spcBef>
+                <a:spcPts val="1000"/>
+              </a:spcBef>
+              <a:spcAft>
+                <a:spcPts val="0"/>
+              </a:spcAft>
+              <a:buClr>
+                <a:schemeClr val="accent1"/>
+              </a:buClr>
+              <a:buSzPct val="80000"/>
+              <a:buFont typeface="Wingdings 3" charset="2"/>
+              <a:buChar char=""/>
+              <a:defRPr sz="1600" kern="1200">
+                <a:solidFill>
+                  <a:schemeClr val="tx1">
+                    <a:lumMod val="75000"/>
+                    <a:lumOff val="25000"/>
+                  </a:schemeClr>
+                </a:solidFill>
+                <a:latin typeface="+mn-lt"/>
+                <a:ea typeface="+mn-ea"/>
+                <a:cs typeface="+mn-cs"/>
+              </a:defRPr>
+            </a:lvl2pPr>
+            <a:lvl3pPr marL="1143000" indent="-228600" algn="l" defTabSz="457200" rtl="0" eaLnBrk="1" latinLnBrk="0" hangingPunct="1">
+              <a:spcBef>
+                <a:spcPts val="1000"/>
+              </a:spcBef>
+              <a:spcAft>
+                <a:spcPts val="0"/>
+              </a:spcAft>
+              <a:buClr>
+                <a:schemeClr val="accent1"/>
+              </a:buClr>
+              <a:buSzPct val="80000"/>
+              <a:buFont typeface="Wingdings 3" charset="2"/>
+              <a:buChar char=""/>
+              <a:defRPr sz="1400" kern="1200">
+                <a:solidFill>
+                  <a:schemeClr val="tx1">
+                    <a:lumMod val="75000"/>
+                    <a:lumOff val="25000"/>
+                  </a:schemeClr>
+                </a:solidFill>
+                <a:latin typeface="+mn-lt"/>
+                <a:ea typeface="+mn-ea"/>
+                <a:cs typeface="+mn-cs"/>
+              </a:defRPr>
+            </a:lvl3pPr>
+            <a:lvl4pPr marL="1600200" indent="-228600" algn="l" defTabSz="457200" rtl="0" eaLnBrk="1" latinLnBrk="0" hangingPunct="1">
+              <a:spcBef>
+                <a:spcPts val="1000"/>
+              </a:spcBef>
+              <a:spcAft>
+                <a:spcPts val="0"/>
+              </a:spcAft>
+              <a:buClr>
+                <a:schemeClr val="accent1"/>
+              </a:buClr>
+              <a:buSzPct val="80000"/>
+              <a:buFont typeface="Wingdings 3" charset="2"/>
+              <a:buChar char=""/>
+              <a:defRPr sz="1200" kern="1200">
+                <a:solidFill>
+                  <a:schemeClr val="tx1">
+                    <a:lumMod val="75000"/>
+                    <a:lumOff val="25000"/>
+                  </a:schemeClr>
+                </a:solidFill>
+                <a:latin typeface="+mn-lt"/>
+                <a:ea typeface="+mn-ea"/>
+                <a:cs typeface="+mn-cs"/>
+              </a:defRPr>
+            </a:lvl4pPr>
+            <a:lvl5pPr marL="2057400" indent="-228600" algn="l" defTabSz="457200" rtl="0" eaLnBrk="1" latinLnBrk="0" hangingPunct="1">
+              <a:spcBef>
+                <a:spcPts val="1000"/>
+              </a:spcBef>
+              <a:spcAft>
+                <a:spcPts val="0"/>
+              </a:spcAft>
+              <a:buClr>
+                <a:schemeClr val="accent1"/>
+              </a:buClr>
+              <a:buSzPct val="80000"/>
+              <a:buFont typeface="Wingdings 3" charset="2"/>
+              <a:buChar char=""/>
+              <a:defRPr sz="1200" kern="1200">
+                <a:solidFill>
+                  <a:schemeClr val="tx1">
+                    <a:lumMod val="75000"/>
+                    <a:lumOff val="25000"/>
+                  </a:schemeClr>
+                </a:solidFill>
+                <a:latin typeface="+mn-lt"/>
+                <a:ea typeface="+mn-ea"/>
+                <a:cs typeface="+mn-cs"/>
+              </a:defRPr>
+            </a:lvl5pPr>
+            <a:lvl6pPr marL="2514600" indent="-228600" algn="l" defTabSz="457200" rtl="0" eaLnBrk="1" latinLnBrk="0" hangingPunct="1">
+              <a:spcBef>
+                <a:spcPts val="1000"/>
+              </a:spcBef>
+              <a:spcAft>
+                <a:spcPts val="0"/>
+              </a:spcAft>
+              <a:buClr>
+                <a:schemeClr val="accent1"/>
+              </a:buClr>
+              <a:buSzPct val="80000"/>
+              <a:buFont typeface="Wingdings 3" charset="2"/>
+              <a:buChar char=""/>
+              <a:defRPr sz="1200" kern="1200">
+                <a:solidFill>
+                  <a:schemeClr val="tx1">
+                    <a:lumMod val="75000"/>
+                    <a:lumOff val="25000"/>
+                  </a:schemeClr>
+                </a:solidFill>
+                <a:latin typeface="+mn-lt"/>
+                <a:ea typeface="+mn-ea"/>
+                <a:cs typeface="+mn-cs"/>
+              </a:defRPr>
+            </a:lvl6pPr>
+            <a:lvl7pPr marL="2971800" indent="-228600" algn="l" defTabSz="457200" rtl="0" eaLnBrk="1" latinLnBrk="0" hangingPunct="1">
+              <a:spcBef>
+                <a:spcPts val="1000"/>
+              </a:spcBef>
+              <a:spcAft>
+                <a:spcPts val="0"/>
+              </a:spcAft>
+              <a:buClr>
+                <a:schemeClr val="accent1"/>
+              </a:buClr>
+              <a:buSzPct val="80000"/>
+              <a:buFont typeface="Wingdings 3" charset="2"/>
+              <a:buChar char=""/>
+              <a:defRPr sz="1200" kern="1200">
+                <a:solidFill>
+                  <a:schemeClr val="tx1">
+                    <a:lumMod val="75000"/>
+                    <a:lumOff val="25000"/>
+                  </a:schemeClr>
+                </a:solidFill>
+                <a:latin typeface="+mn-lt"/>
+                <a:ea typeface="+mn-ea"/>
+                <a:cs typeface="+mn-cs"/>
+              </a:defRPr>
+            </a:lvl7pPr>
+            <a:lvl8pPr marL="3429000" indent="-228600" algn="l" defTabSz="457200" rtl="0" eaLnBrk="1" latinLnBrk="0" hangingPunct="1">
+              <a:spcBef>
+                <a:spcPts val="1000"/>
+              </a:spcBef>
+              <a:spcAft>
+                <a:spcPts val="0"/>
+              </a:spcAft>
+              <a:buClr>
+                <a:schemeClr val="accent1"/>
+              </a:buClr>
+              <a:buSzPct val="80000"/>
+              <a:buFont typeface="Wingdings 3" charset="2"/>
+              <a:buChar char=""/>
+              <a:defRPr sz="1200" kern="1200">
+                <a:solidFill>
+                  <a:schemeClr val="tx1">
+                    <a:lumMod val="75000"/>
+                    <a:lumOff val="25000"/>
+                  </a:schemeClr>
+                </a:solidFill>
+                <a:latin typeface="+mn-lt"/>
+                <a:ea typeface="+mn-ea"/>
+                <a:cs typeface="+mn-cs"/>
+              </a:defRPr>
+            </a:lvl8pPr>
+            <a:lvl9pPr marL="3886200" indent="-228600" algn="l" defTabSz="457200" rtl="0" eaLnBrk="1" latinLnBrk="0" hangingPunct="1">
+              <a:spcBef>
+                <a:spcPts val="1000"/>
+              </a:spcBef>
+              <a:spcAft>
+                <a:spcPts val="0"/>
+              </a:spcAft>
+              <a:buClr>
+                <a:schemeClr val="accent1"/>
+              </a:buClr>
+              <a:buSzPct val="80000"/>
+              <a:buFont typeface="Wingdings 3" charset="2"/>
+              <a:buChar char=""/>
+              <a:defRPr sz="1200" kern="1200">
+                <a:solidFill>
+                  <a:schemeClr val="tx1">
+                    <a:lumMod val="75000"/>
+                    <a:lumOff val="25000"/>
+                  </a:schemeClr>
+                </a:solidFill>
+                <a:latin typeface="+mn-lt"/>
+                <a:ea typeface="+mn-ea"/>
+                <a:cs typeface="+mn-cs"/>
+              </a:defRPr>
+            </a:lvl9pPr>
+          </a:lstStyle>
+          <a:p>
+            <a:pPr>
+              <a:buFont typeface="Wingdings" panose="05000000000000000000" pitchFamily="2" charset="2"/>
+              <a:buChar char="v"/>
+            </a:pPr>
+            <a:r>
+              <a:rPr lang="pt-BR" sz="2400" dirty="0"/>
+              <a:t>Ambiente</a:t>
+            </a:r>
+          </a:p>
+        </p:txBody>
+      </p:sp>
+      <p:pic>
+        <p:nvPicPr>
+          <p:cNvPr id="8" name="Imagem 7"/>
+          <p:cNvPicPr>
+            <a:picLocks noChangeAspect="1"/>
+          </p:cNvPicPr>
+          <p:nvPr/>
+        </p:nvPicPr>
+        <p:blipFill>
+          <a:blip r:embed="rId3"/>
+          <a:stretch>
+            <a:fillRect/>
+          </a:stretch>
+        </p:blipFill>
+        <p:spPr>
+          <a:xfrm>
+            <a:off x="2851353" y="2654426"/>
+            <a:ext cx="3819525" cy="3819525"/>
+          </a:xfrm>
+          <a:prstGeom prst="rect">
+            <a:avLst/>
+          </a:prstGeom>
+        </p:spPr>
+      </p:pic>
+      <p:sp>
+        <p:nvSpPr>
+          <p:cNvPr id="9" name="Espaço Reservado para Conteúdo 2"/>
+          <p:cNvSpPr txBox="1">
+            <a:spLocks/>
+          </p:cNvSpPr>
+          <p:nvPr/>
+        </p:nvSpPr>
+        <p:spPr>
+          <a:xfrm>
+            <a:off x="677334" y="2160589"/>
+            <a:ext cx="8596668" cy="3880773"/>
+          </a:xfrm>
+          <a:prstGeom prst="rect">
+            <a:avLst/>
+          </a:prstGeom>
+        </p:spPr>
+        <p:txBody>
+          <a:bodyPr vert="horz" lIns="91440" tIns="45720" rIns="91440" bIns="45720" rtlCol="0">
+            <a:normAutofit/>
+          </a:bodyPr>
+          <a:lstStyle>
+            <a:lvl1pPr marL="342900" indent="-342900" algn="l" defTabSz="457200" rtl="0" eaLnBrk="1" latinLnBrk="0" hangingPunct="1">
+              <a:spcBef>
+                <a:spcPts val="1000"/>
+              </a:spcBef>
+              <a:spcAft>
+                <a:spcPts val="0"/>
+              </a:spcAft>
+              <a:buClr>
+                <a:schemeClr val="accent1"/>
+              </a:buClr>
+              <a:buSzPct val="80000"/>
+              <a:buFont typeface="Wingdings 3" charset="2"/>
+              <a:buChar char=""/>
+              <a:defRPr sz="1800" kern="1200">
+                <a:solidFill>
+                  <a:schemeClr val="tx1">
+                    <a:lumMod val="75000"/>
+                    <a:lumOff val="25000"/>
+                  </a:schemeClr>
+                </a:solidFill>
+                <a:latin typeface="+mn-lt"/>
+                <a:ea typeface="+mn-ea"/>
+                <a:cs typeface="+mn-cs"/>
+              </a:defRPr>
+            </a:lvl1pPr>
+            <a:lvl2pPr marL="742950" indent="-285750" algn="l" defTabSz="457200" rtl="0" eaLnBrk="1" latinLnBrk="0" hangingPunct="1">
+              <a:spcBef>
+                <a:spcPts val="1000"/>
+              </a:spcBef>
+              <a:spcAft>
+                <a:spcPts val="0"/>
+              </a:spcAft>
+              <a:buClr>
+                <a:schemeClr val="accent1"/>
+              </a:buClr>
+              <a:buSzPct val="80000"/>
+              <a:buFont typeface="Wingdings 3" charset="2"/>
+              <a:buChar char=""/>
+              <a:defRPr sz="1600" kern="1200">
+                <a:solidFill>
+                  <a:schemeClr val="tx1">
+                    <a:lumMod val="75000"/>
+                    <a:lumOff val="25000"/>
+                  </a:schemeClr>
+                </a:solidFill>
+                <a:latin typeface="+mn-lt"/>
+                <a:ea typeface="+mn-ea"/>
+                <a:cs typeface="+mn-cs"/>
+              </a:defRPr>
+            </a:lvl2pPr>
+            <a:lvl3pPr marL="1143000" indent="-228600" algn="l" defTabSz="457200" rtl="0" eaLnBrk="1" latinLnBrk="0" hangingPunct="1">
+              <a:spcBef>
+                <a:spcPts val="1000"/>
+              </a:spcBef>
+              <a:spcAft>
+                <a:spcPts val="0"/>
+              </a:spcAft>
+              <a:buClr>
+                <a:schemeClr val="accent1"/>
+              </a:buClr>
+              <a:buSzPct val="80000"/>
+              <a:buFont typeface="Wingdings 3" charset="2"/>
+              <a:buChar char=""/>
+              <a:defRPr sz="1400" kern="1200">
+                <a:solidFill>
+                  <a:schemeClr val="tx1">
+                    <a:lumMod val="75000"/>
+                    <a:lumOff val="25000"/>
+                  </a:schemeClr>
+                </a:solidFill>
+                <a:latin typeface="+mn-lt"/>
+                <a:ea typeface="+mn-ea"/>
+                <a:cs typeface="+mn-cs"/>
+              </a:defRPr>
+            </a:lvl3pPr>
+            <a:lvl4pPr marL="1600200" indent="-228600" algn="l" defTabSz="457200" rtl="0" eaLnBrk="1" latinLnBrk="0" hangingPunct="1">
+              <a:spcBef>
+                <a:spcPts val="1000"/>
+              </a:spcBef>
+              <a:spcAft>
+                <a:spcPts val="0"/>
+              </a:spcAft>
+              <a:buClr>
+                <a:schemeClr val="accent1"/>
+              </a:buClr>
+              <a:buSzPct val="80000"/>
+              <a:buFont typeface="Wingdings 3" charset="2"/>
+              <a:buChar char=""/>
+              <a:defRPr sz="1200" kern="1200">
+                <a:solidFill>
+                  <a:schemeClr val="tx1">
+                    <a:lumMod val="75000"/>
+                    <a:lumOff val="25000"/>
+                  </a:schemeClr>
+                </a:solidFill>
+                <a:latin typeface="+mn-lt"/>
+                <a:ea typeface="+mn-ea"/>
+                <a:cs typeface="+mn-cs"/>
+              </a:defRPr>
+            </a:lvl4pPr>
+            <a:lvl5pPr marL="2057400" indent="-228600" algn="l" defTabSz="457200" rtl="0" eaLnBrk="1" latinLnBrk="0" hangingPunct="1">
+              <a:spcBef>
+                <a:spcPts val="1000"/>
+              </a:spcBef>
+              <a:spcAft>
+                <a:spcPts val="0"/>
+              </a:spcAft>
+              <a:buClr>
+                <a:schemeClr val="accent1"/>
+              </a:buClr>
+              <a:buSzPct val="80000"/>
+              <a:buFont typeface="Wingdings 3" charset="2"/>
+              <a:buChar char=""/>
+              <a:defRPr sz="1200" kern="1200">
+                <a:solidFill>
+                  <a:schemeClr val="tx1">
+                    <a:lumMod val="75000"/>
+                    <a:lumOff val="25000"/>
+                  </a:schemeClr>
+                </a:solidFill>
+                <a:latin typeface="+mn-lt"/>
+                <a:ea typeface="+mn-ea"/>
+                <a:cs typeface="+mn-cs"/>
+              </a:defRPr>
+            </a:lvl5pPr>
+            <a:lvl6pPr marL="2514600" indent="-228600" algn="l" defTabSz="457200" rtl="0" eaLnBrk="1" latinLnBrk="0" hangingPunct="1">
+              <a:spcBef>
+                <a:spcPts val="1000"/>
+              </a:spcBef>
+              <a:spcAft>
+                <a:spcPts val="0"/>
+              </a:spcAft>
+              <a:buClr>
+                <a:schemeClr val="accent1"/>
+              </a:buClr>
+              <a:buSzPct val="80000"/>
+              <a:buFont typeface="Wingdings 3" charset="2"/>
+              <a:buChar char=""/>
+              <a:defRPr sz="1200" kern="1200">
+                <a:solidFill>
+                  <a:schemeClr val="tx1">
+                    <a:lumMod val="75000"/>
+                    <a:lumOff val="25000"/>
+                  </a:schemeClr>
+                </a:solidFill>
+                <a:latin typeface="+mn-lt"/>
+                <a:ea typeface="+mn-ea"/>
+                <a:cs typeface="+mn-cs"/>
+              </a:defRPr>
+            </a:lvl6pPr>
+            <a:lvl7pPr marL="2971800" indent="-228600" algn="l" defTabSz="457200" rtl="0" eaLnBrk="1" latinLnBrk="0" hangingPunct="1">
+              <a:spcBef>
+                <a:spcPts val="1000"/>
+              </a:spcBef>
+              <a:spcAft>
+                <a:spcPts val="0"/>
+              </a:spcAft>
+              <a:buClr>
+                <a:schemeClr val="accent1"/>
+              </a:buClr>
+              <a:buSzPct val="80000"/>
+              <a:buFont typeface="Wingdings 3" charset="2"/>
+              <a:buChar char=""/>
+              <a:defRPr sz="1200" kern="1200">
+                <a:solidFill>
+                  <a:schemeClr val="tx1">
+                    <a:lumMod val="75000"/>
+                    <a:lumOff val="25000"/>
+                  </a:schemeClr>
+                </a:solidFill>
+                <a:latin typeface="+mn-lt"/>
+                <a:ea typeface="+mn-ea"/>
+                <a:cs typeface="+mn-cs"/>
+              </a:defRPr>
+            </a:lvl7pPr>
+            <a:lvl8pPr marL="3429000" indent="-228600" algn="l" defTabSz="457200" rtl="0" eaLnBrk="1" latinLnBrk="0" hangingPunct="1">
+              <a:spcBef>
+                <a:spcPts val="1000"/>
+              </a:spcBef>
+              <a:spcAft>
+                <a:spcPts val="0"/>
+              </a:spcAft>
+              <a:buClr>
+                <a:schemeClr val="accent1"/>
+              </a:buClr>
+              <a:buSzPct val="80000"/>
+              <a:buFont typeface="Wingdings 3" charset="2"/>
+              <a:buChar char=""/>
+              <a:defRPr sz="1200" kern="1200">
+                <a:solidFill>
+                  <a:schemeClr val="tx1">
+                    <a:lumMod val="75000"/>
+                    <a:lumOff val="25000"/>
+                  </a:schemeClr>
+                </a:solidFill>
+                <a:latin typeface="+mn-lt"/>
+                <a:ea typeface="+mn-ea"/>
+                <a:cs typeface="+mn-cs"/>
+              </a:defRPr>
+            </a:lvl8pPr>
+            <a:lvl9pPr marL="3886200" indent="-228600" algn="l" defTabSz="457200" rtl="0" eaLnBrk="1" latinLnBrk="0" hangingPunct="1">
+              <a:spcBef>
+                <a:spcPts val="1000"/>
+              </a:spcBef>
+              <a:spcAft>
+                <a:spcPts val="0"/>
+              </a:spcAft>
+              <a:buClr>
+                <a:schemeClr val="accent1"/>
+              </a:buClr>
+              <a:buSzPct val="80000"/>
+              <a:buFont typeface="Wingdings 3" charset="2"/>
+              <a:buChar char=""/>
+              <a:defRPr sz="1200" kern="1200">
+                <a:solidFill>
+                  <a:schemeClr val="tx1">
+                    <a:lumMod val="75000"/>
+                    <a:lumOff val="25000"/>
+                  </a:schemeClr>
+                </a:solidFill>
+                <a:latin typeface="+mn-lt"/>
+                <a:ea typeface="+mn-ea"/>
+                <a:cs typeface="+mn-cs"/>
+              </a:defRPr>
+            </a:lvl9pPr>
+          </a:lstStyle>
+          <a:p>
+            <a:pPr>
+              <a:buFont typeface="Wingdings" panose="05000000000000000000" pitchFamily="2" charset="2"/>
+              <a:buChar char="v"/>
+            </a:pPr>
+            <a:r>
+              <a:rPr lang="pt-BR" sz="2400" dirty="0"/>
+              <a:t>Tecnologia</a:t>
+            </a:r>
+          </a:p>
+        </p:txBody>
+      </p:sp>
+      <p:pic>
+        <p:nvPicPr>
+          <p:cNvPr id="10" name="Imagem 9"/>
+          <p:cNvPicPr>
+            <a:picLocks noChangeAspect="1"/>
+          </p:cNvPicPr>
+          <p:nvPr/>
+        </p:nvPicPr>
+        <p:blipFill>
+          <a:blip r:embed="rId4"/>
+          <a:stretch>
+            <a:fillRect/>
+          </a:stretch>
+        </p:blipFill>
+        <p:spPr>
+          <a:xfrm>
+            <a:off x="3872745" y="2935362"/>
+            <a:ext cx="1776739" cy="3257651"/>
+          </a:xfrm>
+          <a:prstGeom prst="rect">
+            <a:avLst/>
+          </a:prstGeom>
+        </p:spPr>
+      </p:pic>
+    </p:spTree>
+    <p:extLst>
+      <p:ext uri="{BB962C8B-B14F-4D97-AF65-F5344CB8AC3E}">
+        <p14:creationId xmlns:p14="http://schemas.microsoft.com/office/powerpoint/2010/main" val="2367941043"/>
+      </p:ext>
+    </p:extLst>
+  </p:cSld>
+  <p:clrMapOvr>
+    <a:masterClrMapping/>
+  </p:clrMapOvr>
+  <mc:AlternateContent xmlns:mc="http://schemas.openxmlformats.org/markup-compatibility/2006">
+    <mc:Choice xmlns:p14="http://schemas.microsoft.com/office/powerpoint/2010/main" Requires="p14">
+      <p:transition spd="slow" p14:dur="1200">
+        <p:dissolve/>
+      </p:transition>
+    </mc:Choice>
+    <mc:Fallback>
+      <p:transition spd="slow">
+        <p:dissolve/>
+      </p:transition>
+    </mc:Fallback>
+  </mc:AlternateContent>
+  <p:timing>
+    <p:tnLst>
+      <p:par>
+        <p:cTn id="1" dur="indefinite" restart="never" nodeType="tmRoot">
+          <p:childTnLst>
+            <p:seq concurrent="1" nextAc="seek">
+              <p:cTn id="2" dur="indefinite" nodeType="mainSeq">
+                <p:childTnLst>
+                  <p:par>
+                    <p:cTn id="3" fill="hold">
+                      <p:stCondLst>
+                        <p:cond delay="indefinite"/>
+                        <p:cond evt="onBegin" delay="0">
+                          <p:tn val="2"/>
+                        </p:cond>
+                      </p:stCondLst>
+                      <p:childTnLst>
+                        <p:par>
+                          <p:cTn id="4" fill="hold">
+                            <p:stCondLst>
+                              <p:cond delay="0"/>
+                            </p:stCondLst>
+                            <p:childTnLst>
+                              <p:par>
+                                <p:cTn id="5" presetID="10" presetClass="entr" presetSubtype="0" fill="hold" grpId="0" nodeType="afterEffect">
+                                  <p:stCondLst>
+                                    <p:cond delay="0"/>
+                                  </p:stCondLst>
+                                  <p:childTnLst>
+                                    <p:set>
+                                      <p:cBhvr>
+                                        <p:cTn id="6" dur="1" fill="hold">
+                                          <p:stCondLst>
+                                            <p:cond delay="0"/>
+                                          </p:stCondLst>
+                                        </p:cTn>
+                                        <p:tgtEl>
+                                          <p:spTgt spid="2"/>
+                                        </p:tgtEl>
+                                        <p:attrNameLst>
+                                          <p:attrName>style.visibility</p:attrName>
+                                        </p:attrNameLst>
+                                      </p:cBhvr>
+                                      <p:to>
+                                        <p:strVal val="visible"/>
+                                      </p:to>
+                                    </p:set>
+                                    <p:animEffect transition="in" filter="fade">
+                                      <p:cBhvr>
+                                        <p:cTn id="7" dur="500"/>
+                                        <p:tgtEl>
+                                          <p:spTgt spid="2"/>
+                                        </p:tgtEl>
+                                      </p:cBhvr>
+                                    </p:animEffect>
+                                  </p:childTnLst>
+                                </p:cTn>
+                              </p:par>
+                            </p:childTnLst>
+                          </p:cTn>
+                        </p:par>
+                      </p:childTnLst>
+                    </p:cTn>
+                  </p:par>
+                  <p:par>
+                    <p:cTn id="8" fill="hold">
+                      <p:stCondLst>
+                        <p:cond delay="indefinite"/>
+                      </p:stCondLst>
+                      <p:childTnLst>
+                        <p:par>
+                          <p:cTn id="9" fill="hold">
+                            <p:stCondLst>
+                              <p:cond delay="0"/>
+                            </p:stCondLst>
+                            <p:childTnLst>
+                              <p:par>
+                                <p:cTn id="10" presetID="10" presetClass="entr" presetSubtype="0" fill="hold" nodeType="clickEffect">
+                                  <p:stCondLst>
+                                    <p:cond delay="0"/>
+                                  </p:stCondLst>
+                                  <p:childTnLst>
+                                    <p:set>
+                                      <p:cBhvr>
+                                        <p:cTn id="11" dur="1" fill="hold">
+                                          <p:stCondLst>
+                                            <p:cond delay="0"/>
+                                          </p:stCondLst>
+                                        </p:cTn>
+                                        <p:tgtEl>
+                                          <p:spTgt spid="3">
+                                            <p:txEl>
+                                              <p:pRg st="0" end="0"/>
+                                            </p:txEl>
+                                          </p:spTgt>
+                                        </p:tgtEl>
+                                        <p:attrNameLst>
+                                          <p:attrName>style.visibility</p:attrName>
+                                        </p:attrNameLst>
+                                      </p:cBhvr>
+                                      <p:to>
+                                        <p:strVal val="visible"/>
+                                      </p:to>
+                                    </p:set>
+                                    <p:animEffect transition="in" filter="fade">
+                                      <p:cBhvr>
+                                        <p:cTn id="12" dur="500"/>
+                                        <p:tgtEl>
+                                          <p:spTgt spid="3">
+                                            <p:txEl>
+                                              <p:pRg st="0" end="0"/>
+                                            </p:txEl>
+                                          </p:spTgt>
+                                        </p:tgtEl>
+                                      </p:cBhvr>
+                                    </p:animEffect>
+                                  </p:childTnLst>
+                                </p:cTn>
+                              </p:par>
+                              <p:par>
+                                <p:cTn id="13" presetID="10" presetClass="entr" presetSubtype="0" fill="hold" nodeType="withEffect">
+                                  <p:stCondLst>
+                                    <p:cond delay="0"/>
+                                  </p:stCondLst>
+                                  <p:childTnLst>
+                                    <p:set>
+                                      <p:cBhvr>
+                                        <p:cTn id="14" dur="1" fill="hold">
+                                          <p:stCondLst>
+                                            <p:cond delay="0"/>
+                                          </p:stCondLst>
+                                        </p:cTn>
+                                        <p:tgtEl>
+                                          <p:spTgt spid="5"/>
+                                        </p:tgtEl>
+                                        <p:attrNameLst>
+                                          <p:attrName>style.visibility</p:attrName>
+                                        </p:attrNameLst>
+                                      </p:cBhvr>
+                                      <p:to>
+                                        <p:strVal val="visible"/>
+                                      </p:to>
+                                    </p:set>
+                                    <p:animEffect transition="in" filter="fade">
+                                      <p:cBhvr>
+                                        <p:cTn id="15" dur="500"/>
+                                        <p:tgtEl>
+                                          <p:spTgt spid="5"/>
+                                        </p:tgtEl>
+                                      </p:cBhvr>
+                                    </p:animEffect>
+                                  </p:childTnLst>
+                                </p:cTn>
+                              </p:par>
+                            </p:childTnLst>
+                          </p:cTn>
+                        </p:par>
+                      </p:childTnLst>
+                    </p:cTn>
+                  </p:par>
+                  <p:par>
+                    <p:cTn id="16" fill="hold">
+                      <p:stCondLst>
+                        <p:cond delay="indefinite"/>
+                      </p:stCondLst>
+                      <p:childTnLst>
+                        <p:par>
+                          <p:cTn id="17" fill="hold">
+                            <p:stCondLst>
+                              <p:cond delay="0"/>
+                            </p:stCondLst>
+                            <p:childTnLst>
+                              <p:par>
+                                <p:cTn id="18" presetID="10" presetClass="exit" presetSubtype="0" fill="hold" nodeType="clickEffect">
+                                  <p:stCondLst>
+                                    <p:cond delay="0"/>
+                                  </p:stCondLst>
+                                  <p:childTnLst>
+                                    <p:animEffect transition="out" filter="fade">
+                                      <p:cBhvr>
+                                        <p:cTn id="19" dur="500"/>
+                                        <p:tgtEl>
+                                          <p:spTgt spid="5"/>
+                                        </p:tgtEl>
+                                      </p:cBhvr>
+                                    </p:animEffect>
+                                    <p:set>
+                                      <p:cBhvr>
+                                        <p:cTn id="20" dur="1" fill="hold">
+                                          <p:stCondLst>
+                                            <p:cond delay="499"/>
+                                          </p:stCondLst>
+                                        </p:cTn>
+                                        <p:tgtEl>
+                                          <p:spTgt spid="5"/>
+                                        </p:tgtEl>
+                                        <p:attrNameLst>
+                                          <p:attrName>style.visibility</p:attrName>
+                                        </p:attrNameLst>
+                                      </p:cBhvr>
+                                      <p:to>
+                                        <p:strVal val="hidden"/>
+                                      </p:to>
+                                    </p:set>
+                                  </p:childTnLst>
+                                </p:cTn>
+                              </p:par>
+                              <p:par>
+                                <p:cTn id="21" presetID="10" presetClass="exit" presetSubtype="0" fill="hold" grpId="0" nodeType="withEffect">
+                                  <p:stCondLst>
+                                    <p:cond delay="0"/>
+                                  </p:stCondLst>
+                                  <p:childTnLst>
+                                    <p:animEffect transition="out" filter="fade">
+                                      <p:cBhvr>
+                                        <p:cTn id="22" dur="500"/>
+                                        <p:tgtEl>
+                                          <p:spTgt spid="3">
+                                            <p:txEl>
+                                              <p:pRg st="0" end="0"/>
+                                            </p:txEl>
+                                          </p:spTgt>
+                                        </p:tgtEl>
+                                      </p:cBhvr>
+                                    </p:animEffect>
+                                    <p:set>
+                                      <p:cBhvr>
+                                        <p:cTn id="23" dur="1" fill="hold">
+                                          <p:stCondLst>
+                                            <p:cond delay="499"/>
+                                          </p:stCondLst>
+                                        </p:cTn>
+                                        <p:tgtEl>
+                                          <p:spTgt spid="3">
+                                            <p:txEl>
+                                              <p:pRg st="0" end="0"/>
+                                            </p:txEl>
+                                          </p:spTgt>
+                                        </p:tgtEl>
+                                        <p:attrNameLst>
+                                          <p:attrName>style.visibility</p:attrName>
+                                        </p:attrNameLst>
+                                      </p:cBhvr>
+                                      <p:to>
+                                        <p:strVal val="hidden"/>
+                                      </p:to>
+                                    </p:set>
+                                  </p:childTnLst>
+                                </p:cTn>
+                              </p:par>
+                            </p:childTnLst>
+                          </p:cTn>
+                        </p:par>
+                        <p:par>
+                          <p:cTn id="24" fill="hold">
+                            <p:stCondLst>
+                              <p:cond delay="500"/>
+                            </p:stCondLst>
+                            <p:childTnLst>
+                              <p:par>
+                                <p:cTn id="25" presetID="10" presetClass="entr" presetSubtype="0" fill="hold" nodeType="afterEffect">
+                                  <p:stCondLst>
+                                    <p:cond delay="0"/>
+                                  </p:stCondLst>
+                                  <p:childTnLst>
+                                    <p:set>
+                                      <p:cBhvr>
+                                        <p:cTn id="26" dur="1" fill="hold">
+                                          <p:stCondLst>
+                                            <p:cond delay="0"/>
+                                          </p:stCondLst>
+                                        </p:cTn>
+                                        <p:tgtEl>
+                                          <p:spTgt spid="7">
+                                            <p:txEl>
+                                              <p:pRg st="0" end="0"/>
+                                            </p:txEl>
+                                          </p:spTgt>
+                                        </p:tgtEl>
+                                        <p:attrNameLst>
+                                          <p:attrName>style.visibility</p:attrName>
+                                        </p:attrNameLst>
+                                      </p:cBhvr>
+                                      <p:to>
+                                        <p:strVal val="visible"/>
+                                      </p:to>
+                                    </p:set>
+                                    <p:animEffect transition="in" filter="fade">
+                                      <p:cBhvr>
+                                        <p:cTn id="27" dur="500"/>
+                                        <p:tgtEl>
+                                          <p:spTgt spid="7">
+                                            <p:txEl>
+                                              <p:pRg st="0" end="0"/>
+                                            </p:txEl>
+                                          </p:spTgt>
+                                        </p:tgtEl>
+                                      </p:cBhvr>
+                                    </p:animEffect>
+                                  </p:childTnLst>
+                                </p:cTn>
+                              </p:par>
+                              <p:par>
+                                <p:cTn id="28" presetID="10" presetClass="entr" presetSubtype="0" fill="hold" nodeType="withEffect">
+                                  <p:stCondLst>
+                                    <p:cond delay="0"/>
+                                  </p:stCondLst>
+                                  <p:childTnLst>
+                                    <p:set>
+                                      <p:cBhvr>
+                                        <p:cTn id="29" dur="1" fill="hold">
+                                          <p:stCondLst>
+                                            <p:cond delay="0"/>
+                                          </p:stCondLst>
+                                        </p:cTn>
+                                        <p:tgtEl>
+                                          <p:spTgt spid="8"/>
+                                        </p:tgtEl>
+                                        <p:attrNameLst>
+                                          <p:attrName>style.visibility</p:attrName>
+                                        </p:attrNameLst>
+                                      </p:cBhvr>
+                                      <p:to>
+                                        <p:strVal val="visible"/>
+                                      </p:to>
+                                    </p:set>
+                                    <p:animEffect transition="in" filter="fade">
+                                      <p:cBhvr>
+                                        <p:cTn id="30" dur="500"/>
+                                        <p:tgtEl>
+                                          <p:spTgt spid="8"/>
+                                        </p:tgtEl>
+                                      </p:cBhvr>
+                                    </p:animEffect>
+                                  </p:childTnLst>
+                                </p:cTn>
+                              </p:par>
+                            </p:childTnLst>
+                          </p:cTn>
+                        </p:par>
+                      </p:childTnLst>
+                    </p:cTn>
+                  </p:par>
+                  <p:par>
+                    <p:cTn id="31" fill="hold">
+                      <p:stCondLst>
+                        <p:cond delay="indefinite"/>
+                      </p:stCondLst>
+                      <p:childTnLst>
+                        <p:par>
+                          <p:cTn id="32" fill="hold">
+                            <p:stCondLst>
+                              <p:cond delay="0"/>
+                            </p:stCondLst>
+                            <p:childTnLst>
+                              <p:par>
+                                <p:cTn id="33" presetID="10" presetClass="exit" presetSubtype="0" fill="hold" nodeType="clickEffect">
+                                  <p:stCondLst>
+                                    <p:cond delay="0"/>
+                                  </p:stCondLst>
+                                  <p:childTnLst>
+                                    <p:animEffect transition="out" filter="fade">
+                                      <p:cBhvr>
+                                        <p:cTn id="34" dur="500"/>
+                                        <p:tgtEl>
+                                          <p:spTgt spid="8"/>
+                                        </p:tgtEl>
+                                      </p:cBhvr>
+                                    </p:animEffect>
+                                    <p:set>
+                                      <p:cBhvr>
+                                        <p:cTn id="35" dur="1" fill="hold">
+                                          <p:stCondLst>
+                                            <p:cond delay="499"/>
+                                          </p:stCondLst>
+                                        </p:cTn>
+                                        <p:tgtEl>
+                                          <p:spTgt spid="8"/>
+                                        </p:tgtEl>
+                                        <p:attrNameLst>
+                                          <p:attrName>style.visibility</p:attrName>
+                                        </p:attrNameLst>
+                                      </p:cBhvr>
+                                      <p:to>
+                                        <p:strVal val="hidden"/>
+                                      </p:to>
+                                    </p:set>
+                                  </p:childTnLst>
+                                </p:cTn>
+                              </p:par>
+                              <p:par>
+                                <p:cTn id="36" presetID="10" presetClass="exit" presetSubtype="0" fill="hold" grpId="0" nodeType="withEffect">
+                                  <p:stCondLst>
+                                    <p:cond delay="0"/>
+                                  </p:stCondLst>
+                                  <p:childTnLst>
+                                    <p:animEffect transition="out" filter="fade">
+                                      <p:cBhvr>
+                                        <p:cTn id="37" dur="500"/>
+                                        <p:tgtEl>
+                                          <p:spTgt spid="7">
+                                            <p:txEl>
+                                              <p:pRg st="0" end="0"/>
+                                            </p:txEl>
+                                          </p:spTgt>
+                                        </p:tgtEl>
+                                      </p:cBhvr>
+                                    </p:animEffect>
+                                    <p:set>
+                                      <p:cBhvr>
+                                        <p:cTn id="38" dur="1" fill="hold">
+                                          <p:stCondLst>
+                                            <p:cond delay="499"/>
+                                          </p:stCondLst>
+                                        </p:cTn>
+                                        <p:tgtEl>
+                                          <p:spTgt spid="7">
+                                            <p:txEl>
+                                              <p:pRg st="0" end="0"/>
+                                            </p:txEl>
+                                          </p:spTgt>
+                                        </p:tgtEl>
+                                        <p:attrNameLst>
+                                          <p:attrName>style.visibility</p:attrName>
+                                        </p:attrNameLst>
+                                      </p:cBhvr>
+                                      <p:to>
+                                        <p:strVal val="hidden"/>
+                                      </p:to>
+                                    </p:set>
+                                  </p:childTnLst>
+                                </p:cTn>
+                              </p:par>
+                            </p:childTnLst>
+                          </p:cTn>
+                        </p:par>
+                        <p:par>
+                          <p:cTn id="39" fill="hold">
+                            <p:stCondLst>
+                              <p:cond delay="500"/>
+                            </p:stCondLst>
+                            <p:childTnLst>
+                              <p:par>
+                                <p:cTn id="40" presetID="10" presetClass="entr" presetSubtype="0" fill="hold" nodeType="afterEffect">
+                                  <p:stCondLst>
+                                    <p:cond delay="0"/>
+                                  </p:stCondLst>
+                                  <p:childTnLst>
+                                    <p:set>
+                                      <p:cBhvr>
+                                        <p:cTn id="41" dur="1" fill="hold">
+                                          <p:stCondLst>
+                                            <p:cond delay="0"/>
+                                          </p:stCondLst>
+                                        </p:cTn>
+                                        <p:tgtEl>
+                                          <p:spTgt spid="9">
+                                            <p:txEl>
+                                              <p:pRg st="0" end="0"/>
+                                            </p:txEl>
+                                          </p:spTgt>
+                                        </p:tgtEl>
+                                        <p:attrNameLst>
+                                          <p:attrName>style.visibility</p:attrName>
+                                        </p:attrNameLst>
+                                      </p:cBhvr>
+                                      <p:to>
+                                        <p:strVal val="visible"/>
+                                      </p:to>
+                                    </p:set>
+                                    <p:animEffect transition="in" filter="fade">
+                                      <p:cBhvr>
+                                        <p:cTn id="42" dur="500"/>
+                                        <p:tgtEl>
+                                          <p:spTgt spid="9">
+                                            <p:txEl>
+                                              <p:pRg st="0" end="0"/>
+                                            </p:txEl>
+                                          </p:spTgt>
+                                        </p:tgtEl>
+                                      </p:cBhvr>
+                                    </p:animEffect>
+                                  </p:childTnLst>
+                                </p:cTn>
+                              </p:par>
+                              <p:par>
+                                <p:cTn id="43" presetID="10" presetClass="entr" presetSubtype="0" fill="hold" nodeType="withEffect">
+                                  <p:stCondLst>
+                                    <p:cond delay="0"/>
+                                  </p:stCondLst>
+                                  <p:childTnLst>
+                                    <p:set>
+                                      <p:cBhvr>
+                                        <p:cTn id="44" dur="1" fill="hold">
+                                          <p:stCondLst>
+                                            <p:cond delay="0"/>
+                                          </p:stCondLst>
+                                        </p:cTn>
+                                        <p:tgtEl>
+                                          <p:spTgt spid="10"/>
+                                        </p:tgtEl>
+                                        <p:attrNameLst>
+                                          <p:attrName>style.visibility</p:attrName>
+                                        </p:attrNameLst>
+                                      </p:cBhvr>
+                                      <p:to>
+                                        <p:strVal val="visible"/>
+                                      </p:to>
+                                    </p:set>
+                                    <p:animEffect transition="in" filter="fade">
+                                      <p:cBhvr>
+                                        <p:cTn id="45" dur="500"/>
+                                        <p:tgtEl>
+                                          <p:spTgt spid="10"/>
+                                        </p:tgtEl>
+                                      </p:cBhvr>
+                                    </p:animEffect>
+                                  </p:childTnLst>
+                                </p:cTn>
+                              </p:par>
+                            </p:childTnLst>
+                          </p:cTn>
+                        </p:par>
+                      </p:childTnLst>
+                    </p:cTn>
+                  </p:par>
+                </p:childTnLst>
+              </p:cTn>
+              <p:prevCondLst>
+                <p:cond evt="onPrev" delay="0">
+                  <p:tgtEl>
+                    <p:sldTgt/>
+                  </p:tgtEl>
+                </p:cond>
+              </p:prevCondLst>
+              <p:nextCondLst>
+                <p:cond evt="onNext" delay="0">
+                  <p:tgtEl>
+                    <p:sldTgt/>
+                  </p:tgtEl>
+                </p:cond>
+              </p:nextCondLst>
+            </p:seq>
+          </p:childTnLst>
+        </p:cTn>
+      </p:par>
+    </p:tnLst>
+    <p:bldLst>
+      <p:bldP spid="2" grpId="0"/>
+      <p:bldP spid="3" grpId="0" build="p"/>
+      <p:bldP spid="7" grpId="0" build="allAtOnce"/>
+    </p:bldLst>
+  </p:timing>
 </p:sld>
 </file>
 

</xml_diff>

<commit_message>
adicionado slide do git e github, e imagens de apresentacao
</commit_message>
<xml_diff>
--- a/Docs/Apresentacao.pptx
+++ b/Docs/Apresentacao.pptx
@@ -4,6 +4,9 @@
   <p:sldMasterIdLst>
     <p:sldMasterId id="2147483648" r:id="rId1"/>
   </p:sldMasterIdLst>
+  <p:notesMasterIdLst>
+    <p:notesMasterId r:id="rId11"/>
+  </p:notesMasterIdLst>
   <p:sldIdLst>
     <p:sldId id="256" r:id="rId2"/>
     <p:sldId id="257" r:id="rId3"/>
@@ -12,6 +15,8 @@
     <p:sldId id="260" r:id="rId6"/>
     <p:sldId id="261" r:id="rId7"/>
     <p:sldId id="262" r:id="rId8"/>
+    <p:sldId id="263" r:id="rId9"/>
+    <p:sldId id="264" r:id="rId10"/>
   </p:sldIdLst>
   <p:sldSz cx="12192000" cy="6858000"/>
   <p:notesSz cx="6858000" cy="9144000"/>
@@ -116,6 +121,452 @@
     </p:ext>
   </p:extLst>
 </p:presentation>
+</file>
+
+<file path=ppt/notesMasters/notesMaster1.xml><?xml version="1.0" encoding="utf-8"?>
+<p:notesMaster xmlns:a="http://schemas.openxmlformats.org/drawingml/2006/main" xmlns:r="http://schemas.openxmlformats.org/officeDocument/2006/relationships" xmlns:p="http://schemas.openxmlformats.org/presentationml/2006/main">
+  <p:cSld>
+    <p:bg>
+      <p:bgRef idx="1001">
+        <a:schemeClr val="bg1"/>
+      </p:bgRef>
+    </p:bg>
+    <p:spTree>
+      <p:nvGrpSpPr>
+        <p:cNvPr id="1" name=""/>
+        <p:cNvGrpSpPr/>
+        <p:nvPr/>
+      </p:nvGrpSpPr>
+      <p:grpSpPr>
+        <a:xfrm>
+          <a:off x="0" y="0"/>
+          <a:ext cx="0" cy="0"/>
+          <a:chOff x="0" y="0"/>
+          <a:chExt cx="0" cy="0"/>
+        </a:xfrm>
+      </p:grpSpPr>
+      <p:sp>
+        <p:nvSpPr>
+          <p:cNvPr id="2" name="Espaço Reservado para Cabeçalho 1"/>
+          <p:cNvSpPr>
+            <a:spLocks noGrp="1"/>
+          </p:cNvSpPr>
+          <p:nvPr>
+            <p:ph type="hdr" sz="quarter"/>
+          </p:nvPr>
+        </p:nvSpPr>
+        <p:spPr>
+          <a:xfrm>
+            <a:off x="0" y="0"/>
+            <a:ext cx="2971800" cy="458788"/>
+          </a:xfrm>
+          <a:prstGeom prst="rect">
+            <a:avLst/>
+          </a:prstGeom>
+        </p:spPr>
+        <p:txBody>
+          <a:bodyPr vert="horz" lIns="91440" tIns="45720" rIns="91440" bIns="45720" rtlCol="0"/>
+          <a:lstStyle>
+            <a:lvl1pPr algn="l">
+              <a:defRPr sz="1200"/>
+            </a:lvl1pPr>
+          </a:lstStyle>
+          <a:p>
+            <a:endParaRPr lang="pt-BR"/>
+          </a:p>
+        </p:txBody>
+      </p:sp>
+      <p:sp>
+        <p:nvSpPr>
+          <p:cNvPr id="3" name="Espaço Reservado para Data 2"/>
+          <p:cNvSpPr>
+            <a:spLocks noGrp="1"/>
+          </p:cNvSpPr>
+          <p:nvPr>
+            <p:ph type="dt" idx="1"/>
+          </p:nvPr>
+        </p:nvSpPr>
+        <p:spPr>
+          <a:xfrm>
+            <a:off x="3884613" y="0"/>
+            <a:ext cx="2971800" cy="458788"/>
+          </a:xfrm>
+          <a:prstGeom prst="rect">
+            <a:avLst/>
+          </a:prstGeom>
+        </p:spPr>
+        <p:txBody>
+          <a:bodyPr vert="horz" lIns="91440" tIns="45720" rIns="91440" bIns="45720" rtlCol="0"/>
+          <a:lstStyle>
+            <a:lvl1pPr algn="r">
+              <a:defRPr sz="1200"/>
+            </a:lvl1pPr>
+          </a:lstStyle>
+          <a:p>
+            <a:fld id="{B73C90AB-74D6-4A85-A591-F6B6B8B890F8}" type="datetimeFigureOut">
+              <a:rPr lang="pt-BR" smtClean="0"/>
+              <a:t>02/06/2016</a:t>
+            </a:fld>
+            <a:endParaRPr lang="pt-BR"/>
+          </a:p>
+        </p:txBody>
+      </p:sp>
+      <p:sp>
+        <p:nvSpPr>
+          <p:cNvPr id="4" name="Espaço Reservado para Imagem de Slide 3"/>
+          <p:cNvSpPr>
+            <a:spLocks noGrp="1" noRot="1" noChangeAspect="1"/>
+          </p:cNvSpPr>
+          <p:nvPr>
+            <p:ph type="sldImg" idx="2"/>
+          </p:nvPr>
+        </p:nvSpPr>
+        <p:spPr>
+          <a:xfrm>
+            <a:off x="685800" y="1143000"/>
+            <a:ext cx="5486400" cy="3086100"/>
+          </a:xfrm>
+          <a:prstGeom prst="rect">
+            <a:avLst/>
+          </a:prstGeom>
+          <a:noFill/>
+          <a:ln w="12700">
+            <a:solidFill>
+              <a:prstClr val="black"/>
+            </a:solidFill>
+          </a:ln>
+        </p:spPr>
+        <p:txBody>
+          <a:bodyPr vert="horz" lIns="91440" tIns="45720" rIns="91440" bIns="45720" rtlCol="0" anchor="ctr"/>
+          <a:lstStyle/>
+          <a:p>
+            <a:endParaRPr lang="pt-BR"/>
+          </a:p>
+        </p:txBody>
+      </p:sp>
+      <p:sp>
+        <p:nvSpPr>
+          <p:cNvPr id="5" name="Espaço Reservado para Anotações 4"/>
+          <p:cNvSpPr>
+            <a:spLocks noGrp="1"/>
+          </p:cNvSpPr>
+          <p:nvPr>
+            <p:ph type="body" sz="quarter" idx="3"/>
+          </p:nvPr>
+        </p:nvSpPr>
+        <p:spPr>
+          <a:xfrm>
+            <a:off x="685800" y="4400550"/>
+            <a:ext cx="5486400" cy="3600450"/>
+          </a:xfrm>
+          <a:prstGeom prst="rect">
+            <a:avLst/>
+          </a:prstGeom>
+        </p:spPr>
+        <p:txBody>
+          <a:bodyPr vert="horz" lIns="91440" tIns="45720" rIns="91440" bIns="45720" rtlCol="0"/>
+          <a:lstStyle/>
+          <a:p>
+            <a:pPr lvl="0"/>
+            <a:r>
+              <a:rPr lang="pt-BR"/>
+              <a:t>Editar estilos de texto Mestre</a:t>
+            </a:r>
+          </a:p>
+          <a:p>
+            <a:pPr lvl="1"/>
+            <a:r>
+              <a:rPr lang="pt-BR"/>
+              <a:t>Segundo nível</a:t>
+            </a:r>
+          </a:p>
+          <a:p>
+            <a:pPr lvl="2"/>
+            <a:r>
+              <a:rPr lang="pt-BR"/>
+              <a:t>Terceiro nível</a:t>
+            </a:r>
+          </a:p>
+          <a:p>
+            <a:pPr lvl="3"/>
+            <a:r>
+              <a:rPr lang="pt-BR"/>
+              <a:t>Quarto nível</a:t>
+            </a:r>
+          </a:p>
+          <a:p>
+            <a:pPr lvl="4"/>
+            <a:r>
+              <a:rPr lang="pt-BR"/>
+              <a:t>Quinto nível</a:t>
+            </a:r>
+            <a:endParaRPr lang="pt-BR"/>
+          </a:p>
+        </p:txBody>
+      </p:sp>
+      <p:sp>
+        <p:nvSpPr>
+          <p:cNvPr id="6" name="Espaço Reservado para Rodapé 5"/>
+          <p:cNvSpPr>
+            <a:spLocks noGrp="1"/>
+          </p:cNvSpPr>
+          <p:nvPr>
+            <p:ph type="ftr" sz="quarter" idx="4"/>
+          </p:nvPr>
+        </p:nvSpPr>
+        <p:spPr>
+          <a:xfrm>
+            <a:off x="0" y="8685213"/>
+            <a:ext cx="2971800" cy="458787"/>
+          </a:xfrm>
+          <a:prstGeom prst="rect">
+            <a:avLst/>
+          </a:prstGeom>
+        </p:spPr>
+        <p:txBody>
+          <a:bodyPr vert="horz" lIns="91440" tIns="45720" rIns="91440" bIns="45720" rtlCol="0" anchor="b"/>
+          <a:lstStyle>
+            <a:lvl1pPr algn="l">
+              <a:defRPr sz="1200"/>
+            </a:lvl1pPr>
+          </a:lstStyle>
+          <a:p>
+            <a:endParaRPr lang="pt-BR"/>
+          </a:p>
+        </p:txBody>
+      </p:sp>
+      <p:sp>
+        <p:nvSpPr>
+          <p:cNvPr id="7" name="Espaço Reservado para Número de Slide 6"/>
+          <p:cNvSpPr>
+            <a:spLocks noGrp="1"/>
+          </p:cNvSpPr>
+          <p:nvPr>
+            <p:ph type="sldNum" sz="quarter" idx="5"/>
+          </p:nvPr>
+        </p:nvSpPr>
+        <p:spPr>
+          <a:xfrm>
+            <a:off x="3884613" y="8685213"/>
+            <a:ext cx="2971800" cy="458787"/>
+          </a:xfrm>
+          <a:prstGeom prst="rect">
+            <a:avLst/>
+          </a:prstGeom>
+        </p:spPr>
+        <p:txBody>
+          <a:bodyPr vert="horz" lIns="91440" tIns="45720" rIns="91440" bIns="45720" rtlCol="0" anchor="b"/>
+          <a:lstStyle>
+            <a:lvl1pPr algn="r">
+              <a:defRPr sz="1200"/>
+            </a:lvl1pPr>
+          </a:lstStyle>
+          <a:p>
+            <a:fld id="{8D4B1CB8-3899-489F-B314-0FC3B51DE833}" type="slidenum">
+              <a:rPr lang="pt-BR" smtClean="0"/>
+              <a:t>‹nº›</a:t>
+            </a:fld>
+            <a:endParaRPr lang="pt-BR"/>
+          </a:p>
+        </p:txBody>
+      </p:sp>
+    </p:spTree>
+    <p:extLst>
+      <p:ext uri="{BB962C8B-B14F-4D97-AF65-F5344CB8AC3E}">
+        <p14:creationId xmlns:p14="http://schemas.microsoft.com/office/powerpoint/2010/main" val="2828604154"/>
+      </p:ext>
+    </p:extLst>
+  </p:cSld>
+  <p:clrMap bg1="lt1" tx1="dk1" bg2="lt2" tx2="dk2" accent1="accent1" accent2="accent2" accent3="accent3" accent4="accent4" accent5="accent5" accent6="accent6" hlink="hlink" folHlink="folHlink"/>
+  <p:notesStyle>
+    <a:lvl1pPr marL="0" algn="l" defTabSz="914400" rtl="0" eaLnBrk="1" latinLnBrk="0" hangingPunct="1">
+      <a:defRPr sz="1200" kern="1200">
+        <a:solidFill>
+          <a:schemeClr val="tx1"/>
+        </a:solidFill>
+        <a:latin typeface="+mn-lt"/>
+        <a:ea typeface="+mn-ea"/>
+        <a:cs typeface="+mn-cs"/>
+      </a:defRPr>
+    </a:lvl1pPr>
+    <a:lvl2pPr marL="457200" algn="l" defTabSz="914400" rtl="0" eaLnBrk="1" latinLnBrk="0" hangingPunct="1">
+      <a:defRPr sz="1200" kern="1200">
+        <a:solidFill>
+          <a:schemeClr val="tx1"/>
+        </a:solidFill>
+        <a:latin typeface="+mn-lt"/>
+        <a:ea typeface="+mn-ea"/>
+        <a:cs typeface="+mn-cs"/>
+      </a:defRPr>
+    </a:lvl2pPr>
+    <a:lvl3pPr marL="914400" algn="l" defTabSz="914400" rtl="0" eaLnBrk="1" latinLnBrk="0" hangingPunct="1">
+      <a:defRPr sz="1200" kern="1200">
+        <a:solidFill>
+          <a:schemeClr val="tx1"/>
+        </a:solidFill>
+        <a:latin typeface="+mn-lt"/>
+        <a:ea typeface="+mn-ea"/>
+        <a:cs typeface="+mn-cs"/>
+      </a:defRPr>
+    </a:lvl3pPr>
+    <a:lvl4pPr marL="1371600" algn="l" defTabSz="914400" rtl="0" eaLnBrk="1" latinLnBrk="0" hangingPunct="1">
+      <a:defRPr sz="1200" kern="1200">
+        <a:solidFill>
+          <a:schemeClr val="tx1"/>
+        </a:solidFill>
+        <a:latin typeface="+mn-lt"/>
+        <a:ea typeface="+mn-ea"/>
+        <a:cs typeface="+mn-cs"/>
+      </a:defRPr>
+    </a:lvl4pPr>
+    <a:lvl5pPr marL="1828800" algn="l" defTabSz="914400" rtl="0" eaLnBrk="1" latinLnBrk="0" hangingPunct="1">
+      <a:defRPr sz="1200" kern="1200">
+        <a:solidFill>
+          <a:schemeClr val="tx1"/>
+        </a:solidFill>
+        <a:latin typeface="+mn-lt"/>
+        <a:ea typeface="+mn-ea"/>
+        <a:cs typeface="+mn-cs"/>
+      </a:defRPr>
+    </a:lvl5pPr>
+    <a:lvl6pPr marL="2286000" algn="l" defTabSz="914400" rtl="0" eaLnBrk="1" latinLnBrk="0" hangingPunct="1">
+      <a:defRPr sz="1200" kern="1200">
+        <a:solidFill>
+          <a:schemeClr val="tx1"/>
+        </a:solidFill>
+        <a:latin typeface="+mn-lt"/>
+        <a:ea typeface="+mn-ea"/>
+        <a:cs typeface="+mn-cs"/>
+      </a:defRPr>
+    </a:lvl6pPr>
+    <a:lvl7pPr marL="2743200" algn="l" defTabSz="914400" rtl="0" eaLnBrk="1" latinLnBrk="0" hangingPunct="1">
+      <a:defRPr sz="1200" kern="1200">
+        <a:solidFill>
+          <a:schemeClr val="tx1"/>
+        </a:solidFill>
+        <a:latin typeface="+mn-lt"/>
+        <a:ea typeface="+mn-ea"/>
+        <a:cs typeface="+mn-cs"/>
+      </a:defRPr>
+    </a:lvl7pPr>
+    <a:lvl8pPr marL="3200400" algn="l" defTabSz="914400" rtl="0" eaLnBrk="1" latinLnBrk="0" hangingPunct="1">
+      <a:defRPr sz="1200" kern="1200">
+        <a:solidFill>
+          <a:schemeClr val="tx1"/>
+        </a:solidFill>
+        <a:latin typeface="+mn-lt"/>
+        <a:ea typeface="+mn-ea"/>
+        <a:cs typeface="+mn-cs"/>
+      </a:defRPr>
+    </a:lvl8pPr>
+    <a:lvl9pPr marL="3657600" algn="l" defTabSz="914400" rtl="0" eaLnBrk="1" latinLnBrk="0" hangingPunct="1">
+      <a:defRPr sz="1200" kern="1200">
+        <a:solidFill>
+          <a:schemeClr val="tx1"/>
+        </a:solidFill>
+        <a:latin typeface="+mn-lt"/>
+        <a:ea typeface="+mn-ea"/>
+        <a:cs typeface="+mn-cs"/>
+      </a:defRPr>
+    </a:lvl9pPr>
+  </p:notesStyle>
+</p:notesMaster>
+</file>
+
+<file path=ppt/notesSlides/notesSlide1.xml><?xml version="1.0" encoding="utf-8"?>
+<p:notes xmlns:a="http://schemas.openxmlformats.org/drawingml/2006/main" xmlns:r="http://schemas.openxmlformats.org/officeDocument/2006/relationships" xmlns:p="http://schemas.openxmlformats.org/presentationml/2006/main">
+  <p:cSld>
+    <p:spTree>
+      <p:nvGrpSpPr>
+        <p:cNvPr id="1" name=""/>
+        <p:cNvGrpSpPr/>
+        <p:nvPr/>
+      </p:nvGrpSpPr>
+      <p:grpSpPr>
+        <a:xfrm>
+          <a:off x="0" y="0"/>
+          <a:ext cx="0" cy="0"/>
+          <a:chOff x="0" y="0"/>
+          <a:chExt cx="0" cy="0"/>
+        </a:xfrm>
+      </p:grpSpPr>
+      <p:sp>
+        <p:nvSpPr>
+          <p:cNvPr id="2" name="Espaço Reservado para Imagem de Slide 1"/>
+          <p:cNvSpPr>
+            <a:spLocks noGrp="1" noRot="1" noChangeAspect="1"/>
+          </p:cNvSpPr>
+          <p:nvPr>
+            <p:ph type="sldImg"/>
+          </p:nvPr>
+        </p:nvSpPr>
+        <p:spPr/>
+      </p:sp>
+      <p:sp>
+        <p:nvSpPr>
+          <p:cNvPr id="3" name="Espaço Reservado para Anotações 2"/>
+          <p:cNvSpPr>
+            <a:spLocks noGrp="1"/>
+          </p:cNvSpPr>
+          <p:nvPr>
+            <p:ph type="body" idx="1"/>
+          </p:nvPr>
+        </p:nvSpPr>
+        <p:spPr/>
+        <p:txBody>
+          <a:bodyPr/>
+          <a:lstStyle/>
+          <a:p>
+            <a:r>
+              <a:rPr lang="pt-BR" sz="1200" kern="1200" dirty="0">
+                <a:solidFill>
+                  <a:schemeClr val="tx1"/>
+                </a:solidFill>
+                <a:effectLst/>
+                <a:latin typeface="+mn-lt"/>
+                <a:ea typeface="+mn-ea"/>
+                <a:cs typeface="+mn-cs"/>
+              </a:rPr>
+              <a:t>Esses três pontos são os principais problemas que nos levaram a escolher os maus-tratos como tema do nosso projeto. </a:t>
+            </a:r>
+            <a:endParaRPr lang="pt-BR" dirty="0"/>
+          </a:p>
+        </p:txBody>
+      </p:sp>
+      <p:sp>
+        <p:nvSpPr>
+          <p:cNvPr id="4" name="Espaço Reservado para Número de Slide 3"/>
+          <p:cNvSpPr>
+            <a:spLocks noGrp="1"/>
+          </p:cNvSpPr>
+          <p:nvPr>
+            <p:ph type="sldNum" sz="quarter" idx="10"/>
+          </p:nvPr>
+        </p:nvSpPr>
+        <p:spPr/>
+        <p:txBody>
+          <a:bodyPr/>
+          <a:lstStyle/>
+          <a:p>
+            <a:fld id="{8D4B1CB8-3899-489F-B314-0FC3B51DE833}" type="slidenum">
+              <a:rPr lang="pt-BR" smtClean="0"/>
+              <a:t>2</a:t>
+            </a:fld>
+            <a:endParaRPr lang="pt-BR"/>
+          </a:p>
+        </p:txBody>
+      </p:sp>
+    </p:spTree>
+    <p:extLst>
+      <p:ext uri="{BB962C8B-B14F-4D97-AF65-F5344CB8AC3E}">
+        <p14:creationId xmlns:p14="http://schemas.microsoft.com/office/powerpoint/2010/main" val="2086454001"/>
+      </p:ext>
+    </p:extLst>
+  </p:cSld>
+  <p:clrMapOvr>
+    <a:masterClrMapping/>
+  </p:clrMapOvr>
+</p:notes>
 </file>
 
 <file path=ppt/slideLayouts/slideLayout1.xml><?xml version="1.0" encoding="utf-8"?>
@@ -5883,13 +6334,13 @@
   <p:clrMapOvr>
     <a:masterClrMapping/>
   </p:clrMapOvr>
-  <mc:AlternateContent xmlns:mc="http://schemas.openxmlformats.org/markup-compatibility/2006">
-    <mc:Choice xmlns:p14="http://schemas.microsoft.com/office/powerpoint/2010/main" Requires="p14">
+  <mc:AlternateContent xmlns:mc="http://schemas.openxmlformats.org/markup-compatibility/2006" xmlns:p14="http://schemas.microsoft.com/office/powerpoint/2010/main">
+    <mc:Choice Requires="p14">
       <p:transition spd="med" p14:dur="700">
         <p:fade/>
       </p:transition>
     </mc:Choice>
-    <mc:Fallback>
+    <mc:Fallback xmlns="">
       <p:transition spd="med">
         <p:fade/>
       </p:transition>
@@ -6005,7 +6456,7 @@
             </a:pPr>
             <a:r>
               <a:rPr lang="pt-BR" sz="2400" dirty="0"/>
-              <a:t>Espécies extintas.</a:t>
+              <a:t>Espécies em extinção.</a:t>
             </a:r>
           </a:p>
           <a:p>
@@ -6026,13 +6477,13 @@
   <p:clrMapOvr>
     <a:masterClrMapping/>
   </p:clrMapOvr>
-  <mc:AlternateContent xmlns:mc="http://schemas.openxmlformats.org/markup-compatibility/2006">
-    <mc:Choice xmlns:p14="http://schemas.microsoft.com/office/powerpoint/2010/main" Requires="p14">
+  <mc:AlternateContent xmlns:mc="http://schemas.openxmlformats.org/markup-compatibility/2006" xmlns:p14="http://schemas.microsoft.com/office/powerpoint/2010/main">
+    <mc:Choice Requires="p14">
       <p:transition spd="slow" p14:dur="1500">
         <p:split orient="vert"/>
       </p:transition>
     </mc:Choice>
-    <mc:Fallback>
+    <mc:Fallback xmlns="">
       <p:transition spd="slow">
         <p:split orient="vert"/>
       </p:transition>
@@ -6999,7 +7450,7 @@
             </a:pPr>
             <a:r>
               <a:rPr lang="pt-BR" sz="2400" dirty="0"/>
-              <a:t>Tráfico de animais silvestres;</a:t>
+              <a:t>Tráfico e caça de animais silvestres;</a:t>
             </a:r>
           </a:p>
           <a:p>
@@ -7752,13 +8203,13 @@
   <p:clrMapOvr>
     <a:masterClrMapping/>
   </p:clrMapOvr>
-  <mc:AlternateContent xmlns:mc="http://schemas.openxmlformats.org/markup-compatibility/2006">
-    <mc:Choice xmlns:p14="http://schemas.microsoft.com/office/powerpoint/2010/main" Requires="p14">
+  <mc:AlternateContent xmlns:mc="http://schemas.openxmlformats.org/markup-compatibility/2006" xmlns:p14="http://schemas.microsoft.com/office/powerpoint/2010/main">
+    <mc:Choice Requires="p14">
       <p:transition spd="slow">
         <p14:flash/>
       </p:transition>
     </mc:Choice>
-    <mc:Fallback>
+    <mc:Fallback xmlns="">
       <p:transition spd="slow">
         <p:fade/>
       </p:transition>
@@ -8377,13 +8828,13 @@
   <p:clrMapOvr>
     <a:masterClrMapping/>
   </p:clrMapOvr>
-  <mc:AlternateContent xmlns:mc="http://schemas.openxmlformats.org/markup-compatibility/2006">
-    <mc:Choice xmlns:p159="http://schemas.microsoft.com/office/powerpoint/2015/09/main" Requires="p159">
+  <mc:AlternateContent xmlns:mc="http://schemas.openxmlformats.org/markup-compatibility/2006" xmlns:p159="http://schemas.microsoft.com/office/powerpoint/2015/09/main">
+    <mc:Choice Requires="p159">
       <p:transition xmlns:p14="http://schemas.microsoft.com/office/powerpoint/2010/main" spd="slow" p14:dur="2000">
         <p159:morph option="byObject"/>
       </p:transition>
     </mc:Choice>
-    <mc:Fallback>
+    <mc:Fallback xmlns="">
       <p:transition spd="slow">
         <p:fade/>
       </p:transition>
@@ -9600,13 +10051,13 @@
   <p:clrMapOvr>
     <a:masterClrMapping/>
   </p:clrMapOvr>
-  <mc:AlternateContent xmlns:mc="http://schemas.openxmlformats.org/markup-compatibility/2006">
-    <mc:Choice xmlns:p14="http://schemas.microsoft.com/office/powerpoint/2010/main" Requires="p14">
+  <mc:AlternateContent xmlns:mc="http://schemas.openxmlformats.org/markup-compatibility/2006" xmlns:p14="http://schemas.microsoft.com/office/powerpoint/2010/main">
+    <mc:Choice Requires="p14">
       <p:transition spd="slow" p14:dur="1200">
         <p:dissolve/>
       </p:transition>
     </mc:Choice>
-    <mc:Fallback>
+    <mc:Fallback xmlns="">
       <p:transition spd="slow">
         <p:dissolve/>
       </p:transition>
@@ -10168,6 +10619,1009 @@
 </p:sld>
 </file>
 
+<file path=ppt/slides/slide8.xml><?xml version="1.0" encoding="utf-8"?>
+<p:sld xmlns:a="http://schemas.openxmlformats.org/drawingml/2006/main" xmlns:r="http://schemas.openxmlformats.org/officeDocument/2006/relationships" xmlns:p="http://schemas.openxmlformats.org/presentationml/2006/main">
+  <p:cSld>
+    <p:spTree>
+      <p:nvGrpSpPr>
+        <p:cNvPr id="1" name=""/>
+        <p:cNvGrpSpPr/>
+        <p:nvPr/>
+      </p:nvGrpSpPr>
+      <p:grpSpPr>
+        <a:xfrm>
+          <a:off x="0" y="0"/>
+          <a:ext cx="0" cy="0"/>
+          <a:chOff x="0" y="0"/>
+          <a:chExt cx="0" cy="0"/>
+        </a:xfrm>
+      </p:grpSpPr>
+      <p:sp>
+        <p:nvSpPr>
+          <p:cNvPr id="2" name="Título 1"/>
+          <p:cNvSpPr>
+            <a:spLocks noGrp="1"/>
+          </p:cNvSpPr>
+          <p:nvPr>
+            <p:ph type="title"/>
+          </p:nvPr>
+        </p:nvSpPr>
+        <p:spPr/>
+        <p:txBody>
+          <a:bodyPr/>
+          <a:lstStyle/>
+          <a:p>
+            <a:r>
+              <a:rPr lang="pt-BR" dirty="0"/>
+              <a:t>UML (</a:t>
+            </a:r>
+            <a:r>
+              <a:rPr lang="pt-BR" dirty="0" err="1"/>
+              <a:t>Unified</a:t>
+            </a:r>
+            <a:r>
+              <a:rPr lang="pt-BR" dirty="0"/>
+              <a:t> </a:t>
+            </a:r>
+            <a:r>
+              <a:rPr lang="pt-BR" dirty="0" err="1"/>
+              <a:t>Modeling</a:t>
+            </a:r>
+            <a:r>
+              <a:rPr lang="pt-BR" dirty="0"/>
+              <a:t> </a:t>
+            </a:r>
+            <a:r>
+              <a:rPr lang="pt-BR" dirty="0" err="1"/>
+              <a:t>Language</a:t>
+            </a:r>
+            <a:r>
+              <a:rPr lang="pt-BR" dirty="0"/>
+              <a:t>)</a:t>
+            </a:r>
+          </a:p>
+        </p:txBody>
+      </p:sp>
+      <p:sp>
+        <p:nvSpPr>
+          <p:cNvPr id="3" name="Espaço Reservado para Conteúdo 2"/>
+          <p:cNvSpPr>
+            <a:spLocks noGrp="1"/>
+          </p:cNvSpPr>
+          <p:nvPr>
+            <p:ph idx="1"/>
+          </p:nvPr>
+        </p:nvSpPr>
+        <p:spPr/>
+        <p:txBody>
+          <a:bodyPr>
+            <a:normAutofit/>
+          </a:bodyPr>
+          <a:lstStyle/>
+          <a:p>
+            <a:pPr>
+              <a:buFont typeface="Wingdings" panose="05000000000000000000" pitchFamily="2" charset="2"/>
+              <a:buChar char="q"/>
+            </a:pPr>
+            <a:r>
+              <a:rPr lang="pt-BR" sz="2400" dirty="0"/>
+              <a:t>Padrão de modelagem de sistemas orientados a objeto;</a:t>
+            </a:r>
+          </a:p>
+          <a:p>
+            <a:pPr>
+              <a:buFont typeface="Wingdings" panose="05000000000000000000" pitchFamily="2" charset="2"/>
+              <a:buChar char="q"/>
+            </a:pPr>
+            <a:r>
+              <a:rPr lang="pt-BR" sz="2400" dirty="0"/>
+              <a:t>Surgiu nos anos 90;</a:t>
+            </a:r>
+          </a:p>
+          <a:p>
+            <a:pPr>
+              <a:buFont typeface="Wingdings" panose="05000000000000000000" pitchFamily="2" charset="2"/>
+              <a:buChar char="q"/>
+            </a:pPr>
+            <a:r>
+              <a:rPr lang="pt-BR" sz="2400" dirty="0"/>
+              <a:t>Eficiente;</a:t>
+            </a:r>
+          </a:p>
+          <a:p>
+            <a:pPr>
+              <a:buFont typeface="Wingdings" panose="05000000000000000000" pitchFamily="2" charset="2"/>
+              <a:buChar char="q"/>
+            </a:pPr>
+            <a:r>
+              <a:rPr lang="pt-BR" sz="2400" dirty="0"/>
+              <a:t>Muito utilizado no mercado de trabalho.</a:t>
+            </a:r>
+          </a:p>
+        </p:txBody>
+      </p:sp>
+      <p:pic>
+        <p:nvPicPr>
+          <p:cNvPr id="4" name="Imagem 3"/>
+          <p:cNvPicPr>
+            <a:picLocks noChangeAspect="1"/>
+          </p:cNvPicPr>
+          <p:nvPr/>
+        </p:nvPicPr>
+        <p:blipFill>
+          <a:blip r:embed="rId2"/>
+          <a:stretch>
+            <a:fillRect/>
+          </a:stretch>
+        </p:blipFill>
+        <p:spPr>
+          <a:xfrm>
+            <a:off x="5876920" y="4100975"/>
+            <a:ext cx="2394000" cy="2567565"/>
+          </a:xfrm>
+          <a:prstGeom prst="rect">
+            <a:avLst/>
+          </a:prstGeom>
+        </p:spPr>
+      </p:pic>
+    </p:spTree>
+    <p:extLst>
+      <p:ext uri="{BB962C8B-B14F-4D97-AF65-F5344CB8AC3E}">
+        <p14:creationId xmlns:p14="http://schemas.microsoft.com/office/powerpoint/2010/main" val="1286497085"/>
+      </p:ext>
+    </p:extLst>
+  </p:cSld>
+  <p:clrMapOvr>
+    <a:masterClrMapping/>
+  </p:clrMapOvr>
+  <p:transition spd="slow">
+    <p:wipe/>
+  </p:transition>
+  <p:timing>
+    <p:tnLst>
+      <p:par>
+        <p:cTn id="1" dur="indefinite" restart="never" nodeType="tmRoot">
+          <p:childTnLst>
+            <p:seq concurrent="1" nextAc="seek">
+              <p:cTn id="2" dur="indefinite" nodeType="mainSeq">
+                <p:childTnLst>
+                  <p:par>
+                    <p:cTn id="3" fill="hold">
+                      <p:stCondLst>
+                        <p:cond delay="indefinite"/>
+                        <p:cond evt="onBegin" delay="0">
+                          <p:tn val="2"/>
+                        </p:cond>
+                      </p:stCondLst>
+                      <p:childTnLst>
+                        <p:par>
+                          <p:cTn id="4" fill="hold">
+                            <p:stCondLst>
+                              <p:cond delay="0"/>
+                            </p:stCondLst>
+                            <p:childTnLst>
+                              <p:par>
+                                <p:cTn id="5" presetID="10" presetClass="entr" presetSubtype="0" fill="hold" grpId="0" nodeType="withEffect">
+                                  <p:stCondLst>
+                                    <p:cond delay="0"/>
+                                  </p:stCondLst>
+                                  <p:childTnLst>
+                                    <p:set>
+                                      <p:cBhvr>
+                                        <p:cTn id="6" dur="1" fill="hold">
+                                          <p:stCondLst>
+                                            <p:cond delay="0"/>
+                                          </p:stCondLst>
+                                        </p:cTn>
+                                        <p:tgtEl>
+                                          <p:spTgt spid="2"/>
+                                        </p:tgtEl>
+                                        <p:attrNameLst>
+                                          <p:attrName>style.visibility</p:attrName>
+                                        </p:attrNameLst>
+                                      </p:cBhvr>
+                                      <p:to>
+                                        <p:strVal val="visible"/>
+                                      </p:to>
+                                    </p:set>
+                                    <p:animEffect transition="in" filter="fade">
+                                      <p:cBhvr>
+                                        <p:cTn id="7" dur="500"/>
+                                        <p:tgtEl>
+                                          <p:spTgt spid="2"/>
+                                        </p:tgtEl>
+                                      </p:cBhvr>
+                                    </p:animEffect>
+                                  </p:childTnLst>
+                                </p:cTn>
+                              </p:par>
+                              <p:par>
+                                <p:cTn id="8" presetID="10" presetClass="entr" presetSubtype="0" fill="hold" nodeType="withEffect">
+                                  <p:stCondLst>
+                                    <p:cond delay="0"/>
+                                  </p:stCondLst>
+                                  <p:childTnLst>
+                                    <p:set>
+                                      <p:cBhvr>
+                                        <p:cTn id="9" dur="1" fill="hold">
+                                          <p:stCondLst>
+                                            <p:cond delay="0"/>
+                                          </p:stCondLst>
+                                        </p:cTn>
+                                        <p:tgtEl>
+                                          <p:spTgt spid="4"/>
+                                        </p:tgtEl>
+                                        <p:attrNameLst>
+                                          <p:attrName>style.visibility</p:attrName>
+                                        </p:attrNameLst>
+                                      </p:cBhvr>
+                                      <p:to>
+                                        <p:strVal val="visible"/>
+                                      </p:to>
+                                    </p:set>
+                                    <p:animEffect transition="in" filter="fade">
+                                      <p:cBhvr>
+                                        <p:cTn id="10" dur="500"/>
+                                        <p:tgtEl>
+                                          <p:spTgt spid="4"/>
+                                        </p:tgtEl>
+                                      </p:cBhvr>
+                                    </p:animEffect>
+                                  </p:childTnLst>
+                                </p:cTn>
+                              </p:par>
+                            </p:childTnLst>
+                          </p:cTn>
+                        </p:par>
+                      </p:childTnLst>
+                    </p:cTn>
+                  </p:par>
+                  <p:par>
+                    <p:cTn id="11" fill="hold">
+                      <p:stCondLst>
+                        <p:cond delay="indefinite"/>
+                      </p:stCondLst>
+                      <p:childTnLst>
+                        <p:par>
+                          <p:cTn id="12" fill="hold">
+                            <p:stCondLst>
+                              <p:cond delay="0"/>
+                            </p:stCondLst>
+                            <p:childTnLst>
+                              <p:par>
+                                <p:cTn id="13" presetID="2" presetClass="entr" presetSubtype="4" fill="hold" nodeType="clickEffect">
+                                  <p:stCondLst>
+                                    <p:cond delay="0"/>
+                                  </p:stCondLst>
+                                  <p:childTnLst>
+                                    <p:set>
+                                      <p:cBhvr>
+                                        <p:cTn id="14" dur="1" fill="hold">
+                                          <p:stCondLst>
+                                            <p:cond delay="0"/>
+                                          </p:stCondLst>
+                                        </p:cTn>
+                                        <p:tgtEl>
+                                          <p:spTgt spid="3">
+                                            <p:txEl>
+                                              <p:pRg st="0" end="0"/>
+                                            </p:txEl>
+                                          </p:spTgt>
+                                        </p:tgtEl>
+                                        <p:attrNameLst>
+                                          <p:attrName>style.visibility</p:attrName>
+                                        </p:attrNameLst>
+                                      </p:cBhvr>
+                                      <p:to>
+                                        <p:strVal val="visible"/>
+                                      </p:to>
+                                    </p:set>
+                                    <p:anim calcmode="lin" valueType="num">
+                                      <p:cBhvr additive="base">
+                                        <p:cTn id="15" dur="500" fill="hold"/>
+                                        <p:tgtEl>
+                                          <p:spTgt spid="3">
+                                            <p:txEl>
+                                              <p:pRg st="0" end="0"/>
+                                            </p:txEl>
+                                          </p:spTgt>
+                                        </p:tgtEl>
+                                        <p:attrNameLst>
+                                          <p:attrName>ppt_x</p:attrName>
+                                        </p:attrNameLst>
+                                      </p:cBhvr>
+                                      <p:tavLst>
+                                        <p:tav tm="0">
+                                          <p:val>
+                                            <p:strVal val="#ppt_x"/>
+                                          </p:val>
+                                        </p:tav>
+                                        <p:tav tm="100000">
+                                          <p:val>
+                                            <p:strVal val="#ppt_x"/>
+                                          </p:val>
+                                        </p:tav>
+                                      </p:tavLst>
+                                    </p:anim>
+                                    <p:anim calcmode="lin" valueType="num">
+                                      <p:cBhvr additive="base">
+                                        <p:cTn id="16" dur="500" fill="hold"/>
+                                        <p:tgtEl>
+                                          <p:spTgt spid="3">
+                                            <p:txEl>
+                                              <p:pRg st="0" end="0"/>
+                                            </p:txEl>
+                                          </p:spTgt>
+                                        </p:tgtEl>
+                                        <p:attrNameLst>
+                                          <p:attrName>ppt_y</p:attrName>
+                                        </p:attrNameLst>
+                                      </p:cBhvr>
+                                      <p:tavLst>
+                                        <p:tav tm="0">
+                                          <p:val>
+                                            <p:strVal val="1+#ppt_h/2"/>
+                                          </p:val>
+                                        </p:tav>
+                                        <p:tav tm="100000">
+                                          <p:val>
+                                            <p:strVal val="#ppt_y"/>
+                                          </p:val>
+                                        </p:tav>
+                                      </p:tavLst>
+                                    </p:anim>
+                                  </p:childTnLst>
+                                </p:cTn>
+                              </p:par>
+                            </p:childTnLst>
+                          </p:cTn>
+                        </p:par>
+                      </p:childTnLst>
+                    </p:cTn>
+                  </p:par>
+                  <p:par>
+                    <p:cTn id="17" fill="hold">
+                      <p:stCondLst>
+                        <p:cond delay="indefinite"/>
+                      </p:stCondLst>
+                      <p:childTnLst>
+                        <p:par>
+                          <p:cTn id="18" fill="hold">
+                            <p:stCondLst>
+                              <p:cond delay="0"/>
+                            </p:stCondLst>
+                            <p:childTnLst>
+                              <p:par>
+                                <p:cTn id="19" presetID="2" presetClass="entr" presetSubtype="4" fill="hold" nodeType="clickEffect">
+                                  <p:stCondLst>
+                                    <p:cond delay="0"/>
+                                  </p:stCondLst>
+                                  <p:childTnLst>
+                                    <p:set>
+                                      <p:cBhvr>
+                                        <p:cTn id="20" dur="1" fill="hold">
+                                          <p:stCondLst>
+                                            <p:cond delay="0"/>
+                                          </p:stCondLst>
+                                        </p:cTn>
+                                        <p:tgtEl>
+                                          <p:spTgt spid="3">
+                                            <p:txEl>
+                                              <p:pRg st="1" end="1"/>
+                                            </p:txEl>
+                                          </p:spTgt>
+                                        </p:tgtEl>
+                                        <p:attrNameLst>
+                                          <p:attrName>style.visibility</p:attrName>
+                                        </p:attrNameLst>
+                                      </p:cBhvr>
+                                      <p:to>
+                                        <p:strVal val="visible"/>
+                                      </p:to>
+                                    </p:set>
+                                    <p:anim calcmode="lin" valueType="num">
+                                      <p:cBhvr additive="base">
+                                        <p:cTn id="21" dur="500" fill="hold"/>
+                                        <p:tgtEl>
+                                          <p:spTgt spid="3">
+                                            <p:txEl>
+                                              <p:pRg st="1" end="1"/>
+                                            </p:txEl>
+                                          </p:spTgt>
+                                        </p:tgtEl>
+                                        <p:attrNameLst>
+                                          <p:attrName>ppt_x</p:attrName>
+                                        </p:attrNameLst>
+                                      </p:cBhvr>
+                                      <p:tavLst>
+                                        <p:tav tm="0">
+                                          <p:val>
+                                            <p:strVal val="#ppt_x"/>
+                                          </p:val>
+                                        </p:tav>
+                                        <p:tav tm="100000">
+                                          <p:val>
+                                            <p:strVal val="#ppt_x"/>
+                                          </p:val>
+                                        </p:tav>
+                                      </p:tavLst>
+                                    </p:anim>
+                                    <p:anim calcmode="lin" valueType="num">
+                                      <p:cBhvr additive="base">
+                                        <p:cTn id="22" dur="500" fill="hold"/>
+                                        <p:tgtEl>
+                                          <p:spTgt spid="3">
+                                            <p:txEl>
+                                              <p:pRg st="1" end="1"/>
+                                            </p:txEl>
+                                          </p:spTgt>
+                                        </p:tgtEl>
+                                        <p:attrNameLst>
+                                          <p:attrName>ppt_y</p:attrName>
+                                        </p:attrNameLst>
+                                      </p:cBhvr>
+                                      <p:tavLst>
+                                        <p:tav tm="0">
+                                          <p:val>
+                                            <p:strVal val="1+#ppt_h/2"/>
+                                          </p:val>
+                                        </p:tav>
+                                        <p:tav tm="100000">
+                                          <p:val>
+                                            <p:strVal val="#ppt_y"/>
+                                          </p:val>
+                                        </p:tav>
+                                      </p:tavLst>
+                                    </p:anim>
+                                  </p:childTnLst>
+                                </p:cTn>
+                              </p:par>
+                            </p:childTnLst>
+                          </p:cTn>
+                        </p:par>
+                      </p:childTnLst>
+                    </p:cTn>
+                  </p:par>
+                  <p:par>
+                    <p:cTn id="23" fill="hold">
+                      <p:stCondLst>
+                        <p:cond delay="indefinite"/>
+                      </p:stCondLst>
+                      <p:childTnLst>
+                        <p:par>
+                          <p:cTn id="24" fill="hold">
+                            <p:stCondLst>
+                              <p:cond delay="0"/>
+                            </p:stCondLst>
+                            <p:childTnLst>
+                              <p:par>
+                                <p:cTn id="25" presetID="2" presetClass="entr" presetSubtype="4" fill="hold" nodeType="clickEffect">
+                                  <p:stCondLst>
+                                    <p:cond delay="0"/>
+                                  </p:stCondLst>
+                                  <p:childTnLst>
+                                    <p:set>
+                                      <p:cBhvr>
+                                        <p:cTn id="26" dur="1" fill="hold">
+                                          <p:stCondLst>
+                                            <p:cond delay="0"/>
+                                          </p:stCondLst>
+                                        </p:cTn>
+                                        <p:tgtEl>
+                                          <p:spTgt spid="3">
+                                            <p:txEl>
+                                              <p:pRg st="2" end="2"/>
+                                            </p:txEl>
+                                          </p:spTgt>
+                                        </p:tgtEl>
+                                        <p:attrNameLst>
+                                          <p:attrName>style.visibility</p:attrName>
+                                        </p:attrNameLst>
+                                      </p:cBhvr>
+                                      <p:to>
+                                        <p:strVal val="visible"/>
+                                      </p:to>
+                                    </p:set>
+                                    <p:anim calcmode="lin" valueType="num">
+                                      <p:cBhvr additive="base">
+                                        <p:cTn id="27" dur="500" fill="hold"/>
+                                        <p:tgtEl>
+                                          <p:spTgt spid="3">
+                                            <p:txEl>
+                                              <p:pRg st="2" end="2"/>
+                                            </p:txEl>
+                                          </p:spTgt>
+                                        </p:tgtEl>
+                                        <p:attrNameLst>
+                                          <p:attrName>ppt_x</p:attrName>
+                                        </p:attrNameLst>
+                                      </p:cBhvr>
+                                      <p:tavLst>
+                                        <p:tav tm="0">
+                                          <p:val>
+                                            <p:strVal val="#ppt_x"/>
+                                          </p:val>
+                                        </p:tav>
+                                        <p:tav tm="100000">
+                                          <p:val>
+                                            <p:strVal val="#ppt_x"/>
+                                          </p:val>
+                                        </p:tav>
+                                      </p:tavLst>
+                                    </p:anim>
+                                    <p:anim calcmode="lin" valueType="num">
+                                      <p:cBhvr additive="base">
+                                        <p:cTn id="28" dur="500" fill="hold"/>
+                                        <p:tgtEl>
+                                          <p:spTgt spid="3">
+                                            <p:txEl>
+                                              <p:pRg st="2" end="2"/>
+                                            </p:txEl>
+                                          </p:spTgt>
+                                        </p:tgtEl>
+                                        <p:attrNameLst>
+                                          <p:attrName>ppt_y</p:attrName>
+                                        </p:attrNameLst>
+                                      </p:cBhvr>
+                                      <p:tavLst>
+                                        <p:tav tm="0">
+                                          <p:val>
+                                            <p:strVal val="1+#ppt_h/2"/>
+                                          </p:val>
+                                        </p:tav>
+                                        <p:tav tm="100000">
+                                          <p:val>
+                                            <p:strVal val="#ppt_y"/>
+                                          </p:val>
+                                        </p:tav>
+                                      </p:tavLst>
+                                    </p:anim>
+                                  </p:childTnLst>
+                                </p:cTn>
+                              </p:par>
+                            </p:childTnLst>
+                          </p:cTn>
+                        </p:par>
+                      </p:childTnLst>
+                    </p:cTn>
+                  </p:par>
+                  <p:par>
+                    <p:cTn id="29" fill="hold">
+                      <p:stCondLst>
+                        <p:cond delay="indefinite"/>
+                      </p:stCondLst>
+                      <p:childTnLst>
+                        <p:par>
+                          <p:cTn id="30" fill="hold">
+                            <p:stCondLst>
+                              <p:cond delay="0"/>
+                            </p:stCondLst>
+                            <p:childTnLst>
+                              <p:par>
+                                <p:cTn id="31" presetID="2" presetClass="entr" presetSubtype="4" fill="hold" nodeType="clickEffect">
+                                  <p:stCondLst>
+                                    <p:cond delay="0"/>
+                                  </p:stCondLst>
+                                  <p:childTnLst>
+                                    <p:set>
+                                      <p:cBhvr>
+                                        <p:cTn id="32" dur="1" fill="hold">
+                                          <p:stCondLst>
+                                            <p:cond delay="0"/>
+                                          </p:stCondLst>
+                                        </p:cTn>
+                                        <p:tgtEl>
+                                          <p:spTgt spid="3">
+                                            <p:txEl>
+                                              <p:pRg st="3" end="3"/>
+                                            </p:txEl>
+                                          </p:spTgt>
+                                        </p:tgtEl>
+                                        <p:attrNameLst>
+                                          <p:attrName>style.visibility</p:attrName>
+                                        </p:attrNameLst>
+                                      </p:cBhvr>
+                                      <p:to>
+                                        <p:strVal val="visible"/>
+                                      </p:to>
+                                    </p:set>
+                                    <p:anim calcmode="lin" valueType="num">
+                                      <p:cBhvr additive="base">
+                                        <p:cTn id="33" dur="500" fill="hold"/>
+                                        <p:tgtEl>
+                                          <p:spTgt spid="3">
+                                            <p:txEl>
+                                              <p:pRg st="3" end="3"/>
+                                            </p:txEl>
+                                          </p:spTgt>
+                                        </p:tgtEl>
+                                        <p:attrNameLst>
+                                          <p:attrName>ppt_x</p:attrName>
+                                        </p:attrNameLst>
+                                      </p:cBhvr>
+                                      <p:tavLst>
+                                        <p:tav tm="0">
+                                          <p:val>
+                                            <p:strVal val="#ppt_x"/>
+                                          </p:val>
+                                        </p:tav>
+                                        <p:tav tm="100000">
+                                          <p:val>
+                                            <p:strVal val="#ppt_x"/>
+                                          </p:val>
+                                        </p:tav>
+                                      </p:tavLst>
+                                    </p:anim>
+                                    <p:anim calcmode="lin" valueType="num">
+                                      <p:cBhvr additive="base">
+                                        <p:cTn id="34" dur="500" fill="hold"/>
+                                        <p:tgtEl>
+                                          <p:spTgt spid="3">
+                                            <p:txEl>
+                                              <p:pRg st="3" end="3"/>
+                                            </p:txEl>
+                                          </p:spTgt>
+                                        </p:tgtEl>
+                                        <p:attrNameLst>
+                                          <p:attrName>ppt_y</p:attrName>
+                                        </p:attrNameLst>
+                                      </p:cBhvr>
+                                      <p:tavLst>
+                                        <p:tav tm="0">
+                                          <p:val>
+                                            <p:strVal val="1+#ppt_h/2"/>
+                                          </p:val>
+                                        </p:tav>
+                                        <p:tav tm="100000">
+                                          <p:val>
+                                            <p:strVal val="#ppt_y"/>
+                                          </p:val>
+                                        </p:tav>
+                                      </p:tavLst>
+                                    </p:anim>
+                                  </p:childTnLst>
+                                </p:cTn>
+                              </p:par>
+                            </p:childTnLst>
+                          </p:cTn>
+                        </p:par>
+                      </p:childTnLst>
+                    </p:cTn>
+                  </p:par>
+                </p:childTnLst>
+              </p:cTn>
+              <p:prevCondLst>
+                <p:cond evt="onPrev" delay="0">
+                  <p:tgtEl>
+                    <p:sldTgt/>
+                  </p:tgtEl>
+                </p:cond>
+              </p:prevCondLst>
+              <p:nextCondLst>
+                <p:cond evt="onNext" delay="0">
+                  <p:tgtEl>
+                    <p:sldTgt/>
+                  </p:tgtEl>
+                </p:cond>
+              </p:nextCondLst>
+            </p:seq>
+          </p:childTnLst>
+        </p:cTn>
+      </p:par>
+    </p:tnLst>
+    <p:bldLst>
+      <p:bldP spid="2" grpId="0"/>
+    </p:bldLst>
+  </p:timing>
+</p:sld>
+</file>
+
+<file path=ppt/slides/slide9.xml><?xml version="1.0" encoding="utf-8"?>
+<p:sld xmlns:a="http://schemas.openxmlformats.org/drawingml/2006/main" xmlns:r="http://schemas.openxmlformats.org/officeDocument/2006/relationships" xmlns:p="http://schemas.openxmlformats.org/presentationml/2006/main">
+  <p:cSld>
+    <p:spTree>
+      <p:nvGrpSpPr>
+        <p:cNvPr id="1" name=""/>
+        <p:cNvGrpSpPr/>
+        <p:nvPr/>
+      </p:nvGrpSpPr>
+      <p:grpSpPr>
+        <a:xfrm>
+          <a:off x="0" y="0"/>
+          <a:ext cx="0" cy="0"/>
+          <a:chOff x="0" y="0"/>
+          <a:chExt cx="0" cy="0"/>
+        </a:xfrm>
+      </p:grpSpPr>
+      <p:sp>
+        <p:nvSpPr>
+          <p:cNvPr id="2" name="Título 1"/>
+          <p:cNvSpPr>
+            <a:spLocks noGrp="1"/>
+          </p:cNvSpPr>
+          <p:nvPr>
+            <p:ph type="title"/>
+          </p:nvPr>
+        </p:nvSpPr>
+        <p:spPr/>
+        <p:txBody>
+          <a:bodyPr/>
+          <a:lstStyle/>
+          <a:p>
+            <a:r>
+              <a:rPr lang="pt-BR" dirty="0"/>
+              <a:t>Controle de versão</a:t>
+            </a:r>
+          </a:p>
+        </p:txBody>
+      </p:sp>
+      <p:pic>
+        <p:nvPicPr>
+          <p:cNvPr id="4" name="Espaço Reservado para Conteúdo 3"/>
+          <p:cNvPicPr>
+            <a:picLocks noGrp="1" noChangeAspect="1"/>
+          </p:cNvPicPr>
+          <p:nvPr>
+            <p:ph idx="1"/>
+          </p:nvPr>
+        </p:nvPicPr>
+        <p:blipFill>
+          <a:blip r:embed="rId2"/>
+          <a:stretch>
+            <a:fillRect/>
+          </a:stretch>
+        </p:blipFill>
+        <p:spPr>
+          <a:xfrm>
+            <a:off x="473326" y="2871956"/>
+            <a:ext cx="4244033" cy="1772233"/>
+          </a:xfrm>
+        </p:spPr>
+      </p:pic>
+      <p:pic>
+        <p:nvPicPr>
+          <p:cNvPr id="5" name="Imagem 4"/>
+          <p:cNvPicPr>
+            <a:picLocks noChangeAspect="1"/>
+          </p:cNvPicPr>
+          <p:nvPr/>
+        </p:nvPicPr>
+        <p:blipFill>
+          <a:blip r:embed="rId3"/>
+          <a:stretch>
+            <a:fillRect/>
+          </a:stretch>
+        </p:blipFill>
+        <p:spPr>
+          <a:xfrm>
+            <a:off x="4975668" y="2805572"/>
+            <a:ext cx="4762500" cy="1905000"/>
+          </a:xfrm>
+          <a:prstGeom prst="rect">
+            <a:avLst/>
+          </a:prstGeom>
+        </p:spPr>
+      </p:pic>
+    </p:spTree>
+    <p:extLst>
+      <p:ext uri="{BB962C8B-B14F-4D97-AF65-F5344CB8AC3E}">
+        <p14:creationId xmlns:p14="http://schemas.microsoft.com/office/powerpoint/2010/main" val="3238097790"/>
+      </p:ext>
+    </p:extLst>
+  </p:cSld>
+  <p:clrMapOvr>
+    <a:masterClrMapping/>
+  </p:clrMapOvr>
+  <mc:AlternateContent xmlns:mc="http://schemas.openxmlformats.org/markup-compatibility/2006" xmlns:p159="http://schemas.microsoft.com/office/powerpoint/2015/09/main">
+    <mc:Choice Requires="p159">
+      <p:transition xmlns:p14="http://schemas.microsoft.com/office/powerpoint/2010/main" spd="slow" p14:dur="2000">
+        <p159:morph option="byObject"/>
+      </p:transition>
+    </mc:Choice>
+    <mc:Fallback xmlns="">
+      <p:transition spd="slow">
+        <p:fade/>
+      </p:transition>
+    </mc:Fallback>
+  </mc:AlternateContent>
+  <p:timing>
+    <p:tnLst>
+      <p:par>
+        <p:cTn id="1" dur="indefinite" restart="never" nodeType="tmRoot">
+          <p:childTnLst>
+            <p:seq concurrent="1" nextAc="seek">
+              <p:cTn id="2" dur="indefinite" nodeType="mainSeq">
+                <p:childTnLst>
+                  <p:par>
+                    <p:cTn id="3" fill="hold">
+                      <p:stCondLst>
+                        <p:cond delay="indefinite"/>
+                        <p:cond evt="onBegin" delay="0">
+                          <p:tn val="2"/>
+                        </p:cond>
+                      </p:stCondLst>
+                      <p:childTnLst>
+                        <p:par>
+                          <p:cTn id="4" fill="hold">
+                            <p:stCondLst>
+                              <p:cond delay="0"/>
+                            </p:stCondLst>
+                            <p:childTnLst>
+                              <p:par>
+                                <p:cTn id="5" presetID="10" presetClass="entr" presetSubtype="0" fill="hold" grpId="0" nodeType="withEffect">
+                                  <p:stCondLst>
+                                    <p:cond delay="0"/>
+                                  </p:stCondLst>
+                                  <p:childTnLst>
+                                    <p:set>
+                                      <p:cBhvr>
+                                        <p:cTn id="6" dur="1" fill="hold">
+                                          <p:stCondLst>
+                                            <p:cond delay="0"/>
+                                          </p:stCondLst>
+                                        </p:cTn>
+                                        <p:tgtEl>
+                                          <p:spTgt spid="2"/>
+                                        </p:tgtEl>
+                                        <p:attrNameLst>
+                                          <p:attrName>style.visibility</p:attrName>
+                                        </p:attrNameLst>
+                                      </p:cBhvr>
+                                      <p:to>
+                                        <p:strVal val="visible"/>
+                                      </p:to>
+                                    </p:set>
+                                    <p:animEffect transition="in" filter="fade">
+                                      <p:cBhvr>
+                                        <p:cTn id="7" dur="500"/>
+                                        <p:tgtEl>
+                                          <p:spTgt spid="2"/>
+                                        </p:tgtEl>
+                                      </p:cBhvr>
+                                    </p:animEffect>
+                                  </p:childTnLst>
+                                </p:cTn>
+                              </p:par>
+                            </p:childTnLst>
+                          </p:cTn>
+                        </p:par>
+                      </p:childTnLst>
+                    </p:cTn>
+                  </p:par>
+                  <p:par>
+                    <p:cTn id="8" fill="hold">
+                      <p:stCondLst>
+                        <p:cond delay="indefinite"/>
+                      </p:stCondLst>
+                      <p:childTnLst>
+                        <p:par>
+                          <p:cTn id="9" fill="hold">
+                            <p:stCondLst>
+                              <p:cond delay="0"/>
+                            </p:stCondLst>
+                            <p:childTnLst>
+                              <p:par>
+                                <p:cTn id="10" presetID="14" presetClass="entr" presetSubtype="10" fill="hold" nodeType="clickEffect">
+                                  <p:stCondLst>
+                                    <p:cond delay="0"/>
+                                  </p:stCondLst>
+                                  <p:childTnLst>
+                                    <p:set>
+                                      <p:cBhvr>
+                                        <p:cTn id="11" dur="1" fill="hold">
+                                          <p:stCondLst>
+                                            <p:cond delay="0"/>
+                                          </p:stCondLst>
+                                        </p:cTn>
+                                        <p:tgtEl>
+                                          <p:spTgt spid="4"/>
+                                        </p:tgtEl>
+                                        <p:attrNameLst>
+                                          <p:attrName>style.visibility</p:attrName>
+                                        </p:attrNameLst>
+                                      </p:cBhvr>
+                                      <p:to>
+                                        <p:strVal val="visible"/>
+                                      </p:to>
+                                    </p:set>
+                                    <p:animEffect transition="in" filter="randombar(horizontal)">
+                                      <p:cBhvr>
+                                        <p:cTn id="12" dur="500"/>
+                                        <p:tgtEl>
+                                          <p:spTgt spid="4"/>
+                                        </p:tgtEl>
+                                      </p:cBhvr>
+                                    </p:animEffect>
+                                  </p:childTnLst>
+                                </p:cTn>
+                              </p:par>
+                            </p:childTnLst>
+                          </p:cTn>
+                        </p:par>
+                      </p:childTnLst>
+                    </p:cTn>
+                  </p:par>
+                  <p:par>
+                    <p:cTn id="13" fill="hold">
+                      <p:stCondLst>
+                        <p:cond delay="indefinite"/>
+                      </p:stCondLst>
+                      <p:childTnLst>
+                        <p:par>
+                          <p:cTn id="14" fill="hold">
+                            <p:stCondLst>
+                              <p:cond delay="0"/>
+                            </p:stCondLst>
+                            <p:childTnLst>
+                              <p:par>
+                                <p:cTn id="15" presetID="14" presetClass="entr" presetSubtype="10" fill="hold" nodeType="clickEffect">
+                                  <p:stCondLst>
+                                    <p:cond delay="0"/>
+                                  </p:stCondLst>
+                                  <p:childTnLst>
+                                    <p:set>
+                                      <p:cBhvr>
+                                        <p:cTn id="16" dur="1" fill="hold">
+                                          <p:stCondLst>
+                                            <p:cond delay="0"/>
+                                          </p:stCondLst>
+                                        </p:cTn>
+                                        <p:tgtEl>
+                                          <p:spTgt spid="5"/>
+                                        </p:tgtEl>
+                                        <p:attrNameLst>
+                                          <p:attrName>style.visibility</p:attrName>
+                                        </p:attrNameLst>
+                                      </p:cBhvr>
+                                      <p:to>
+                                        <p:strVal val="visible"/>
+                                      </p:to>
+                                    </p:set>
+                                    <p:animEffect transition="in" filter="randombar(horizontal)">
+                                      <p:cBhvr>
+                                        <p:cTn id="17" dur="500"/>
+                                        <p:tgtEl>
+                                          <p:spTgt spid="5"/>
+                                        </p:tgtEl>
+                                      </p:cBhvr>
+                                    </p:animEffect>
+                                  </p:childTnLst>
+                                </p:cTn>
+                              </p:par>
+                            </p:childTnLst>
+                          </p:cTn>
+                        </p:par>
+                      </p:childTnLst>
+                    </p:cTn>
+                  </p:par>
+                </p:childTnLst>
+              </p:cTn>
+              <p:prevCondLst>
+                <p:cond evt="onPrev" delay="0">
+                  <p:tgtEl>
+                    <p:sldTgt/>
+                  </p:tgtEl>
+                </p:cond>
+              </p:prevCondLst>
+              <p:nextCondLst>
+                <p:cond evt="onNext" delay="0">
+                  <p:tgtEl>
+                    <p:sldTgt/>
+                  </p:tgtEl>
+                </p:cond>
+              </p:nextCondLst>
+            </p:seq>
+          </p:childTnLst>
+        </p:cTn>
+      </p:par>
+    </p:tnLst>
+    <p:bldLst>
+      <p:bldP spid="2" grpId="0"/>
+    </p:bldLst>
+  </p:timing>
+</p:sld>
+</file>
+
 <file path=ppt/theme/theme1.xml><?xml version="1.0" encoding="utf-8"?>
 <a:theme xmlns:a="http://schemas.openxmlformats.org/drawingml/2006/main" name="Facetado">
   <a:themeElements>
@@ -10423,4 +11877,299 @@
     </a:ext>
   </a:extLst>
 </a:theme>
+</file>
+
+<file path=ppt/theme/theme2.xml><?xml version="1.0" encoding="utf-8"?>
+<a:theme xmlns:a="http://schemas.openxmlformats.org/drawingml/2006/main" name="Tema do Office">
+  <a:themeElements>
+    <a:clrScheme name="Office">
+      <a:dk1>
+        <a:sysClr val="windowText" lastClr="000000"/>
+      </a:dk1>
+      <a:lt1>
+        <a:sysClr val="window" lastClr="FFFFFF"/>
+      </a:lt1>
+      <a:dk2>
+        <a:srgbClr val="44546A"/>
+      </a:dk2>
+      <a:lt2>
+        <a:srgbClr val="E7E6E6"/>
+      </a:lt2>
+      <a:accent1>
+        <a:srgbClr val="5B9BD5"/>
+      </a:accent1>
+      <a:accent2>
+        <a:srgbClr val="ED7D31"/>
+      </a:accent2>
+      <a:accent3>
+        <a:srgbClr val="A5A5A5"/>
+      </a:accent3>
+      <a:accent4>
+        <a:srgbClr val="FFC000"/>
+      </a:accent4>
+      <a:accent5>
+        <a:srgbClr val="4472C4"/>
+      </a:accent5>
+      <a:accent6>
+        <a:srgbClr val="70AD47"/>
+      </a:accent6>
+      <a:hlink>
+        <a:srgbClr val="0563C1"/>
+      </a:hlink>
+      <a:folHlink>
+        <a:srgbClr val="954F72"/>
+      </a:folHlink>
+    </a:clrScheme>
+    <a:fontScheme name="Office">
+      <a:majorFont>
+        <a:latin typeface="Calibri Light" panose="020F0302020204030204"/>
+        <a:ea typeface=""/>
+        <a:cs typeface=""/>
+        <a:font script="Jpan" typeface="游ゴシック Light"/>
+        <a:font script="Hang" typeface="맑은 고딕"/>
+        <a:font script="Hans" typeface="等线 Light"/>
+        <a:font script="Hant" typeface="新細明體"/>
+        <a:font script="Arab" typeface="Times New Roman"/>
+        <a:font script="Hebr" typeface="Times New Roman"/>
+        <a:font script="Thai" typeface="Angsana New"/>
+        <a:font script="Ethi" typeface="Nyala"/>
+        <a:font script="Beng" typeface="Vrinda"/>
+        <a:font script="Gujr" typeface="Shruti"/>
+        <a:font script="Khmr" typeface="MoolBoran"/>
+        <a:font script="Knda" typeface="Tunga"/>
+        <a:font script="Guru" typeface="Raavi"/>
+        <a:font script="Cans" typeface="Euphemia"/>
+        <a:font script="Cher" typeface="Plantagenet Cherokee"/>
+        <a:font script="Yiii" typeface="Microsoft Yi Baiti"/>
+        <a:font script="Tibt" typeface="Microsoft Himalaya"/>
+        <a:font script="Thaa" typeface="MV Boli"/>
+        <a:font script="Deva" typeface="Mangal"/>
+        <a:font script="Telu" typeface="Gautami"/>
+        <a:font script="Taml" typeface="Latha"/>
+        <a:font script="Syrc" typeface="Estrangelo Edessa"/>
+        <a:font script="Orya" typeface="Kalinga"/>
+        <a:font script="Mlym" typeface="Kartika"/>
+        <a:font script="Laoo" typeface="DokChampa"/>
+        <a:font script="Sinh" typeface="Iskoola Pota"/>
+        <a:font script="Mong" typeface="Mongolian Baiti"/>
+        <a:font script="Viet" typeface="Times New Roman"/>
+        <a:font script="Uigh" typeface="Microsoft Uighur"/>
+        <a:font script="Geor" typeface="Sylfaen"/>
+        <a:font script="Armn" typeface="Arial"/>
+        <a:font script="Bugi" typeface="Leelawadee UI"/>
+        <a:font script="Bopo" typeface="Microsoft JhengHei"/>
+        <a:font script="Java" typeface="Javanese Text"/>
+        <a:font script="Lisu" typeface="Segoe UI"/>
+        <a:font script="Mymr" typeface="Myanmar Text"/>
+        <a:font script="Nkoo" typeface="Ebrima"/>
+        <a:font script="Olck" typeface="Nirmala UI"/>
+        <a:font script="Osma" typeface="Ebrima"/>
+        <a:font script="Phag" typeface="Phagspa"/>
+        <a:font script="Syrn" typeface="Estrangelo Edessa"/>
+        <a:font script="Syrj" typeface="Estrangelo Edessa"/>
+        <a:font script="Syre" typeface="Estrangelo Edessa"/>
+        <a:font script="Sora" typeface="Nirmala UI"/>
+        <a:font script="Tale" typeface="Microsoft Tai Le"/>
+        <a:font script="Talu" typeface="Microsoft New Tai Lue"/>
+        <a:font script="Tfng" typeface="Ebrima"/>
+      </a:majorFont>
+      <a:minorFont>
+        <a:latin typeface="Calibri" panose="020F0502020204030204"/>
+        <a:ea typeface=""/>
+        <a:cs typeface=""/>
+        <a:font script="Jpan" typeface="游ゴシック"/>
+        <a:font script="Hang" typeface="맑은 고딕"/>
+        <a:font script="Hans" typeface="等线"/>
+        <a:font script="Hant" typeface="新細明體"/>
+        <a:font script="Arab" typeface="Arial"/>
+        <a:font script="Hebr" typeface="Arial"/>
+        <a:font script="Thai" typeface="Cordia New"/>
+        <a:font script="Ethi" typeface="Nyala"/>
+        <a:font script="Beng" typeface="Vrinda"/>
+        <a:font script="Gujr" typeface="Shruti"/>
+        <a:font script="Khmr" typeface="DaunPenh"/>
+        <a:font script="Knda" typeface="Tunga"/>
+        <a:font script="Guru" typeface="Raavi"/>
+        <a:font script="Cans" typeface="Euphemia"/>
+        <a:font script="Cher" typeface="Plantagenet Cherokee"/>
+        <a:font script="Yiii" typeface="Microsoft Yi Baiti"/>
+        <a:font script="Tibt" typeface="Microsoft Himalaya"/>
+        <a:font script="Thaa" typeface="MV Boli"/>
+        <a:font script="Deva" typeface="Mangal"/>
+        <a:font script="Telu" typeface="Gautami"/>
+        <a:font script="Taml" typeface="Latha"/>
+        <a:font script="Syrc" typeface="Estrangelo Edessa"/>
+        <a:font script="Orya" typeface="Kalinga"/>
+        <a:font script="Mlym" typeface="Kartika"/>
+        <a:font script="Laoo" typeface="DokChampa"/>
+        <a:font script="Sinh" typeface="Iskoola Pota"/>
+        <a:font script="Mong" typeface="Mongolian Baiti"/>
+        <a:font script="Viet" typeface="Arial"/>
+        <a:font script="Uigh" typeface="Microsoft Uighur"/>
+        <a:font script="Geor" typeface="Sylfaen"/>
+        <a:font script="Armn" typeface="Arial"/>
+        <a:font script="Bugi" typeface="Leelawadee UI"/>
+        <a:font script="Bopo" typeface="Microsoft JhengHei"/>
+        <a:font script="Java" typeface="Javanese Text"/>
+        <a:font script="Lisu" typeface="Segoe UI"/>
+        <a:font script="Mymr" typeface="Myanmar Text"/>
+        <a:font script="Nkoo" typeface="Ebrima"/>
+        <a:font script="Olck" typeface="Nirmala UI"/>
+        <a:font script="Osma" typeface="Ebrima"/>
+        <a:font script="Phag" typeface="Phagspa"/>
+        <a:font script="Syrn" typeface="Estrangelo Edessa"/>
+        <a:font script="Syrj" typeface="Estrangelo Edessa"/>
+        <a:font script="Syre" typeface="Estrangelo Edessa"/>
+        <a:font script="Sora" typeface="Nirmala UI"/>
+        <a:font script="Tale" typeface="Microsoft Tai Le"/>
+        <a:font script="Talu" typeface="Microsoft New Tai Lue"/>
+        <a:font script="Tfng" typeface="Ebrima"/>
+      </a:minorFont>
+    </a:fontScheme>
+    <a:fmtScheme name="Office">
+      <a:fillStyleLst>
+        <a:solidFill>
+          <a:schemeClr val="phClr"/>
+        </a:solidFill>
+        <a:gradFill rotWithShape="1">
+          <a:gsLst>
+            <a:gs pos="0">
+              <a:schemeClr val="phClr">
+                <a:lumMod val="110000"/>
+                <a:satMod val="105000"/>
+                <a:tint val="67000"/>
+              </a:schemeClr>
+            </a:gs>
+            <a:gs pos="50000">
+              <a:schemeClr val="phClr">
+                <a:lumMod val="105000"/>
+                <a:satMod val="103000"/>
+                <a:tint val="73000"/>
+              </a:schemeClr>
+            </a:gs>
+            <a:gs pos="100000">
+              <a:schemeClr val="phClr">
+                <a:lumMod val="105000"/>
+                <a:satMod val="109000"/>
+                <a:tint val="81000"/>
+              </a:schemeClr>
+            </a:gs>
+          </a:gsLst>
+          <a:lin ang="5400000" scaled="0"/>
+        </a:gradFill>
+        <a:gradFill rotWithShape="1">
+          <a:gsLst>
+            <a:gs pos="0">
+              <a:schemeClr val="phClr">
+                <a:satMod val="103000"/>
+                <a:lumMod val="102000"/>
+                <a:tint val="94000"/>
+              </a:schemeClr>
+            </a:gs>
+            <a:gs pos="50000">
+              <a:schemeClr val="phClr">
+                <a:satMod val="110000"/>
+                <a:lumMod val="100000"/>
+                <a:shade val="100000"/>
+              </a:schemeClr>
+            </a:gs>
+            <a:gs pos="100000">
+              <a:schemeClr val="phClr">
+                <a:lumMod val="99000"/>
+                <a:satMod val="120000"/>
+                <a:shade val="78000"/>
+              </a:schemeClr>
+            </a:gs>
+          </a:gsLst>
+          <a:lin ang="5400000" scaled="0"/>
+        </a:gradFill>
+      </a:fillStyleLst>
+      <a:lnStyleLst>
+        <a:ln w="6350" cap="flat" cmpd="sng" algn="ctr">
+          <a:solidFill>
+            <a:schemeClr val="phClr"/>
+          </a:solidFill>
+          <a:prstDash val="solid"/>
+          <a:miter lim="800000"/>
+        </a:ln>
+        <a:ln w="12700" cap="flat" cmpd="sng" algn="ctr">
+          <a:solidFill>
+            <a:schemeClr val="phClr"/>
+          </a:solidFill>
+          <a:prstDash val="solid"/>
+          <a:miter lim="800000"/>
+        </a:ln>
+        <a:ln w="19050" cap="flat" cmpd="sng" algn="ctr">
+          <a:solidFill>
+            <a:schemeClr val="phClr"/>
+          </a:solidFill>
+          <a:prstDash val="solid"/>
+          <a:miter lim="800000"/>
+        </a:ln>
+      </a:lnStyleLst>
+      <a:effectStyleLst>
+        <a:effectStyle>
+          <a:effectLst/>
+        </a:effectStyle>
+        <a:effectStyle>
+          <a:effectLst/>
+        </a:effectStyle>
+        <a:effectStyle>
+          <a:effectLst>
+            <a:outerShdw blurRad="57150" dist="19050" dir="5400000" algn="ctr" rotWithShape="0">
+              <a:srgbClr val="000000">
+                <a:alpha val="63000"/>
+              </a:srgbClr>
+            </a:outerShdw>
+          </a:effectLst>
+        </a:effectStyle>
+      </a:effectStyleLst>
+      <a:bgFillStyleLst>
+        <a:solidFill>
+          <a:schemeClr val="phClr"/>
+        </a:solidFill>
+        <a:solidFill>
+          <a:schemeClr val="phClr">
+            <a:tint val="95000"/>
+            <a:satMod val="170000"/>
+          </a:schemeClr>
+        </a:solidFill>
+        <a:gradFill rotWithShape="1">
+          <a:gsLst>
+            <a:gs pos="0">
+              <a:schemeClr val="phClr">
+                <a:tint val="93000"/>
+                <a:satMod val="150000"/>
+                <a:shade val="98000"/>
+                <a:lumMod val="102000"/>
+              </a:schemeClr>
+            </a:gs>
+            <a:gs pos="50000">
+              <a:schemeClr val="phClr">
+                <a:tint val="98000"/>
+                <a:satMod val="130000"/>
+                <a:shade val="90000"/>
+                <a:lumMod val="103000"/>
+              </a:schemeClr>
+            </a:gs>
+            <a:gs pos="100000">
+              <a:schemeClr val="phClr">
+                <a:shade val="63000"/>
+                <a:satMod val="120000"/>
+              </a:schemeClr>
+            </a:gs>
+          </a:gsLst>
+          <a:lin ang="5400000" scaled="0"/>
+        </a:gradFill>
+      </a:bgFillStyleLst>
+    </a:fmtScheme>
+  </a:themeElements>
+  <a:objectDefaults/>
+  <a:extraClrSchemeLst/>
+  <a:extLst>
+    <a:ext uri="{05A4C25C-085E-4340-85A3-A5531E510DB2}">
+      <thm15:themeFamily xmlns:thm15="http://schemas.microsoft.com/office/thememl/2012/main" name="Office Theme" id="{62F939B6-93AF-4DB8-9C6B-D6C7DFDC589F}" vid="{4A3C46E8-61CC-4603-A589-7422A47A8E4A}"/>
+    </a:ext>
+  </a:extLst>
+</a:theme>
 </file>
</xml_diff>

<commit_message>
terminado slide e minha parte da fala
</commit_message>
<xml_diff>
--- a/Docs/Apresentacao.pptx
+++ b/Docs/Apresentacao.pptx
@@ -5,7 +5,7 @@
     <p:sldMasterId id="2147483648" r:id="rId1"/>
   </p:sldMasterIdLst>
   <p:notesMasterIdLst>
-    <p:notesMasterId r:id="rId11"/>
+    <p:notesMasterId r:id="rId15"/>
   </p:notesMasterIdLst>
   <p:sldIdLst>
     <p:sldId id="256" r:id="rId2"/>
@@ -17,6 +17,10 @@
     <p:sldId id="262" r:id="rId8"/>
     <p:sldId id="263" r:id="rId9"/>
     <p:sldId id="264" r:id="rId10"/>
+    <p:sldId id="265" r:id="rId11"/>
+    <p:sldId id="266" r:id="rId12"/>
+    <p:sldId id="267" r:id="rId13"/>
+    <p:sldId id="268" r:id="rId14"/>
   </p:sldIdLst>
   <p:sldSz cx="12192000" cy="6858000"/>
   <p:notesSz cx="6858000" cy="9144000"/>
@@ -300,7 +304,6 @@
               <a:rPr lang="pt-BR"/>
               <a:t>Quinto nível</a:t>
             </a:r>
-            <a:endParaRPr lang="pt-BR"/>
           </a:p>
         </p:txBody>
       </p:sp>
@@ -6349,6 +6352,962 @@
 </p:sld>
 </file>
 
+<file path=ppt/slides/slide10.xml><?xml version="1.0" encoding="utf-8"?>
+<p:sld xmlns:a="http://schemas.openxmlformats.org/drawingml/2006/main" xmlns:r="http://schemas.openxmlformats.org/officeDocument/2006/relationships" xmlns:p="http://schemas.openxmlformats.org/presentationml/2006/main">
+  <p:cSld>
+    <p:spTree>
+      <p:nvGrpSpPr>
+        <p:cNvPr id="1" name=""/>
+        <p:cNvGrpSpPr/>
+        <p:nvPr/>
+      </p:nvGrpSpPr>
+      <p:grpSpPr>
+        <a:xfrm>
+          <a:off x="0" y="0"/>
+          <a:ext cx="0" cy="0"/>
+          <a:chOff x="0" y="0"/>
+          <a:chExt cx="0" cy="0"/>
+        </a:xfrm>
+      </p:grpSpPr>
+      <p:sp>
+        <p:nvSpPr>
+          <p:cNvPr id="2" name="Título 1"/>
+          <p:cNvSpPr>
+            <a:spLocks noGrp="1"/>
+          </p:cNvSpPr>
+          <p:nvPr>
+            <p:ph type="title"/>
+          </p:nvPr>
+        </p:nvSpPr>
+        <p:spPr/>
+        <p:txBody>
+          <a:bodyPr/>
+          <a:lstStyle/>
+          <a:p>
+            <a:r>
+              <a:rPr lang="pt-BR" dirty="0"/>
+              <a:t>Resultados esperados</a:t>
+            </a:r>
+          </a:p>
+        </p:txBody>
+      </p:sp>
+      <p:sp>
+        <p:nvSpPr>
+          <p:cNvPr id="3" name="Espaço Reservado para Conteúdo 2"/>
+          <p:cNvSpPr>
+            <a:spLocks noGrp="1"/>
+          </p:cNvSpPr>
+          <p:nvPr>
+            <p:ph idx="1"/>
+          </p:nvPr>
+        </p:nvSpPr>
+        <p:spPr/>
+        <p:txBody>
+          <a:bodyPr/>
+          <a:lstStyle/>
+          <a:p>
+            <a:pPr>
+              <a:buFont typeface="Wingdings" panose="05000000000000000000" pitchFamily="2" charset="2"/>
+              <a:buChar char="q"/>
+            </a:pPr>
+            <a:r>
+              <a:rPr lang="pt-BR" sz="2400" dirty="0"/>
+              <a:t>Aplicação desenvolvida para dispositivos </a:t>
+            </a:r>
+            <a:r>
+              <a:rPr lang="pt-BR" sz="2400" dirty="0" err="1"/>
+              <a:t>Android</a:t>
+            </a:r>
+            <a:r>
+              <a:rPr lang="pt-BR" sz="2400" dirty="0"/>
+              <a:t> acima da versão 4.0;</a:t>
+            </a:r>
+          </a:p>
+          <a:p>
+            <a:pPr>
+              <a:buFont typeface="Wingdings" panose="05000000000000000000" pitchFamily="2" charset="2"/>
+              <a:buChar char="q"/>
+            </a:pPr>
+            <a:r>
+              <a:rPr lang="pt-BR" sz="2400" dirty="0"/>
+              <a:t>Plataforma que permita adoção e doação de animais, acesso a canais de denúncia de maus-tratos e cadastro de campanhas;</a:t>
+            </a:r>
+          </a:p>
+          <a:p>
+            <a:pPr>
+              <a:buFont typeface="Wingdings" panose="05000000000000000000" pitchFamily="2" charset="2"/>
+              <a:buChar char="q"/>
+            </a:pPr>
+            <a:r>
+              <a:rPr lang="pt-BR" sz="2400" dirty="0"/>
+              <a:t>Interface intuitiva, boa usabilidade.</a:t>
+            </a:r>
+          </a:p>
+        </p:txBody>
+      </p:sp>
+    </p:spTree>
+    <p:extLst>
+      <p:ext uri="{BB962C8B-B14F-4D97-AF65-F5344CB8AC3E}">
+        <p14:creationId xmlns:p14="http://schemas.microsoft.com/office/powerpoint/2010/main" val="4045515135"/>
+      </p:ext>
+    </p:extLst>
+  </p:cSld>
+  <p:clrMapOvr>
+    <a:masterClrMapping/>
+  </p:clrMapOvr>
+  <p:transition spd="slow">
+    <p:wheel spokes="1"/>
+  </p:transition>
+  <p:timing>
+    <p:tnLst>
+      <p:par>
+        <p:cTn id="1" dur="indefinite" restart="never" nodeType="tmRoot">
+          <p:childTnLst>
+            <p:seq concurrent="1" nextAc="seek">
+              <p:cTn id="2" dur="indefinite" nodeType="mainSeq">
+                <p:childTnLst>
+                  <p:par>
+                    <p:cTn id="3" fill="hold">
+                      <p:stCondLst>
+                        <p:cond delay="indefinite"/>
+                        <p:cond evt="onBegin" delay="0">
+                          <p:tn val="2"/>
+                        </p:cond>
+                      </p:stCondLst>
+                      <p:childTnLst>
+                        <p:par>
+                          <p:cTn id="4" fill="hold">
+                            <p:stCondLst>
+                              <p:cond delay="0"/>
+                            </p:stCondLst>
+                            <p:childTnLst>
+                              <p:par>
+                                <p:cTn id="5" presetID="22" presetClass="entr" presetSubtype="4" fill="hold" grpId="0" nodeType="withEffect">
+                                  <p:stCondLst>
+                                    <p:cond delay="0"/>
+                                  </p:stCondLst>
+                                  <p:childTnLst>
+                                    <p:set>
+                                      <p:cBhvr>
+                                        <p:cTn id="6" dur="1" fill="hold">
+                                          <p:stCondLst>
+                                            <p:cond delay="0"/>
+                                          </p:stCondLst>
+                                        </p:cTn>
+                                        <p:tgtEl>
+                                          <p:spTgt spid="2"/>
+                                        </p:tgtEl>
+                                        <p:attrNameLst>
+                                          <p:attrName>style.visibility</p:attrName>
+                                        </p:attrNameLst>
+                                      </p:cBhvr>
+                                      <p:to>
+                                        <p:strVal val="visible"/>
+                                      </p:to>
+                                    </p:set>
+                                    <p:animEffect transition="in" filter="wipe(down)">
+                                      <p:cBhvr>
+                                        <p:cTn id="7" dur="500"/>
+                                        <p:tgtEl>
+                                          <p:spTgt spid="2"/>
+                                        </p:tgtEl>
+                                      </p:cBhvr>
+                                    </p:animEffect>
+                                  </p:childTnLst>
+                                </p:cTn>
+                              </p:par>
+                            </p:childTnLst>
+                          </p:cTn>
+                        </p:par>
+                      </p:childTnLst>
+                    </p:cTn>
+                  </p:par>
+                  <p:par>
+                    <p:cTn id="8" fill="hold">
+                      <p:stCondLst>
+                        <p:cond delay="indefinite"/>
+                      </p:stCondLst>
+                      <p:childTnLst>
+                        <p:par>
+                          <p:cTn id="9" fill="hold">
+                            <p:stCondLst>
+                              <p:cond delay="0"/>
+                            </p:stCondLst>
+                            <p:childTnLst>
+                              <p:par>
+                                <p:cTn id="10" presetID="53" presetClass="entr" presetSubtype="16" fill="hold" nodeType="clickEffect">
+                                  <p:stCondLst>
+                                    <p:cond delay="0"/>
+                                  </p:stCondLst>
+                                  <p:childTnLst>
+                                    <p:set>
+                                      <p:cBhvr>
+                                        <p:cTn id="11" dur="1" fill="hold">
+                                          <p:stCondLst>
+                                            <p:cond delay="0"/>
+                                          </p:stCondLst>
+                                        </p:cTn>
+                                        <p:tgtEl>
+                                          <p:spTgt spid="3">
+                                            <p:txEl>
+                                              <p:pRg st="0" end="0"/>
+                                            </p:txEl>
+                                          </p:spTgt>
+                                        </p:tgtEl>
+                                        <p:attrNameLst>
+                                          <p:attrName>style.visibility</p:attrName>
+                                        </p:attrNameLst>
+                                      </p:cBhvr>
+                                      <p:to>
+                                        <p:strVal val="visible"/>
+                                      </p:to>
+                                    </p:set>
+                                    <p:anim calcmode="lin" valueType="num">
+                                      <p:cBhvr>
+                                        <p:cTn id="12" dur="500" fill="hold"/>
+                                        <p:tgtEl>
+                                          <p:spTgt spid="3">
+                                            <p:txEl>
+                                              <p:pRg st="0" end="0"/>
+                                            </p:txEl>
+                                          </p:spTgt>
+                                        </p:tgtEl>
+                                        <p:attrNameLst>
+                                          <p:attrName>ppt_w</p:attrName>
+                                        </p:attrNameLst>
+                                      </p:cBhvr>
+                                      <p:tavLst>
+                                        <p:tav tm="0">
+                                          <p:val>
+                                            <p:fltVal val="0"/>
+                                          </p:val>
+                                        </p:tav>
+                                        <p:tav tm="100000">
+                                          <p:val>
+                                            <p:strVal val="#ppt_w"/>
+                                          </p:val>
+                                        </p:tav>
+                                      </p:tavLst>
+                                    </p:anim>
+                                    <p:anim calcmode="lin" valueType="num">
+                                      <p:cBhvr>
+                                        <p:cTn id="13" dur="500" fill="hold"/>
+                                        <p:tgtEl>
+                                          <p:spTgt spid="3">
+                                            <p:txEl>
+                                              <p:pRg st="0" end="0"/>
+                                            </p:txEl>
+                                          </p:spTgt>
+                                        </p:tgtEl>
+                                        <p:attrNameLst>
+                                          <p:attrName>ppt_h</p:attrName>
+                                        </p:attrNameLst>
+                                      </p:cBhvr>
+                                      <p:tavLst>
+                                        <p:tav tm="0">
+                                          <p:val>
+                                            <p:fltVal val="0"/>
+                                          </p:val>
+                                        </p:tav>
+                                        <p:tav tm="100000">
+                                          <p:val>
+                                            <p:strVal val="#ppt_h"/>
+                                          </p:val>
+                                        </p:tav>
+                                      </p:tavLst>
+                                    </p:anim>
+                                    <p:animEffect transition="in" filter="fade">
+                                      <p:cBhvr>
+                                        <p:cTn id="14" dur="500"/>
+                                        <p:tgtEl>
+                                          <p:spTgt spid="3">
+                                            <p:txEl>
+                                              <p:pRg st="0" end="0"/>
+                                            </p:txEl>
+                                          </p:spTgt>
+                                        </p:tgtEl>
+                                      </p:cBhvr>
+                                    </p:animEffect>
+                                  </p:childTnLst>
+                                </p:cTn>
+                              </p:par>
+                              <p:par>
+                                <p:cTn id="15" presetID="53" presetClass="entr" presetSubtype="16" fill="hold" nodeType="withEffect">
+                                  <p:stCondLst>
+                                    <p:cond delay="0"/>
+                                  </p:stCondLst>
+                                  <p:childTnLst>
+                                    <p:set>
+                                      <p:cBhvr>
+                                        <p:cTn id="16" dur="1" fill="hold">
+                                          <p:stCondLst>
+                                            <p:cond delay="0"/>
+                                          </p:stCondLst>
+                                        </p:cTn>
+                                        <p:tgtEl>
+                                          <p:spTgt spid="3">
+                                            <p:txEl>
+                                              <p:pRg st="1" end="1"/>
+                                            </p:txEl>
+                                          </p:spTgt>
+                                        </p:tgtEl>
+                                        <p:attrNameLst>
+                                          <p:attrName>style.visibility</p:attrName>
+                                        </p:attrNameLst>
+                                      </p:cBhvr>
+                                      <p:to>
+                                        <p:strVal val="visible"/>
+                                      </p:to>
+                                    </p:set>
+                                    <p:anim calcmode="lin" valueType="num">
+                                      <p:cBhvr>
+                                        <p:cTn id="17" dur="500" fill="hold"/>
+                                        <p:tgtEl>
+                                          <p:spTgt spid="3">
+                                            <p:txEl>
+                                              <p:pRg st="1" end="1"/>
+                                            </p:txEl>
+                                          </p:spTgt>
+                                        </p:tgtEl>
+                                        <p:attrNameLst>
+                                          <p:attrName>ppt_w</p:attrName>
+                                        </p:attrNameLst>
+                                      </p:cBhvr>
+                                      <p:tavLst>
+                                        <p:tav tm="0">
+                                          <p:val>
+                                            <p:fltVal val="0"/>
+                                          </p:val>
+                                        </p:tav>
+                                        <p:tav tm="100000">
+                                          <p:val>
+                                            <p:strVal val="#ppt_w"/>
+                                          </p:val>
+                                        </p:tav>
+                                      </p:tavLst>
+                                    </p:anim>
+                                    <p:anim calcmode="lin" valueType="num">
+                                      <p:cBhvr>
+                                        <p:cTn id="18" dur="500" fill="hold"/>
+                                        <p:tgtEl>
+                                          <p:spTgt spid="3">
+                                            <p:txEl>
+                                              <p:pRg st="1" end="1"/>
+                                            </p:txEl>
+                                          </p:spTgt>
+                                        </p:tgtEl>
+                                        <p:attrNameLst>
+                                          <p:attrName>ppt_h</p:attrName>
+                                        </p:attrNameLst>
+                                      </p:cBhvr>
+                                      <p:tavLst>
+                                        <p:tav tm="0">
+                                          <p:val>
+                                            <p:fltVal val="0"/>
+                                          </p:val>
+                                        </p:tav>
+                                        <p:tav tm="100000">
+                                          <p:val>
+                                            <p:strVal val="#ppt_h"/>
+                                          </p:val>
+                                        </p:tav>
+                                      </p:tavLst>
+                                    </p:anim>
+                                    <p:animEffect transition="in" filter="fade">
+                                      <p:cBhvr>
+                                        <p:cTn id="19" dur="500"/>
+                                        <p:tgtEl>
+                                          <p:spTgt spid="3">
+                                            <p:txEl>
+                                              <p:pRg st="1" end="1"/>
+                                            </p:txEl>
+                                          </p:spTgt>
+                                        </p:tgtEl>
+                                      </p:cBhvr>
+                                    </p:animEffect>
+                                  </p:childTnLst>
+                                </p:cTn>
+                              </p:par>
+                              <p:par>
+                                <p:cTn id="20" presetID="53" presetClass="entr" presetSubtype="16" fill="hold" nodeType="withEffect">
+                                  <p:stCondLst>
+                                    <p:cond delay="0"/>
+                                  </p:stCondLst>
+                                  <p:childTnLst>
+                                    <p:set>
+                                      <p:cBhvr>
+                                        <p:cTn id="21" dur="1" fill="hold">
+                                          <p:stCondLst>
+                                            <p:cond delay="0"/>
+                                          </p:stCondLst>
+                                        </p:cTn>
+                                        <p:tgtEl>
+                                          <p:spTgt spid="3">
+                                            <p:txEl>
+                                              <p:pRg st="2" end="2"/>
+                                            </p:txEl>
+                                          </p:spTgt>
+                                        </p:tgtEl>
+                                        <p:attrNameLst>
+                                          <p:attrName>style.visibility</p:attrName>
+                                        </p:attrNameLst>
+                                      </p:cBhvr>
+                                      <p:to>
+                                        <p:strVal val="visible"/>
+                                      </p:to>
+                                    </p:set>
+                                    <p:anim calcmode="lin" valueType="num">
+                                      <p:cBhvr>
+                                        <p:cTn id="22" dur="500" fill="hold"/>
+                                        <p:tgtEl>
+                                          <p:spTgt spid="3">
+                                            <p:txEl>
+                                              <p:pRg st="2" end="2"/>
+                                            </p:txEl>
+                                          </p:spTgt>
+                                        </p:tgtEl>
+                                        <p:attrNameLst>
+                                          <p:attrName>ppt_w</p:attrName>
+                                        </p:attrNameLst>
+                                      </p:cBhvr>
+                                      <p:tavLst>
+                                        <p:tav tm="0">
+                                          <p:val>
+                                            <p:fltVal val="0"/>
+                                          </p:val>
+                                        </p:tav>
+                                        <p:tav tm="100000">
+                                          <p:val>
+                                            <p:strVal val="#ppt_w"/>
+                                          </p:val>
+                                        </p:tav>
+                                      </p:tavLst>
+                                    </p:anim>
+                                    <p:anim calcmode="lin" valueType="num">
+                                      <p:cBhvr>
+                                        <p:cTn id="23" dur="500" fill="hold"/>
+                                        <p:tgtEl>
+                                          <p:spTgt spid="3">
+                                            <p:txEl>
+                                              <p:pRg st="2" end="2"/>
+                                            </p:txEl>
+                                          </p:spTgt>
+                                        </p:tgtEl>
+                                        <p:attrNameLst>
+                                          <p:attrName>ppt_h</p:attrName>
+                                        </p:attrNameLst>
+                                      </p:cBhvr>
+                                      <p:tavLst>
+                                        <p:tav tm="0">
+                                          <p:val>
+                                            <p:fltVal val="0"/>
+                                          </p:val>
+                                        </p:tav>
+                                        <p:tav tm="100000">
+                                          <p:val>
+                                            <p:strVal val="#ppt_h"/>
+                                          </p:val>
+                                        </p:tav>
+                                      </p:tavLst>
+                                    </p:anim>
+                                    <p:animEffect transition="in" filter="fade">
+                                      <p:cBhvr>
+                                        <p:cTn id="24" dur="500"/>
+                                        <p:tgtEl>
+                                          <p:spTgt spid="3">
+                                            <p:txEl>
+                                              <p:pRg st="2" end="2"/>
+                                            </p:txEl>
+                                          </p:spTgt>
+                                        </p:tgtEl>
+                                      </p:cBhvr>
+                                    </p:animEffect>
+                                  </p:childTnLst>
+                                </p:cTn>
+                              </p:par>
+                            </p:childTnLst>
+                          </p:cTn>
+                        </p:par>
+                      </p:childTnLst>
+                    </p:cTn>
+                  </p:par>
+                </p:childTnLst>
+              </p:cTn>
+              <p:prevCondLst>
+                <p:cond evt="onPrev" delay="0">
+                  <p:tgtEl>
+                    <p:sldTgt/>
+                  </p:tgtEl>
+                </p:cond>
+              </p:prevCondLst>
+              <p:nextCondLst>
+                <p:cond evt="onNext" delay="0">
+                  <p:tgtEl>
+                    <p:sldTgt/>
+                  </p:tgtEl>
+                </p:cond>
+              </p:nextCondLst>
+            </p:seq>
+          </p:childTnLst>
+        </p:cTn>
+      </p:par>
+    </p:tnLst>
+    <p:bldLst>
+      <p:bldP spid="2" grpId="0"/>
+    </p:bldLst>
+  </p:timing>
+</p:sld>
+</file>
+
+<file path=ppt/slides/slide11.xml><?xml version="1.0" encoding="utf-8"?>
+<p:sld xmlns:a="http://schemas.openxmlformats.org/drawingml/2006/main" xmlns:r="http://schemas.openxmlformats.org/officeDocument/2006/relationships" xmlns:p="http://schemas.openxmlformats.org/presentationml/2006/main">
+  <p:cSld>
+    <p:spTree>
+      <p:nvGrpSpPr>
+        <p:cNvPr id="1" name=""/>
+        <p:cNvGrpSpPr/>
+        <p:nvPr/>
+      </p:nvGrpSpPr>
+      <p:grpSpPr>
+        <a:xfrm>
+          <a:off x="0" y="0"/>
+          <a:ext cx="0" cy="0"/>
+          <a:chOff x="0" y="0"/>
+          <a:chExt cx="0" cy="0"/>
+        </a:xfrm>
+      </p:grpSpPr>
+      <p:sp>
+        <p:nvSpPr>
+          <p:cNvPr id="2" name="Título 1"/>
+          <p:cNvSpPr>
+            <a:spLocks noGrp="1"/>
+          </p:cNvSpPr>
+          <p:nvPr>
+            <p:ph type="title"/>
+          </p:nvPr>
+        </p:nvSpPr>
+        <p:spPr/>
+        <p:txBody>
+          <a:bodyPr/>
+          <a:lstStyle/>
+          <a:p>
+            <a:r>
+              <a:rPr lang="pt-BR" dirty="0"/>
+              <a:t>Diagrama de caso de uso</a:t>
+            </a:r>
+          </a:p>
+        </p:txBody>
+      </p:sp>
+      <p:pic>
+        <p:nvPicPr>
+          <p:cNvPr id="4" name="Espaço Reservado para Conteúdo 3"/>
+          <p:cNvPicPr>
+            <a:picLocks noGrp="1" noChangeAspect="1"/>
+          </p:cNvPicPr>
+          <p:nvPr>
+            <p:ph idx="1"/>
+          </p:nvPr>
+        </p:nvPicPr>
+        <p:blipFill>
+          <a:blip r:embed="rId2"/>
+          <a:stretch>
+            <a:fillRect/>
+          </a:stretch>
+        </p:blipFill>
+        <p:spPr>
+          <a:xfrm>
+            <a:off x="1219200" y="62184"/>
+            <a:ext cx="6320838" cy="6795816"/>
+          </a:xfrm>
+          <a:prstGeom prst="rect">
+            <a:avLst/>
+          </a:prstGeom>
+          <a:ln>
+            <a:noFill/>
+          </a:ln>
+          <a:effectLst>
+            <a:softEdge rad="112500"/>
+          </a:effectLst>
+        </p:spPr>
+      </p:pic>
+    </p:spTree>
+    <p:extLst>
+      <p:ext uri="{BB962C8B-B14F-4D97-AF65-F5344CB8AC3E}">
+        <p14:creationId xmlns:p14="http://schemas.microsoft.com/office/powerpoint/2010/main" val="505179503"/>
+      </p:ext>
+    </p:extLst>
+  </p:cSld>
+  <p:clrMapOvr>
+    <a:masterClrMapping/>
+  </p:clrMapOvr>
+  <mc:AlternateContent xmlns:mc="http://schemas.openxmlformats.org/markup-compatibility/2006">
+    <mc:Choice xmlns:p159="http://schemas.microsoft.com/office/powerpoint/2015/09/main" Requires="p159">
+      <p:transition xmlns:p14="http://schemas.microsoft.com/office/powerpoint/2010/main" spd="slow" p14:dur="2000">
+        <p159:morph option="byWord"/>
+      </p:transition>
+    </mc:Choice>
+    <mc:Fallback>
+      <p:transition spd="slow">
+        <p:fade/>
+      </p:transition>
+    </mc:Fallback>
+  </mc:AlternateContent>
+  <p:timing>
+    <p:tnLst>
+      <p:par>
+        <p:cTn id="1" dur="indefinite" restart="never" nodeType="tmRoot">
+          <p:childTnLst>
+            <p:seq concurrent="1" nextAc="seek">
+              <p:cTn id="2" dur="indefinite" nodeType="mainSeq">
+                <p:childTnLst>
+                  <p:par>
+                    <p:cTn id="3" fill="hold">
+                      <p:stCondLst>
+                        <p:cond delay="indefinite"/>
+                        <p:cond evt="onBegin" delay="0">
+                          <p:tn val="2"/>
+                        </p:cond>
+                      </p:stCondLst>
+                      <p:childTnLst>
+                        <p:par>
+                          <p:cTn id="4" fill="hold">
+                            <p:stCondLst>
+                              <p:cond delay="0"/>
+                            </p:stCondLst>
+                            <p:childTnLst>
+                              <p:par>
+                                <p:cTn id="5" presetID="10" presetClass="entr" presetSubtype="0" fill="hold" grpId="0" nodeType="withEffect">
+                                  <p:stCondLst>
+                                    <p:cond delay="0"/>
+                                  </p:stCondLst>
+                                  <p:childTnLst>
+                                    <p:set>
+                                      <p:cBhvr>
+                                        <p:cTn id="6" dur="1" fill="hold">
+                                          <p:stCondLst>
+                                            <p:cond delay="0"/>
+                                          </p:stCondLst>
+                                        </p:cTn>
+                                        <p:tgtEl>
+                                          <p:spTgt spid="2"/>
+                                        </p:tgtEl>
+                                        <p:attrNameLst>
+                                          <p:attrName>style.visibility</p:attrName>
+                                        </p:attrNameLst>
+                                      </p:cBhvr>
+                                      <p:to>
+                                        <p:strVal val="visible"/>
+                                      </p:to>
+                                    </p:set>
+                                    <p:animEffect transition="in" filter="fade">
+                                      <p:cBhvr>
+                                        <p:cTn id="7" dur="500"/>
+                                        <p:tgtEl>
+                                          <p:spTgt spid="2"/>
+                                        </p:tgtEl>
+                                      </p:cBhvr>
+                                    </p:animEffect>
+                                  </p:childTnLst>
+                                </p:cTn>
+                              </p:par>
+                            </p:childTnLst>
+                          </p:cTn>
+                        </p:par>
+                      </p:childTnLst>
+                    </p:cTn>
+                  </p:par>
+                  <p:par>
+                    <p:cTn id="8" fill="hold">
+                      <p:stCondLst>
+                        <p:cond delay="indefinite"/>
+                      </p:stCondLst>
+                      <p:childTnLst>
+                        <p:par>
+                          <p:cTn id="9" fill="hold">
+                            <p:stCondLst>
+                              <p:cond delay="0"/>
+                            </p:stCondLst>
+                            <p:childTnLst>
+                              <p:par>
+                                <p:cTn id="10" presetID="10" presetClass="exit" presetSubtype="0" fill="hold" grpId="1" nodeType="clickEffect">
+                                  <p:stCondLst>
+                                    <p:cond delay="0"/>
+                                  </p:stCondLst>
+                                  <p:childTnLst>
+                                    <p:animEffect transition="out" filter="fade">
+                                      <p:cBhvr>
+                                        <p:cTn id="11" dur="500"/>
+                                        <p:tgtEl>
+                                          <p:spTgt spid="2"/>
+                                        </p:tgtEl>
+                                      </p:cBhvr>
+                                    </p:animEffect>
+                                    <p:set>
+                                      <p:cBhvr>
+                                        <p:cTn id="12" dur="1" fill="hold">
+                                          <p:stCondLst>
+                                            <p:cond delay="499"/>
+                                          </p:stCondLst>
+                                        </p:cTn>
+                                        <p:tgtEl>
+                                          <p:spTgt spid="2"/>
+                                        </p:tgtEl>
+                                        <p:attrNameLst>
+                                          <p:attrName>style.visibility</p:attrName>
+                                        </p:attrNameLst>
+                                      </p:cBhvr>
+                                      <p:to>
+                                        <p:strVal val="hidden"/>
+                                      </p:to>
+                                    </p:set>
+                                  </p:childTnLst>
+                                </p:cTn>
+                              </p:par>
+                              <p:par>
+                                <p:cTn id="13" presetID="16" presetClass="entr" presetSubtype="21" fill="hold" nodeType="withEffect">
+                                  <p:stCondLst>
+                                    <p:cond delay="0"/>
+                                  </p:stCondLst>
+                                  <p:childTnLst>
+                                    <p:set>
+                                      <p:cBhvr>
+                                        <p:cTn id="14" dur="1" fill="hold">
+                                          <p:stCondLst>
+                                            <p:cond delay="0"/>
+                                          </p:stCondLst>
+                                        </p:cTn>
+                                        <p:tgtEl>
+                                          <p:spTgt spid="4"/>
+                                        </p:tgtEl>
+                                        <p:attrNameLst>
+                                          <p:attrName>style.visibility</p:attrName>
+                                        </p:attrNameLst>
+                                      </p:cBhvr>
+                                      <p:to>
+                                        <p:strVal val="visible"/>
+                                      </p:to>
+                                    </p:set>
+                                    <p:animEffect transition="in" filter="barn(inVertical)">
+                                      <p:cBhvr>
+                                        <p:cTn id="15" dur="500"/>
+                                        <p:tgtEl>
+                                          <p:spTgt spid="4"/>
+                                        </p:tgtEl>
+                                      </p:cBhvr>
+                                    </p:animEffect>
+                                  </p:childTnLst>
+                                </p:cTn>
+                              </p:par>
+                            </p:childTnLst>
+                          </p:cTn>
+                        </p:par>
+                      </p:childTnLst>
+                    </p:cTn>
+                  </p:par>
+                </p:childTnLst>
+              </p:cTn>
+              <p:prevCondLst>
+                <p:cond evt="onPrev" delay="0">
+                  <p:tgtEl>
+                    <p:sldTgt/>
+                  </p:tgtEl>
+                </p:cond>
+              </p:prevCondLst>
+              <p:nextCondLst>
+                <p:cond evt="onNext" delay="0">
+                  <p:tgtEl>
+                    <p:sldTgt/>
+                  </p:tgtEl>
+                </p:cond>
+              </p:nextCondLst>
+            </p:seq>
+          </p:childTnLst>
+        </p:cTn>
+      </p:par>
+    </p:tnLst>
+    <p:bldLst>
+      <p:bldP spid="2" grpId="0"/>
+      <p:bldP spid="2" grpId="1"/>
+    </p:bldLst>
+  </p:timing>
+</p:sld>
+</file>
+
+<file path=ppt/slides/slide12.xml><?xml version="1.0" encoding="utf-8"?>
+<p:sld xmlns:a="http://schemas.openxmlformats.org/drawingml/2006/main" xmlns:r="http://schemas.openxmlformats.org/officeDocument/2006/relationships" xmlns:p="http://schemas.openxmlformats.org/presentationml/2006/main">
+  <p:cSld>
+    <p:spTree>
+      <p:nvGrpSpPr>
+        <p:cNvPr id="1" name=""/>
+        <p:cNvGrpSpPr/>
+        <p:nvPr/>
+      </p:nvGrpSpPr>
+      <p:grpSpPr>
+        <a:xfrm>
+          <a:off x="0" y="0"/>
+          <a:ext cx="0" cy="0"/>
+          <a:chOff x="0" y="0"/>
+          <a:chExt cx="0" cy="0"/>
+        </a:xfrm>
+      </p:grpSpPr>
+      <p:sp>
+        <p:nvSpPr>
+          <p:cNvPr id="2" name="Título 1"/>
+          <p:cNvSpPr>
+            <a:spLocks noGrp="1"/>
+          </p:cNvSpPr>
+          <p:nvPr>
+            <p:ph type="title"/>
+          </p:nvPr>
+        </p:nvSpPr>
+        <p:spPr/>
+        <p:txBody>
+          <a:bodyPr/>
+          <a:lstStyle/>
+          <a:p>
+            <a:pPr algn="ctr"/>
+            <a:r>
+              <a:rPr lang="pt-BR" dirty="0"/>
+              <a:t>Dúvidas?</a:t>
+            </a:r>
+          </a:p>
+        </p:txBody>
+      </p:sp>
+      <p:pic>
+        <p:nvPicPr>
+          <p:cNvPr id="4" name="Espaço Reservado para Conteúdo 3"/>
+          <p:cNvPicPr>
+            <a:picLocks noGrp="1" noChangeAspect="1"/>
+          </p:cNvPicPr>
+          <p:nvPr>
+            <p:ph idx="1"/>
+          </p:nvPr>
+        </p:nvPicPr>
+        <p:blipFill>
+          <a:blip r:embed="rId2"/>
+          <a:stretch>
+            <a:fillRect/>
+          </a:stretch>
+        </p:blipFill>
+        <p:spPr>
+          <a:xfrm>
+            <a:off x="3602835" y="3188766"/>
+            <a:ext cx="2745665" cy="3026617"/>
+          </a:xfrm>
+        </p:spPr>
+      </p:pic>
+      <p:pic>
+        <p:nvPicPr>
+          <p:cNvPr id="6" name="Imagem 5"/>
+          <p:cNvPicPr>
+            <a:picLocks noChangeAspect="1"/>
+          </p:cNvPicPr>
+          <p:nvPr/>
+        </p:nvPicPr>
+        <p:blipFill>
+          <a:blip r:embed="rId3"/>
+          <a:stretch>
+            <a:fillRect/>
+          </a:stretch>
+        </p:blipFill>
+        <p:spPr>
+          <a:xfrm>
+            <a:off x="5506184" y="2065461"/>
+            <a:ext cx="1381213" cy="1381213"/>
+          </a:xfrm>
+          <a:prstGeom prst="rect">
+            <a:avLst/>
+          </a:prstGeom>
+        </p:spPr>
+      </p:pic>
+    </p:spTree>
+    <p:extLst>
+      <p:ext uri="{BB962C8B-B14F-4D97-AF65-F5344CB8AC3E}">
+        <p14:creationId xmlns:p14="http://schemas.microsoft.com/office/powerpoint/2010/main" val="3258235105"/>
+      </p:ext>
+    </p:extLst>
+  </p:cSld>
+  <p:clrMapOvr>
+    <a:masterClrMapping/>
+  </p:clrMapOvr>
+  <mc:AlternateContent xmlns:mc="http://schemas.openxmlformats.org/markup-compatibility/2006">
+    <mc:Choice xmlns:p14="http://schemas.microsoft.com/office/powerpoint/2010/main" Requires="p14">
+      <p:transition spd="slow" p14:dur="3400">
+        <p14:reveal/>
+      </p:transition>
+    </mc:Choice>
+    <mc:Fallback>
+      <p:transition spd="slow">
+        <p:fade/>
+      </p:transition>
+    </mc:Fallback>
+  </mc:AlternateContent>
+</p:sld>
+</file>
+
+<file path=ppt/slides/slide13.xml><?xml version="1.0" encoding="utf-8"?>
+<p:sld xmlns:a="http://schemas.openxmlformats.org/drawingml/2006/main" xmlns:r="http://schemas.openxmlformats.org/officeDocument/2006/relationships" xmlns:p="http://schemas.openxmlformats.org/presentationml/2006/main">
+  <p:cSld>
+    <p:spTree>
+      <p:nvGrpSpPr>
+        <p:cNvPr id="1" name=""/>
+        <p:cNvGrpSpPr/>
+        <p:nvPr/>
+      </p:nvGrpSpPr>
+      <p:grpSpPr>
+        <a:xfrm>
+          <a:off x="0" y="0"/>
+          <a:ext cx="0" cy="0"/>
+          <a:chOff x="0" y="0"/>
+          <a:chExt cx="0" cy="0"/>
+        </a:xfrm>
+      </p:grpSpPr>
+      <p:sp>
+        <p:nvSpPr>
+          <p:cNvPr id="2" name="Título 1"/>
+          <p:cNvSpPr>
+            <a:spLocks noGrp="1"/>
+          </p:cNvSpPr>
+          <p:nvPr>
+            <p:ph type="title"/>
+          </p:nvPr>
+        </p:nvSpPr>
+        <p:spPr>
+          <a:xfrm>
+            <a:off x="1197904" y="3151650"/>
+            <a:ext cx="8596668" cy="1320800"/>
+          </a:xfrm>
+        </p:spPr>
+        <p:txBody>
+          <a:bodyPr>
+            <a:normAutofit/>
+          </a:bodyPr>
+          <a:lstStyle/>
+          <a:p>
+            <a:pPr algn="ctr"/>
+            <a:r>
+              <a:rPr lang="pt-BR" sz="4800" dirty="0"/>
+              <a:t>Muito obrigado!</a:t>
+            </a:r>
+          </a:p>
+        </p:txBody>
+      </p:sp>
+    </p:spTree>
+    <p:extLst>
+      <p:ext uri="{BB962C8B-B14F-4D97-AF65-F5344CB8AC3E}">
+        <p14:creationId xmlns:p14="http://schemas.microsoft.com/office/powerpoint/2010/main" val="1022517172"/>
+      </p:ext>
+    </p:extLst>
+  </p:cSld>
+  <p:clrMapOvr>
+    <a:masterClrMapping/>
+  </p:clrMapOvr>
+  <p:transition spd="slow">
+    <p:randomBar dir="vert"/>
+  </p:transition>
+</p:sld>
+</file>
+
 <file path=ppt/slides/slide2.xml><?xml version="1.0" encoding="utf-8"?>
 <p:sld xmlns:a="http://schemas.openxmlformats.org/drawingml/2006/main" xmlns:r="http://schemas.openxmlformats.org/officeDocument/2006/relationships" xmlns:p="http://schemas.openxmlformats.org/presentationml/2006/main">
   <p:cSld>

</xml_diff>